<commit_message>
add details to powerpoint
</commit_message>
<xml_diff>
--- a/Covid 19 Presentation.pptx
+++ b/Covid 19 Presentation.pptx
@@ -13,11 +13,12 @@
     <p:sldId id="261" r:id="rId7"/>
     <p:sldId id="262" r:id="rId8"/>
     <p:sldId id="268" r:id="rId9"/>
-    <p:sldId id="263" r:id="rId10"/>
-    <p:sldId id="264" r:id="rId11"/>
-    <p:sldId id="265" r:id="rId12"/>
-    <p:sldId id="266" r:id="rId13"/>
-    <p:sldId id="267" r:id="rId14"/>
+    <p:sldId id="269" r:id="rId10"/>
+    <p:sldId id="263" r:id="rId11"/>
+    <p:sldId id="264" r:id="rId12"/>
+    <p:sldId id="265" r:id="rId13"/>
+    <p:sldId id="266" r:id="rId14"/>
+    <p:sldId id="267" r:id="rId15"/>
   </p:sldIdLst>
   <p:sldSz cx="12192000" cy="6858000"/>
   <p:notesSz cx="6858000" cy="9144000"/>
@@ -116,11 +117,370 @@
       </a:defRPr>
     </a:lvl9pPr>
   </p:defaultTextStyle>
+  <p:extLst>
+    <p:ext uri="{EFAFB233-063F-42B5-8137-9DF3F51BA10A}">
+      <p15:sldGuideLst xmlns:p15="http://schemas.microsoft.com/office/powerpoint/2012/main"/>
+    </p:ext>
+  </p:extLst>
 </p:presentation>
 </file>
 
 <file path=ppt/changesInfos/changesInfo1.xml><?xml version="1.0" encoding="utf-8"?>
 <pc:chgInfo xmlns:a="http://schemas.openxmlformats.org/drawingml/2006/main" xmlns:r="http://schemas.openxmlformats.org/officeDocument/2006/relationships" xmlns:ac="http://schemas.microsoft.com/office/drawing/2013/main/command" xmlns:pc="http://schemas.microsoft.com/office/powerpoint/2013/main/command">
+  <pc:docChgLst>
+    <pc:chgData name="Zachary Owen" userId="d1254ce893023eb5" providerId="LiveId" clId="{5481171A-B7C3-41C8-AC9C-C25C4A57EECB}"/>
+    <pc:docChg chg="undo custSel addSld modSld">
+      <pc:chgData name="Zachary Owen" userId="d1254ce893023eb5" providerId="LiveId" clId="{5481171A-B7C3-41C8-AC9C-C25C4A57EECB}" dt="2021-05-07T23:06:11.631" v="3157" actId="20577"/>
+      <pc:docMkLst>
+        <pc:docMk/>
+      </pc:docMkLst>
+      <pc:sldChg chg="addSp delSp modSp mod modClrScheme chgLayout">
+        <pc:chgData name="Zachary Owen" userId="d1254ce893023eb5" providerId="LiveId" clId="{5481171A-B7C3-41C8-AC9C-C25C4A57EECB}" dt="2021-05-07T23:06:11.631" v="3157" actId="20577"/>
+        <pc:sldMkLst>
+          <pc:docMk/>
+          <pc:sldMk cId="1139481063" sldId="258"/>
+        </pc:sldMkLst>
+        <pc:spChg chg="mod ord">
+          <ac:chgData name="Zachary Owen" userId="d1254ce893023eb5" providerId="LiveId" clId="{5481171A-B7C3-41C8-AC9C-C25C4A57EECB}" dt="2021-05-07T01:26:24.673" v="190" actId="700"/>
+          <ac:spMkLst>
+            <pc:docMk/>
+            <pc:sldMk cId="1139481063" sldId="258"/>
+            <ac:spMk id="2" creationId="{FCBCFE40-176B-4A77-BCD8-CDEF6D4BFA4C}"/>
+          </ac:spMkLst>
+        </pc:spChg>
+        <pc:spChg chg="mod ord">
+          <ac:chgData name="Zachary Owen" userId="d1254ce893023eb5" providerId="LiveId" clId="{5481171A-B7C3-41C8-AC9C-C25C4A57EECB}" dt="2021-05-07T23:06:11.631" v="3157" actId="20577"/>
+          <ac:spMkLst>
+            <pc:docMk/>
+            <pc:sldMk cId="1139481063" sldId="258"/>
+            <ac:spMk id="3" creationId="{848FD0DA-39A8-4AF2-AC3B-8FF71062C678}"/>
+          </ac:spMkLst>
+        </pc:spChg>
+        <pc:spChg chg="del">
+          <ac:chgData name="Zachary Owen" userId="d1254ce893023eb5" providerId="LiveId" clId="{5481171A-B7C3-41C8-AC9C-C25C4A57EECB}" dt="2021-05-07T01:26:08.188" v="185" actId="931"/>
+          <ac:spMkLst>
+            <pc:docMk/>
+            <pc:sldMk cId="1139481063" sldId="258"/>
+            <ac:spMk id="4" creationId="{827C9768-D987-454C-B4F5-3B2C0480DB3E}"/>
+          </ac:spMkLst>
+        </pc:spChg>
+        <pc:picChg chg="add mod ord">
+          <ac:chgData name="Zachary Owen" userId="d1254ce893023eb5" providerId="LiveId" clId="{5481171A-B7C3-41C8-AC9C-C25C4A57EECB}" dt="2021-05-07T01:27:52.682" v="363" actId="1076"/>
+          <ac:picMkLst>
+            <pc:docMk/>
+            <pc:sldMk cId="1139481063" sldId="258"/>
+            <ac:picMk id="6" creationId="{CBC58375-A09B-44D4-A2E0-6A108D396C5B}"/>
+          </ac:picMkLst>
+        </pc:picChg>
+      </pc:sldChg>
+      <pc:sldChg chg="modSp mod">
+        <pc:chgData name="Zachary Owen" userId="d1254ce893023eb5" providerId="LiveId" clId="{5481171A-B7C3-41C8-AC9C-C25C4A57EECB}" dt="2021-05-07T23:05:15.568" v="3098" actId="20577"/>
+        <pc:sldMkLst>
+          <pc:docMk/>
+          <pc:sldMk cId="1570807268" sldId="259"/>
+        </pc:sldMkLst>
+        <pc:spChg chg="mod">
+          <ac:chgData name="Zachary Owen" userId="d1254ce893023eb5" providerId="LiveId" clId="{5481171A-B7C3-41C8-AC9C-C25C4A57EECB}" dt="2021-05-07T23:05:15.568" v="3098" actId="20577"/>
+          <ac:spMkLst>
+            <pc:docMk/>
+            <pc:sldMk cId="1570807268" sldId="259"/>
+            <ac:spMk id="3" creationId="{8729F421-5869-48CF-9594-D0E1FFCD7B38}"/>
+          </ac:spMkLst>
+        </pc:spChg>
+      </pc:sldChg>
+      <pc:sldChg chg="delSp modSp mod modClrScheme chgLayout">
+        <pc:chgData name="Zachary Owen" userId="d1254ce893023eb5" providerId="LiveId" clId="{5481171A-B7C3-41C8-AC9C-C25C4A57EECB}" dt="2021-05-07T01:37:27.084" v="1596" actId="313"/>
+        <pc:sldMkLst>
+          <pc:docMk/>
+          <pc:sldMk cId="3573939707" sldId="260"/>
+        </pc:sldMkLst>
+        <pc:spChg chg="mod ord">
+          <ac:chgData name="Zachary Owen" userId="d1254ce893023eb5" providerId="LiveId" clId="{5481171A-B7C3-41C8-AC9C-C25C4A57EECB}" dt="2021-05-07T01:37:19.198" v="1594" actId="14100"/>
+          <ac:spMkLst>
+            <pc:docMk/>
+            <pc:sldMk cId="3573939707" sldId="260"/>
+            <ac:spMk id="2" creationId="{FAEE463E-190C-4244-AE1D-8309C3B41F66}"/>
+          </ac:spMkLst>
+        </pc:spChg>
+        <pc:spChg chg="mod ord">
+          <ac:chgData name="Zachary Owen" userId="d1254ce893023eb5" providerId="LiveId" clId="{5481171A-B7C3-41C8-AC9C-C25C4A57EECB}" dt="2021-05-07T01:37:27.084" v="1596" actId="313"/>
+          <ac:spMkLst>
+            <pc:docMk/>
+            <pc:sldMk cId="3573939707" sldId="260"/>
+            <ac:spMk id="3" creationId="{8D1680A3-5670-4CEF-B449-357FD1E1CBE0}"/>
+          </ac:spMkLst>
+        </pc:spChg>
+        <pc:spChg chg="del">
+          <ac:chgData name="Zachary Owen" userId="d1254ce893023eb5" providerId="LiveId" clId="{5481171A-B7C3-41C8-AC9C-C25C4A57EECB}" dt="2021-05-07T01:28:04.106" v="364" actId="700"/>
+          <ac:spMkLst>
+            <pc:docMk/>
+            <pc:sldMk cId="3573939707" sldId="260"/>
+            <ac:spMk id="4" creationId="{8CCD9045-86C6-4E21-8C7B-60D4607021EA}"/>
+          </ac:spMkLst>
+        </pc:spChg>
+      </pc:sldChg>
+      <pc:sldChg chg="modSp mod">
+        <pc:chgData name="Zachary Owen" userId="d1254ce893023eb5" providerId="LiveId" clId="{5481171A-B7C3-41C8-AC9C-C25C4A57EECB}" dt="2021-05-07T02:54:51.728" v="2796" actId="20577"/>
+        <pc:sldMkLst>
+          <pc:docMk/>
+          <pc:sldMk cId="1138257485" sldId="263"/>
+        </pc:sldMkLst>
+        <pc:spChg chg="mod">
+          <ac:chgData name="Zachary Owen" userId="d1254ce893023eb5" providerId="LiveId" clId="{5481171A-B7C3-41C8-AC9C-C25C4A57EECB}" dt="2021-05-07T02:02:24.556" v="2375" actId="20577"/>
+          <ac:spMkLst>
+            <pc:docMk/>
+            <pc:sldMk cId="1138257485" sldId="263"/>
+            <ac:spMk id="2" creationId="{9465B42F-D2D6-4EC1-836D-661E95F38FAA}"/>
+          </ac:spMkLst>
+        </pc:spChg>
+        <pc:spChg chg="mod">
+          <ac:chgData name="Zachary Owen" userId="d1254ce893023eb5" providerId="LiveId" clId="{5481171A-B7C3-41C8-AC9C-C25C4A57EECB}" dt="2021-05-07T02:54:51.728" v="2796" actId="20577"/>
+          <ac:spMkLst>
+            <pc:docMk/>
+            <pc:sldMk cId="1138257485" sldId="263"/>
+            <ac:spMk id="3" creationId="{7F06FBF8-4F4C-4401-B430-DDA78954DA72}"/>
+          </ac:spMkLst>
+        </pc:spChg>
+        <pc:spChg chg="mod">
+          <ac:chgData name="Zachary Owen" userId="d1254ce893023eb5" providerId="LiveId" clId="{5481171A-B7C3-41C8-AC9C-C25C4A57EECB}" dt="2021-05-07T02:33:36.647" v="2795" actId="14100"/>
+          <ac:spMkLst>
+            <pc:docMk/>
+            <pc:sldMk cId="1138257485" sldId="263"/>
+            <ac:spMk id="5" creationId="{6AAA2E70-BD26-4F45-A1DC-52D3E8F764FE}"/>
+          </ac:spMkLst>
+        </pc:spChg>
+      </pc:sldChg>
+      <pc:sldChg chg="modSp mod">
+        <pc:chgData name="Zachary Owen" userId="d1254ce893023eb5" providerId="LiveId" clId="{5481171A-B7C3-41C8-AC9C-C25C4A57EECB}" dt="2021-05-07T02:59:39.921" v="3052" actId="27636"/>
+        <pc:sldMkLst>
+          <pc:docMk/>
+          <pc:sldMk cId="245820475" sldId="264"/>
+        </pc:sldMkLst>
+        <pc:spChg chg="mod">
+          <ac:chgData name="Zachary Owen" userId="d1254ce893023eb5" providerId="LiveId" clId="{5481171A-B7C3-41C8-AC9C-C25C4A57EECB}" dt="2021-05-07T02:02:38.524" v="2378" actId="20577"/>
+          <ac:spMkLst>
+            <pc:docMk/>
+            <pc:sldMk cId="245820475" sldId="264"/>
+            <ac:spMk id="2" creationId="{CF2F4417-6ADD-4BE7-9C57-95BA49F8A6AF}"/>
+          </ac:spMkLst>
+        </pc:spChg>
+        <pc:spChg chg="mod">
+          <ac:chgData name="Zachary Owen" userId="d1254ce893023eb5" providerId="LiveId" clId="{5481171A-B7C3-41C8-AC9C-C25C4A57EECB}" dt="2021-05-07T02:59:39.920" v="3051" actId="27636"/>
+          <ac:spMkLst>
+            <pc:docMk/>
+            <pc:sldMk cId="245820475" sldId="264"/>
+            <ac:spMk id="3" creationId="{4297D99A-3B39-46D0-88FD-5F62849FBEA2}"/>
+          </ac:spMkLst>
+        </pc:spChg>
+        <pc:spChg chg="mod">
+          <ac:chgData name="Zachary Owen" userId="d1254ce893023eb5" providerId="LiveId" clId="{5481171A-B7C3-41C8-AC9C-C25C4A57EECB}" dt="2021-05-07T02:59:39.921" v="3052" actId="27636"/>
+          <ac:spMkLst>
+            <pc:docMk/>
+            <pc:sldMk cId="245820475" sldId="264"/>
+            <ac:spMk id="5" creationId="{B865C62A-5914-4786-B24E-EE3631EFAFCC}"/>
+          </ac:spMkLst>
+        </pc:spChg>
+      </pc:sldChg>
+      <pc:sldChg chg="addSp delSp modSp mod modClrScheme chgLayout">
+        <pc:chgData name="Zachary Owen" userId="d1254ce893023eb5" providerId="LiveId" clId="{5481171A-B7C3-41C8-AC9C-C25C4A57EECB}" dt="2021-05-07T02:02:27.729" v="2376" actId="20577"/>
+        <pc:sldMkLst>
+          <pc:docMk/>
+          <pc:sldMk cId="3399668416" sldId="268"/>
+        </pc:sldMkLst>
+        <pc:spChg chg="del mod ord">
+          <ac:chgData name="Zachary Owen" userId="d1254ce893023eb5" providerId="LiveId" clId="{5481171A-B7C3-41C8-AC9C-C25C4A57EECB}" dt="2021-05-07T01:38:12.063" v="1602" actId="700"/>
+          <ac:spMkLst>
+            <pc:docMk/>
+            <pc:sldMk cId="3399668416" sldId="268"/>
+            <ac:spMk id="2" creationId="{ABF86C2E-231F-40B8-8AD6-02C95CCD1E7E}"/>
+          </ac:spMkLst>
+        </pc:spChg>
+        <pc:spChg chg="add del mod ord">
+          <ac:chgData name="Zachary Owen" userId="d1254ce893023eb5" providerId="LiveId" clId="{5481171A-B7C3-41C8-AC9C-C25C4A57EECB}" dt="2021-05-07T01:38:12.063" v="1602" actId="700"/>
+          <ac:spMkLst>
+            <pc:docMk/>
+            <pc:sldMk cId="3399668416" sldId="268"/>
+            <ac:spMk id="4" creationId="{4C14F3E0-E3A5-47BD-9984-EA626C8A747D}"/>
+          </ac:spMkLst>
+        </pc:spChg>
+        <pc:spChg chg="add mod ord">
+          <ac:chgData name="Zachary Owen" userId="d1254ce893023eb5" providerId="LiveId" clId="{5481171A-B7C3-41C8-AC9C-C25C4A57EECB}" dt="2021-05-07T02:02:27.729" v="2376" actId="20577"/>
+          <ac:spMkLst>
+            <pc:docMk/>
+            <pc:sldMk cId="3399668416" sldId="268"/>
+            <ac:spMk id="6" creationId="{2415EC17-CDAA-4D6C-9B43-5C8E6DCEEA30}"/>
+          </ac:spMkLst>
+        </pc:spChg>
+        <pc:spChg chg="add mod ord">
+          <ac:chgData name="Zachary Owen" userId="d1254ce893023eb5" providerId="LiveId" clId="{5481171A-B7C3-41C8-AC9C-C25C4A57EECB}" dt="2021-05-07T01:44:08.756" v="2191" actId="1076"/>
+          <ac:spMkLst>
+            <pc:docMk/>
+            <pc:sldMk cId="3399668416" sldId="268"/>
+            <ac:spMk id="8" creationId="{4CC4C537-53CF-46CF-9D35-8A76BE90B82E}"/>
+          </ac:spMkLst>
+        </pc:spChg>
+        <pc:spChg chg="add del mod ord">
+          <ac:chgData name="Zachary Owen" userId="d1254ce893023eb5" providerId="LiveId" clId="{5481171A-B7C3-41C8-AC9C-C25C4A57EECB}" dt="2021-05-07T01:39:46.497" v="1609" actId="931"/>
+          <ac:spMkLst>
+            <pc:docMk/>
+            <pc:sldMk cId="3399668416" sldId="268"/>
+            <ac:spMk id="10" creationId="{BFA2AA55-B8D8-4715-B25A-EE6DF75A667D}"/>
+          </ac:spMkLst>
+        </pc:spChg>
+        <pc:spChg chg="add mod ord">
+          <ac:chgData name="Zachary Owen" userId="d1254ce893023eb5" providerId="LiveId" clId="{5481171A-B7C3-41C8-AC9C-C25C4A57EECB}" dt="2021-05-07T01:43:27.160" v="2180" actId="14100"/>
+          <ac:spMkLst>
+            <pc:docMk/>
+            <pc:sldMk cId="3399668416" sldId="268"/>
+            <ac:spMk id="12" creationId="{28797D2E-DF25-4DEB-B568-C7C03EB5D2CB}"/>
+          </ac:spMkLst>
+        </pc:spChg>
+        <pc:spChg chg="add del mod ord">
+          <ac:chgData name="Zachary Owen" userId="d1254ce893023eb5" providerId="LiveId" clId="{5481171A-B7C3-41C8-AC9C-C25C4A57EECB}" dt="2021-05-07T01:39:52.492" v="1610" actId="931"/>
+          <ac:spMkLst>
+            <pc:docMk/>
+            <pc:sldMk cId="3399668416" sldId="268"/>
+            <ac:spMk id="13" creationId="{53EA2494-A1FB-4D85-99C7-DCD12D9FC5D0}"/>
+          </ac:spMkLst>
+        </pc:spChg>
+        <pc:picChg chg="del">
+          <ac:chgData name="Zachary Owen" userId="d1254ce893023eb5" providerId="LiveId" clId="{5481171A-B7C3-41C8-AC9C-C25C4A57EECB}" dt="2021-05-07T01:37:46.593" v="1597" actId="478"/>
+          <ac:picMkLst>
+            <pc:docMk/>
+            <pc:sldMk cId="3399668416" sldId="268"/>
+            <ac:picMk id="5" creationId="{76CEB22F-39AC-4062-B28C-B0677D838823}"/>
+          </ac:picMkLst>
+        </pc:picChg>
+        <pc:picChg chg="del">
+          <ac:chgData name="Zachary Owen" userId="d1254ce893023eb5" providerId="LiveId" clId="{5481171A-B7C3-41C8-AC9C-C25C4A57EECB}" dt="2021-05-07T01:38:03.686" v="1599" actId="478"/>
+          <ac:picMkLst>
+            <pc:docMk/>
+            <pc:sldMk cId="3399668416" sldId="268"/>
+            <ac:picMk id="7" creationId="{1DBD1EA5-7599-465A-AE6A-CD70AC8E376A}"/>
+          </ac:picMkLst>
+        </pc:picChg>
+        <pc:picChg chg="del">
+          <ac:chgData name="Zachary Owen" userId="d1254ce893023eb5" providerId="LiveId" clId="{5481171A-B7C3-41C8-AC9C-C25C4A57EECB}" dt="2021-05-07T01:38:07.378" v="1601" actId="478"/>
+          <ac:picMkLst>
+            <pc:docMk/>
+            <pc:sldMk cId="3399668416" sldId="268"/>
+            <ac:picMk id="9" creationId="{011A5029-1F18-45CA-877F-B7785231BBCD}"/>
+          </ac:picMkLst>
+        </pc:picChg>
+        <pc:picChg chg="del">
+          <ac:chgData name="Zachary Owen" userId="d1254ce893023eb5" providerId="LiveId" clId="{5481171A-B7C3-41C8-AC9C-C25C4A57EECB}" dt="2021-05-07T01:38:06.261" v="1600" actId="478"/>
+          <ac:picMkLst>
+            <pc:docMk/>
+            <pc:sldMk cId="3399668416" sldId="268"/>
+            <ac:picMk id="11" creationId="{7ABEE123-B957-4258-9DE4-36F51EE8EE96}"/>
+          </ac:picMkLst>
+        </pc:picChg>
+        <pc:picChg chg="add del mod">
+          <ac:chgData name="Zachary Owen" userId="d1254ce893023eb5" providerId="LiveId" clId="{5481171A-B7C3-41C8-AC9C-C25C4A57EECB}" dt="2021-05-07T01:39:40.888" v="1608" actId="931"/>
+          <ac:picMkLst>
+            <pc:docMk/>
+            <pc:sldMk cId="3399668416" sldId="268"/>
+            <ac:picMk id="15" creationId="{C48CEA95-DD84-4658-8390-9B5C8D29C9F2}"/>
+          </ac:picMkLst>
+        </pc:picChg>
+        <pc:picChg chg="add mod">
+          <ac:chgData name="Zachary Owen" userId="d1254ce893023eb5" providerId="LiveId" clId="{5481171A-B7C3-41C8-AC9C-C25C4A57EECB}" dt="2021-05-07T01:39:46.497" v="1609" actId="931"/>
+          <ac:picMkLst>
+            <pc:docMk/>
+            <pc:sldMk cId="3399668416" sldId="268"/>
+            <ac:picMk id="17" creationId="{A3349B92-19FF-4437-BA14-472E7B88E3EE}"/>
+          </ac:picMkLst>
+        </pc:picChg>
+        <pc:picChg chg="add mod">
+          <ac:chgData name="Zachary Owen" userId="d1254ce893023eb5" providerId="LiveId" clId="{5481171A-B7C3-41C8-AC9C-C25C4A57EECB}" dt="2021-05-07T01:39:52.492" v="1610" actId="931"/>
+          <ac:picMkLst>
+            <pc:docMk/>
+            <pc:sldMk cId="3399668416" sldId="268"/>
+            <ac:picMk id="19" creationId="{04396126-D6CF-48A1-B279-1DE1B511A262}"/>
+          </ac:picMkLst>
+        </pc:picChg>
+      </pc:sldChg>
+      <pc:sldChg chg="addSp delSp modSp new mod">
+        <pc:chgData name="Zachary Owen" userId="d1254ce893023eb5" providerId="LiveId" clId="{5481171A-B7C3-41C8-AC9C-C25C4A57EECB}" dt="2021-05-07T02:05:48.305" v="2459" actId="20577"/>
+        <pc:sldMkLst>
+          <pc:docMk/>
+          <pc:sldMk cId="2067421192" sldId="269"/>
+        </pc:sldMkLst>
+        <pc:spChg chg="mod">
+          <ac:chgData name="Zachary Owen" userId="d1254ce893023eb5" providerId="LiveId" clId="{5481171A-B7C3-41C8-AC9C-C25C4A57EECB}" dt="2021-05-07T02:02:30.567" v="2377" actId="20577"/>
+          <ac:spMkLst>
+            <pc:docMk/>
+            <pc:sldMk cId="2067421192" sldId="269"/>
+            <ac:spMk id="2" creationId="{498D281F-3D16-489C-B0DC-D1BEA3665997}"/>
+          </ac:spMkLst>
+        </pc:spChg>
+        <pc:spChg chg="del">
+          <ac:chgData name="Zachary Owen" userId="d1254ce893023eb5" providerId="LiveId" clId="{5481171A-B7C3-41C8-AC9C-C25C4A57EECB}" dt="2021-05-07T01:44:19.978" v="2192"/>
+          <ac:spMkLst>
+            <pc:docMk/>
+            <pc:sldMk cId="2067421192" sldId="269"/>
+            <ac:spMk id="3" creationId="{C223B6DC-794C-4DB1-BA86-86235E339C78}"/>
+          </ac:spMkLst>
+        </pc:spChg>
+        <pc:spChg chg="del">
+          <ac:chgData name="Zachary Owen" userId="d1254ce893023eb5" providerId="LiveId" clId="{5481171A-B7C3-41C8-AC9C-C25C4A57EECB}" dt="2021-05-07T01:50:17.677" v="2366" actId="931"/>
+          <ac:spMkLst>
+            <pc:docMk/>
+            <pc:sldMk cId="2067421192" sldId="269"/>
+            <ac:spMk id="4" creationId="{9E3A806D-5994-4FDB-8BBB-46A4976A7390}"/>
+          </ac:spMkLst>
+        </pc:spChg>
+        <pc:spChg chg="add del mod">
+          <ac:chgData name="Zachary Owen" userId="d1254ce893023eb5" providerId="LiveId" clId="{5481171A-B7C3-41C8-AC9C-C25C4A57EECB}" dt="2021-05-07T01:57:06.829" v="2370" actId="27636"/>
+          <ac:spMkLst>
+            <pc:docMk/>
+            <pc:sldMk cId="2067421192" sldId="269"/>
+            <ac:spMk id="5" creationId="{1775ED7F-0239-4324-8F8A-65D0D11F4E50}"/>
+          </ac:spMkLst>
+        </pc:spChg>
+        <pc:spChg chg="del">
+          <ac:chgData name="Zachary Owen" userId="d1254ce893023eb5" providerId="LiveId" clId="{5481171A-B7C3-41C8-AC9C-C25C4A57EECB}" dt="2021-05-07T01:50:25.266" v="2367" actId="931"/>
+          <ac:spMkLst>
+            <pc:docMk/>
+            <pc:sldMk cId="2067421192" sldId="269"/>
+            <ac:spMk id="6" creationId="{11D41EB6-0336-4F69-9C1E-9E86F2967D95}"/>
+          </ac:spMkLst>
+        </pc:spChg>
+        <pc:spChg chg="add mod">
+          <ac:chgData name="Zachary Owen" userId="d1254ce893023eb5" providerId="LiveId" clId="{5481171A-B7C3-41C8-AC9C-C25C4A57EECB}" dt="2021-05-07T02:05:48.305" v="2459" actId="20577"/>
+          <ac:spMkLst>
+            <pc:docMk/>
+            <pc:sldMk cId="2067421192" sldId="269"/>
+            <ac:spMk id="7" creationId="{5EAD9029-8924-4194-8BE8-381AAABAEACB}"/>
+          </ac:spMkLst>
+        </pc:spChg>
+        <pc:spChg chg="add del mod">
+          <ac:chgData name="Zachary Owen" userId="d1254ce893023eb5" providerId="LiveId" clId="{5481171A-B7C3-41C8-AC9C-C25C4A57EECB}" dt="2021-05-07T01:44:45.654" v="2204"/>
+          <ac:spMkLst>
+            <pc:docMk/>
+            <pc:sldMk cId="2067421192" sldId="269"/>
+            <ac:spMk id="8" creationId="{44497BEB-4392-4FE8-906A-849804560A30}"/>
+          </ac:spMkLst>
+        </pc:spChg>
+        <pc:picChg chg="add mod">
+          <ac:chgData name="Zachary Owen" userId="d1254ce893023eb5" providerId="LiveId" clId="{5481171A-B7C3-41C8-AC9C-C25C4A57EECB}" dt="2021-05-07T01:50:17.677" v="2366" actId="931"/>
+          <ac:picMkLst>
+            <pc:docMk/>
+            <pc:sldMk cId="2067421192" sldId="269"/>
+            <ac:picMk id="10" creationId="{95AA9A84-DE60-4280-A3C7-BB4F6FD04958}"/>
+          </ac:picMkLst>
+        </pc:picChg>
+        <pc:picChg chg="add mod">
+          <ac:chgData name="Zachary Owen" userId="d1254ce893023eb5" providerId="LiveId" clId="{5481171A-B7C3-41C8-AC9C-C25C4A57EECB}" dt="2021-05-07T01:50:25.266" v="2367" actId="931"/>
+          <ac:picMkLst>
+            <pc:docMk/>
+            <pc:sldMk cId="2067421192" sldId="269"/>
+            <ac:picMk id="12" creationId="{F1427122-48C4-4571-8A4C-1395129AE599}"/>
+          </ac:picMkLst>
+        </pc:picChg>
+      </pc:sldChg>
+    </pc:docChg>
+  </pc:docChgLst>
   <pc:docChgLst>
     <pc:chgData name="Zachary Owen" userId="d1254ce893023eb5" providerId="LiveId" clId="{DECE0637-784D-4E06-8AF5-0B53CF0F58DA}"/>
     <pc:docChg chg="undo custSel addSld delSld modSld sldOrd">
@@ -674,7 +1034,7 @@
           <a:p>
             <a:fld id="{FA15FE41-1570-49A0-8BC6-E0CF6E67ED91}" type="datetimeFigureOut">
               <a:rPr lang="en-US" smtClean="0"/>
-              <a:t>5/5/2021</a:t>
+              <a:t>5/7/2021</a:t>
             </a:fld>
             <a:endParaRPr lang="en-US"/>
           </a:p>
@@ -872,7 +1232,7 @@
           <a:p>
             <a:fld id="{FA15FE41-1570-49A0-8BC6-E0CF6E67ED91}" type="datetimeFigureOut">
               <a:rPr lang="en-US" smtClean="0"/>
-              <a:t>5/5/2021</a:t>
+              <a:t>5/7/2021</a:t>
             </a:fld>
             <a:endParaRPr lang="en-US"/>
           </a:p>
@@ -1080,7 +1440,7 @@
           <a:p>
             <a:fld id="{FA15FE41-1570-49A0-8BC6-E0CF6E67ED91}" type="datetimeFigureOut">
               <a:rPr lang="en-US" smtClean="0"/>
-              <a:t>5/5/2021</a:t>
+              <a:t>5/7/2021</a:t>
             </a:fld>
             <a:endParaRPr lang="en-US"/>
           </a:p>
@@ -1278,7 +1638,7 @@
           <a:p>
             <a:fld id="{FA15FE41-1570-49A0-8BC6-E0CF6E67ED91}" type="datetimeFigureOut">
               <a:rPr lang="en-US" smtClean="0"/>
-              <a:t>5/5/2021</a:t>
+              <a:t>5/7/2021</a:t>
             </a:fld>
             <a:endParaRPr lang="en-US"/>
           </a:p>
@@ -1553,7 +1913,7 @@
           <a:p>
             <a:fld id="{FA15FE41-1570-49A0-8BC6-E0CF6E67ED91}" type="datetimeFigureOut">
               <a:rPr lang="en-US" smtClean="0"/>
-              <a:t>5/5/2021</a:t>
+              <a:t>5/7/2021</a:t>
             </a:fld>
             <a:endParaRPr lang="en-US"/>
           </a:p>
@@ -1818,7 +2178,7 @@
           <a:p>
             <a:fld id="{FA15FE41-1570-49A0-8BC6-E0CF6E67ED91}" type="datetimeFigureOut">
               <a:rPr lang="en-US" smtClean="0"/>
-              <a:t>5/5/2021</a:t>
+              <a:t>5/7/2021</a:t>
             </a:fld>
             <a:endParaRPr lang="en-US"/>
           </a:p>
@@ -2230,7 +2590,7 @@
           <a:p>
             <a:fld id="{FA15FE41-1570-49A0-8BC6-E0CF6E67ED91}" type="datetimeFigureOut">
               <a:rPr lang="en-US" smtClean="0"/>
-              <a:t>5/5/2021</a:t>
+              <a:t>5/7/2021</a:t>
             </a:fld>
             <a:endParaRPr lang="en-US"/>
           </a:p>
@@ -2371,7 +2731,7 @@
           <a:p>
             <a:fld id="{FA15FE41-1570-49A0-8BC6-E0CF6E67ED91}" type="datetimeFigureOut">
               <a:rPr lang="en-US" smtClean="0"/>
-              <a:t>5/5/2021</a:t>
+              <a:t>5/7/2021</a:t>
             </a:fld>
             <a:endParaRPr lang="en-US"/>
           </a:p>
@@ -2484,7 +2844,7 @@
           <a:p>
             <a:fld id="{FA15FE41-1570-49A0-8BC6-E0CF6E67ED91}" type="datetimeFigureOut">
               <a:rPr lang="en-US" smtClean="0"/>
-              <a:t>5/5/2021</a:t>
+              <a:t>5/7/2021</a:t>
             </a:fld>
             <a:endParaRPr lang="en-US"/>
           </a:p>
@@ -2795,7 +3155,7 @@
           <a:p>
             <a:fld id="{FA15FE41-1570-49A0-8BC6-E0CF6E67ED91}" type="datetimeFigureOut">
               <a:rPr lang="en-US" smtClean="0"/>
-              <a:t>5/5/2021</a:t>
+              <a:t>5/7/2021</a:t>
             </a:fld>
             <a:endParaRPr lang="en-US"/>
           </a:p>
@@ -3083,7 +3443,7 @@
           <a:p>
             <a:fld id="{FA15FE41-1570-49A0-8BC6-E0CF6E67ED91}" type="datetimeFigureOut">
               <a:rPr lang="en-US" smtClean="0"/>
-              <a:t>5/5/2021</a:t>
+              <a:t>5/7/2021</a:t>
             </a:fld>
             <a:endParaRPr lang="en-US"/>
           </a:p>
@@ -3351,7 +3711,7 @@
           <a:p>
             <a:fld id="{FA15FE41-1570-49A0-8BC6-E0CF6E67ED91}" type="datetimeFigureOut">
               <a:rPr lang="en-US" smtClean="0"/>
-              <a:t>5/5/2021</a:t>
+              <a:t>5/7/2021</a:t>
             </a:fld>
             <a:endParaRPr lang="en-US"/>
           </a:p>
@@ -3839,13 +4199,13 @@
   <p:clrMapOvr>
     <a:masterClrMapping/>
   </p:clrMapOvr>
-  <mc:AlternateContent xmlns:mc="http://schemas.openxmlformats.org/markup-compatibility/2006">
-    <mc:Choice xmlns:p14="http://schemas.microsoft.com/office/powerpoint/2010/main" Requires="p14">
+  <mc:AlternateContent xmlns:mc="http://schemas.openxmlformats.org/markup-compatibility/2006" xmlns:p14="http://schemas.microsoft.com/office/powerpoint/2010/main">
+    <mc:Choice Requires="p14">
       <p:transition spd="med" p14:dur="700">
         <p:fade/>
       </p:transition>
     </mc:Choice>
-    <mc:Fallback>
+    <mc:Fallback xmlns="">
       <p:transition spd="med">
         <p:fade/>
       </p:transition>
@@ -3876,7 +4236,7 @@
           <p:cNvPr id="2" name="Title 1">
             <a:extLst>
               <a:ext uri="{FF2B5EF4-FFF2-40B4-BE49-F238E27FC236}">
-                <a16:creationId xmlns:a16="http://schemas.microsoft.com/office/drawing/2014/main" id="{CF2F4417-6ADD-4BE7-9C57-95BA49F8A6AF}"/>
+                <a16:creationId xmlns:a16="http://schemas.microsoft.com/office/drawing/2014/main" id="{9465B42F-D2D6-4EC1-836D-661E95F38FAA}"/>
               </a:ext>
             </a:extLst>
           </p:cNvPr>
@@ -3894,7 +4254,7 @@
           <a:p>
             <a:r>
               <a:rPr lang="en-US" dirty="0"/>
-              <a:t>Population Density</a:t>
+              <a:t> </a:t>
             </a:r>
           </a:p>
         </p:txBody>
@@ -3904,7 +4264,7 @@
           <p:cNvPr id="3" name="Text Placeholder 2">
             <a:extLst>
               <a:ext uri="{FF2B5EF4-FFF2-40B4-BE49-F238E27FC236}">
-                <a16:creationId xmlns:a16="http://schemas.microsoft.com/office/drawing/2014/main" id="{4297D99A-3B39-46D0-88FD-5F62849FBEA2}"/>
+                <a16:creationId xmlns:a16="http://schemas.microsoft.com/office/drawing/2014/main" id="{7F06FBF8-4F4C-4401-B430-DDA78954DA72}"/>
               </a:ext>
             </a:extLst>
           </p:cNvPr>
@@ -3915,24 +4275,66 @@
             <p:ph type="body" idx="1"/>
           </p:nvPr>
         </p:nvSpPr>
-        <p:spPr/>
-        <p:txBody>
-          <a:bodyPr/>
-          <a:lstStyle/>
-          <a:p>
-            <a:r>
-              <a:rPr lang="en-US" dirty="0"/>
-              <a:t>Per quartile</a:t>
-            </a:r>
-          </a:p>
-        </p:txBody>
-      </p:sp>
+        <p:spPr>
+          <a:xfrm>
+            <a:off x="839788" y="365125"/>
+            <a:ext cx="5157787" cy="2139950"/>
+          </a:xfrm>
+        </p:spPr>
+        <p:txBody>
+          <a:bodyPr>
+            <a:normAutofit fontScale="85000" lnSpcReduction="20000"/>
+          </a:bodyPr>
+          <a:lstStyle/>
+          <a:p>
+            <a:r>
+              <a:rPr lang="en-US" b="0" dirty="0"/>
+              <a:t>The next variable to be analyzed was the Vaccination Progress compared to the Percent of Health Expenditure from the Private Sector. This was a very interesting set of data as it suggested that as the percentage of health expenditure in the private sector goes down, the rate of vaccinations go up. This suggests that public healthcare increases the rate of vaccinations.</a:t>
+            </a:r>
+          </a:p>
+        </p:txBody>
+      </p:sp>
+      <p:pic>
+        <p:nvPicPr>
+          <p:cNvPr id="8" name="Content Placeholder 7">
+            <a:extLst>
+              <a:ext uri="{FF2B5EF4-FFF2-40B4-BE49-F238E27FC236}">
+                <a16:creationId xmlns:a16="http://schemas.microsoft.com/office/drawing/2014/main" id="{49ED9D2D-C1C1-49D8-BF73-BB8E07DA0315}"/>
+              </a:ext>
+            </a:extLst>
+          </p:cNvPr>
+          <p:cNvPicPr>
+            <a:picLocks noGrp="1" noChangeAspect="1"/>
+          </p:cNvPicPr>
+          <p:nvPr>
+            <p:ph sz="half" idx="2"/>
+          </p:nvPr>
+        </p:nvPicPr>
+        <p:blipFill>
+          <a:blip r:embed="rId2">
+            <a:extLst>
+              <a:ext uri="{28A0092B-C50C-407E-A947-70E740481C1C}">
+                <a14:useLocalDpi xmlns:a14="http://schemas.microsoft.com/office/drawing/2010/main" val="0"/>
+              </a:ext>
+            </a:extLst>
+          </a:blip>
+          <a:stretch>
+            <a:fillRect/>
+          </a:stretch>
+        </p:blipFill>
+        <p:spPr>
+          <a:xfrm>
+            <a:off x="839788" y="2628107"/>
+            <a:ext cx="5157787" cy="3438524"/>
+          </a:xfrm>
+        </p:spPr>
+      </p:pic>
       <p:sp>
         <p:nvSpPr>
           <p:cNvPr id="5" name="Text Placeholder 4">
             <a:extLst>
               <a:ext uri="{FF2B5EF4-FFF2-40B4-BE49-F238E27FC236}">
-                <a16:creationId xmlns:a16="http://schemas.microsoft.com/office/drawing/2014/main" id="{B865C62A-5914-4786-B24E-EE3631EFAFCC}"/>
+                <a16:creationId xmlns:a16="http://schemas.microsoft.com/office/drawing/2014/main" id="{6AAA2E70-BD26-4F45-A1DC-52D3E8F764FE}"/>
               </a:ext>
             </a:extLst>
           </p:cNvPr>
@@ -3943,14 +4345,21 @@
             <p:ph type="body" sz="quarter" idx="3"/>
           </p:nvPr>
         </p:nvSpPr>
-        <p:spPr/>
-        <p:txBody>
-          <a:bodyPr/>
-          <a:lstStyle/>
-          <a:p>
-            <a:r>
-              <a:rPr lang="en-US" dirty="0"/>
-              <a:t>Linear Regression across all countries</a:t>
+        <p:spPr>
+          <a:xfrm>
+            <a:off x="6172200" y="365125"/>
+            <a:ext cx="5183188" cy="889517"/>
+          </a:xfrm>
+        </p:spPr>
+        <p:txBody>
+          <a:bodyPr>
+            <a:normAutofit fontScale="85000" lnSpcReduction="20000"/>
+          </a:bodyPr>
+          <a:lstStyle/>
+          <a:p>
+            <a:r>
+              <a:rPr lang="en-US" b="0" dirty="0"/>
+              <a:t>This data failed to reject the null hypothesis, thus there is no statistical difference between the data in the different quartiles.</a:t>
             </a:r>
           </a:p>
         </p:txBody>
@@ -3960,7 +4369,7 @@
           <p:cNvPr id="10" name="Content Placeholder 9">
             <a:extLst>
               <a:ext uri="{FF2B5EF4-FFF2-40B4-BE49-F238E27FC236}">
-                <a16:creationId xmlns:a16="http://schemas.microsoft.com/office/drawing/2014/main" id="{45DF83FE-FC71-4661-9C6B-7863524CCB70}"/>
+                <a16:creationId xmlns:a16="http://schemas.microsoft.com/office/drawing/2014/main" id="{042C3FEF-9FCC-4F0E-987C-5DC75AC5886A}"/>
               </a:ext>
             </a:extLst>
           </p:cNvPr>
@@ -3972,7 +4381,7 @@
           </p:nvPr>
         </p:nvPicPr>
         <p:blipFill>
-          <a:blip r:embed="rId2">
+          <a:blip r:embed="rId3">
             <a:extLst>
               <a:ext uri="{28A0092B-C50C-407E-A947-70E740481C1C}">
                 <a14:useLocalDpi xmlns:a14="http://schemas.microsoft.com/office/drawing/2010/main" val="0"/>
@@ -3990,58 +4399,23 @@
           </a:xfrm>
         </p:spPr>
       </p:pic>
-      <p:pic>
-        <p:nvPicPr>
-          <p:cNvPr id="14" name="Content Placeholder 13">
-            <a:extLst>
-              <a:ext uri="{FF2B5EF4-FFF2-40B4-BE49-F238E27FC236}">
-                <a16:creationId xmlns:a16="http://schemas.microsoft.com/office/drawing/2014/main" id="{166FF831-7E78-435D-AFA5-983C435BDDDD}"/>
-              </a:ext>
-            </a:extLst>
-          </p:cNvPr>
-          <p:cNvPicPr>
-            <a:picLocks noGrp="1" noChangeAspect="1"/>
-          </p:cNvPicPr>
-          <p:nvPr>
-            <p:ph sz="half" idx="2"/>
-          </p:nvPr>
-        </p:nvPicPr>
-        <p:blipFill>
-          <a:blip r:embed="rId3">
-            <a:extLst>
-              <a:ext uri="{28A0092B-C50C-407E-A947-70E740481C1C}">
-                <a14:useLocalDpi xmlns:a14="http://schemas.microsoft.com/office/drawing/2010/main" val="0"/>
-              </a:ext>
-            </a:extLst>
-          </a:blip>
-          <a:stretch>
-            <a:fillRect/>
-          </a:stretch>
-        </p:blipFill>
-        <p:spPr>
-          <a:xfrm>
-            <a:off x="839788" y="2628107"/>
-            <a:ext cx="5157787" cy="3438524"/>
-          </a:xfrm>
-        </p:spPr>
-      </p:pic>
     </p:spTree>
     <p:extLst>
       <p:ext uri="{BB962C8B-B14F-4D97-AF65-F5344CB8AC3E}">
-        <p14:creationId xmlns:p14="http://schemas.microsoft.com/office/powerpoint/2010/main" val="245820475"/>
+        <p14:creationId xmlns:p14="http://schemas.microsoft.com/office/powerpoint/2010/main" val="1138257485"/>
       </p:ext>
     </p:extLst>
   </p:cSld>
   <p:clrMapOvr>
     <a:masterClrMapping/>
   </p:clrMapOvr>
-  <mc:AlternateContent xmlns:mc="http://schemas.openxmlformats.org/markup-compatibility/2006">
-    <mc:Choice xmlns:p14="http://schemas.microsoft.com/office/powerpoint/2010/main" Requires="p14">
+  <mc:AlternateContent xmlns:mc="http://schemas.openxmlformats.org/markup-compatibility/2006" xmlns:p14="http://schemas.microsoft.com/office/powerpoint/2010/main">
+    <mc:Choice Requires="p14">
       <p:transition spd="med" p14:dur="700">
         <p:fade/>
       </p:transition>
     </mc:Choice>
-    <mc:Fallback>
+    <mc:Fallback xmlns="">
       <p:transition spd="med">
         <p:fade/>
       </p:transition>
@@ -4072,7 +4446,7 @@
           <p:cNvPr id="2" name="Title 1">
             <a:extLst>
               <a:ext uri="{FF2B5EF4-FFF2-40B4-BE49-F238E27FC236}">
-                <a16:creationId xmlns:a16="http://schemas.microsoft.com/office/drawing/2014/main" id="{30815FA2-03BF-442A-8BD1-8201FC7B92A4}"/>
+                <a16:creationId xmlns:a16="http://schemas.microsoft.com/office/drawing/2014/main" id="{CF2F4417-6ADD-4BE7-9C57-95BA49F8A6AF}"/>
               </a:ext>
             </a:extLst>
           </p:cNvPr>
@@ -4090,68 +4464,168 @@
           <a:p>
             <a:r>
               <a:rPr lang="en-US" dirty="0"/>
-              <a:t>Discuss Findings	</a:t>
-            </a:r>
-          </a:p>
-        </p:txBody>
-      </p:sp>
-      <p:sp>
-        <p:nvSpPr>
-          <p:cNvPr id="5" name="Content Placeholder 4">
-            <a:extLst>
-              <a:ext uri="{FF2B5EF4-FFF2-40B4-BE49-F238E27FC236}">
-                <a16:creationId xmlns:a16="http://schemas.microsoft.com/office/drawing/2014/main" id="{DE5518ED-C692-4AB4-968A-DB790776D463}"/>
-              </a:ext>
-            </a:extLst>
-          </p:cNvPr>
-          <p:cNvSpPr>
-            <a:spLocks noGrp="1"/>
-          </p:cNvSpPr>
-          <p:nvPr>
-            <p:ph idx="1"/>
-          </p:nvPr>
-        </p:nvSpPr>
-        <p:spPr/>
-        <p:txBody>
-          <a:bodyPr/>
-          <a:lstStyle/>
-          <a:p>
-            <a:r>
-              <a:rPr lang="en-US" dirty="0"/>
-              <a:t>GDP not as impactful as initially expected</a:t>
-            </a:r>
-          </a:p>
-          <a:p>
-            <a:r>
-              <a:rPr lang="en-US" dirty="0"/>
-              <a:t>Population Density had highest correlation</a:t>
-            </a:r>
-          </a:p>
-          <a:p>
-            <a:r>
-              <a:rPr lang="en-US" dirty="0"/>
-              <a:t>Private Healthcare Expenditure</a:t>
-            </a:r>
-          </a:p>
-        </p:txBody>
-      </p:sp>
+              <a:t> </a:t>
+            </a:r>
+          </a:p>
+        </p:txBody>
+      </p:sp>
+      <p:sp>
+        <p:nvSpPr>
+          <p:cNvPr id="3" name="Text Placeholder 2">
+            <a:extLst>
+              <a:ext uri="{FF2B5EF4-FFF2-40B4-BE49-F238E27FC236}">
+                <a16:creationId xmlns:a16="http://schemas.microsoft.com/office/drawing/2014/main" id="{4297D99A-3B39-46D0-88FD-5F62849FBEA2}"/>
+              </a:ext>
+            </a:extLst>
+          </p:cNvPr>
+          <p:cNvSpPr>
+            <a:spLocks noGrp="1"/>
+          </p:cNvSpPr>
+          <p:nvPr>
+            <p:ph type="body" idx="1"/>
+          </p:nvPr>
+        </p:nvSpPr>
+        <p:spPr>
+          <a:xfrm>
+            <a:off x="839788" y="457200"/>
+            <a:ext cx="5157787" cy="1223963"/>
+          </a:xfrm>
+        </p:spPr>
+        <p:txBody>
+          <a:bodyPr>
+            <a:normAutofit fontScale="92500" lnSpcReduction="10000"/>
+          </a:bodyPr>
+          <a:lstStyle/>
+          <a:p>
+            <a:r>
+              <a:rPr lang="en-US" b="0" dirty="0"/>
+              <a:t>The next variable to be analyzed was the Vaccination Progress compared to the Population Density. This was the dataset with the highest statistical correlation.</a:t>
+            </a:r>
+          </a:p>
+        </p:txBody>
+      </p:sp>
+      <p:sp>
+        <p:nvSpPr>
+          <p:cNvPr id="5" name="Text Placeholder 4">
+            <a:extLst>
+              <a:ext uri="{FF2B5EF4-FFF2-40B4-BE49-F238E27FC236}">
+                <a16:creationId xmlns:a16="http://schemas.microsoft.com/office/drawing/2014/main" id="{B865C62A-5914-4786-B24E-EE3631EFAFCC}"/>
+              </a:ext>
+            </a:extLst>
+          </p:cNvPr>
+          <p:cNvSpPr>
+            <a:spLocks noGrp="1"/>
+          </p:cNvSpPr>
+          <p:nvPr>
+            <p:ph type="body" sz="quarter" idx="3"/>
+          </p:nvPr>
+        </p:nvSpPr>
+        <p:spPr>
+          <a:xfrm>
+            <a:off x="6172200" y="542261"/>
+            <a:ext cx="5183188" cy="935666"/>
+          </a:xfrm>
+        </p:spPr>
+        <p:txBody>
+          <a:bodyPr>
+            <a:normAutofit fontScale="92500" lnSpcReduction="10000"/>
+          </a:bodyPr>
+          <a:lstStyle/>
+          <a:p>
+            <a:r>
+              <a:rPr lang="en-US" b="0" dirty="0"/>
+              <a:t>This data rejected the null hypothesis, suggesting that there is a statistical difference between the quartiles.</a:t>
+            </a:r>
+          </a:p>
+        </p:txBody>
+      </p:sp>
+      <p:pic>
+        <p:nvPicPr>
+          <p:cNvPr id="10" name="Content Placeholder 9">
+            <a:extLst>
+              <a:ext uri="{FF2B5EF4-FFF2-40B4-BE49-F238E27FC236}">
+                <a16:creationId xmlns:a16="http://schemas.microsoft.com/office/drawing/2014/main" id="{45DF83FE-FC71-4661-9C6B-7863524CCB70}"/>
+              </a:ext>
+            </a:extLst>
+          </p:cNvPr>
+          <p:cNvPicPr>
+            <a:picLocks noGrp="1" noChangeAspect="1"/>
+          </p:cNvPicPr>
+          <p:nvPr>
+            <p:ph sz="quarter" idx="4"/>
+          </p:nvPr>
+        </p:nvPicPr>
+        <p:blipFill>
+          <a:blip r:embed="rId2">
+            <a:extLst>
+              <a:ext uri="{28A0092B-C50C-407E-A947-70E740481C1C}">
+                <a14:useLocalDpi xmlns:a14="http://schemas.microsoft.com/office/drawing/2010/main" val="0"/>
+              </a:ext>
+            </a:extLst>
+          </a:blip>
+          <a:stretch>
+            <a:fillRect/>
+          </a:stretch>
+        </p:blipFill>
+        <p:spPr>
+          <a:xfrm>
+            <a:off x="6172200" y="2619640"/>
+            <a:ext cx="5183188" cy="3455458"/>
+          </a:xfrm>
+        </p:spPr>
+      </p:pic>
+      <p:pic>
+        <p:nvPicPr>
+          <p:cNvPr id="14" name="Content Placeholder 13">
+            <a:extLst>
+              <a:ext uri="{FF2B5EF4-FFF2-40B4-BE49-F238E27FC236}">
+                <a16:creationId xmlns:a16="http://schemas.microsoft.com/office/drawing/2014/main" id="{166FF831-7E78-435D-AFA5-983C435BDDDD}"/>
+              </a:ext>
+            </a:extLst>
+          </p:cNvPr>
+          <p:cNvPicPr>
+            <a:picLocks noGrp="1" noChangeAspect="1"/>
+          </p:cNvPicPr>
+          <p:nvPr>
+            <p:ph sz="half" idx="2"/>
+          </p:nvPr>
+        </p:nvPicPr>
+        <p:blipFill>
+          <a:blip r:embed="rId3">
+            <a:extLst>
+              <a:ext uri="{28A0092B-C50C-407E-A947-70E740481C1C}">
+                <a14:useLocalDpi xmlns:a14="http://schemas.microsoft.com/office/drawing/2010/main" val="0"/>
+              </a:ext>
+            </a:extLst>
+          </a:blip>
+          <a:stretch>
+            <a:fillRect/>
+          </a:stretch>
+        </p:blipFill>
+        <p:spPr>
+          <a:xfrm>
+            <a:off x="839788" y="2628107"/>
+            <a:ext cx="5157787" cy="3438524"/>
+          </a:xfrm>
+        </p:spPr>
+      </p:pic>
     </p:spTree>
     <p:extLst>
       <p:ext uri="{BB962C8B-B14F-4D97-AF65-F5344CB8AC3E}">
-        <p14:creationId xmlns:p14="http://schemas.microsoft.com/office/powerpoint/2010/main" val="1124292129"/>
+        <p14:creationId xmlns:p14="http://schemas.microsoft.com/office/powerpoint/2010/main" val="245820475"/>
       </p:ext>
     </p:extLst>
   </p:cSld>
   <p:clrMapOvr>
     <a:masterClrMapping/>
   </p:clrMapOvr>
-  <mc:AlternateContent xmlns:mc="http://schemas.openxmlformats.org/markup-compatibility/2006">
-    <mc:Choice xmlns:p14="http://schemas.microsoft.com/office/powerpoint/2010/main" Requires="p14">
+  <mc:AlternateContent xmlns:mc="http://schemas.openxmlformats.org/markup-compatibility/2006" xmlns:p14="http://schemas.microsoft.com/office/powerpoint/2010/main">
+    <mc:Choice Requires="p14">
       <p:transition spd="med" p14:dur="700">
         <p:fade/>
       </p:transition>
     </mc:Choice>
-    <mc:Fallback>
+    <mc:Fallback xmlns="">
       <p:transition spd="med">
         <p:fade/>
       </p:transition>
@@ -4182,7 +4656,7 @@
           <p:cNvPr id="2" name="Title 1">
             <a:extLst>
               <a:ext uri="{FF2B5EF4-FFF2-40B4-BE49-F238E27FC236}">
-                <a16:creationId xmlns:a16="http://schemas.microsoft.com/office/drawing/2014/main" id="{72C13216-17B7-4511-86FF-7E1C5386C42A}"/>
+                <a16:creationId xmlns:a16="http://schemas.microsoft.com/office/drawing/2014/main" id="{30815FA2-03BF-442A-8BD1-8201FC7B92A4}"/>
               </a:ext>
             </a:extLst>
           </p:cNvPr>
@@ -4200,17 +4674,17 @@
           <a:p>
             <a:r>
               <a:rPr lang="en-US" dirty="0"/>
-              <a:t>Post-Mortem</a:t>
-            </a:r>
-          </a:p>
-        </p:txBody>
-      </p:sp>
-      <p:sp>
-        <p:nvSpPr>
-          <p:cNvPr id="3" name="Content Placeholder 2">
-            <a:extLst>
-              <a:ext uri="{FF2B5EF4-FFF2-40B4-BE49-F238E27FC236}">
-                <a16:creationId xmlns:a16="http://schemas.microsoft.com/office/drawing/2014/main" id="{37BC5CEB-47EF-47C0-A6F6-AB2320CCE3A5}"/>
+              <a:t>Discuss Findings	</a:t>
+            </a:r>
+          </a:p>
+        </p:txBody>
+      </p:sp>
+      <p:sp>
+        <p:nvSpPr>
+          <p:cNvPr id="5" name="Content Placeholder 4">
+            <a:extLst>
+              <a:ext uri="{FF2B5EF4-FFF2-40B4-BE49-F238E27FC236}">
+                <a16:creationId xmlns:a16="http://schemas.microsoft.com/office/drawing/2014/main" id="{DE5518ED-C692-4AB4-968A-DB790776D463}"/>
               </a:ext>
             </a:extLst>
           </p:cNvPr>
@@ -4228,13 +4702,19 @@
           <a:p>
             <a:r>
               <a:rPr lang="en-US" dirty="0"/>
-              <a:t>Time difficulty with the reporting of data</a:t>
+              <a:t>GDP not as impactful as initially expected</a:t>
             </a:r>
           </a:p>
           <a:p>
             <a:r>
               <a:rPr lang="en-US" dirty="0"/>
-              <a:t>With more time use the newly incoming census data to look at poverty rate as a factor </a:t>
+              <a:t>Population Density had highest correlation</a:t>
+            </a:r>
+          </a:p>
+          <a:p>
+            <a:r>
+              <a:rPr lang="en-US" dirty="0"/>
+              <a:t>Private Healthcare Expenditure</a:t>
             </a:r>
           </a:p>
         </p:txBody>
@@ -4242,20 +4722,20 @@
     </p:spTree>
     <p:extLst>
       <p:ext uri="{BB962C8B-B14F-4D97-AF65-F5344CB8AC3E}">
-        <p14:creationId xmlns:p14="http://schemas.microsoft.com/office/powerpoint/2010/main" val="2873331056"/>
+        <p14:creationId xmlns:p14="http://schemas.microsoft.com/office/powerpoint/2010/main" val="1124292129"/>
       </p:ext>
     </p:extLst>
   </p:cSld>
   <p:clrMapOvr>
     <a:masterClrMapping/>
   </p:clrMapOvr>
-  <mc:AlternateContent xmlns:mc="http://schemas.openxmlformats.org/markup-compatibility/2006">
-    <mc:Choice xmlns:p14="http://schemas.microsoft.com/office/powerpoint/2010/main" Requires="p14">
+  <mc:AlternateContent xmlns:mc="http://schemas.openxmlformats.org/markup-compatibility/2006" xmlns:p14="http://schemas.microsoft.com/office/powerpoint/2010/main">
+    <mc:Choice Requires="p14">
       <p:transition spd="med" p14:dur="700">
         <p:fade/>
       </p:transition>
     </mc:Choice>
-    <mc:Fallback>
+    <mc:Fallback xmlns="">
       <p:transition spd="med">
         <p:fade/>
       </p:transition>
@@ -4286,6 +4766,110 @@
           <p:cNvPr id="2" name="Title 1">
             <a:extLst>
               <a:ext uri="{FF2B5EF4-FFF2-40B4-BE49-F238E27FC236}">
+                <a16:creationId xmlns:a16="http://schemas.microsoft.com/office/drawing/2014/main" id="{72C13216-17B7-4511-86FF-7E1C5386C42A}"/>
+              </a:ext>
+            </a:extLst>
+          </p:cNvPr>
+          <p:cNvSpPr>
+            <a:spLocks noGrp="1"/>
+          </p:cNvSpPr>
+          <p:nvPr>
+            <p:ph type="title"/>
+          </p:nvPr>
+        </p:nvSpPr>
+        <p:spPr/>
+        <p:txBody>
+          <a:bodyPr/>
+          <a:lstStyle/>
+          <a:p>
+            <a:r>
+              <a:rPr lang="en-US" dirty="0"/>
+              <a:t>Post-Mortem</a:t>
+            </a:r>
+          </a:p>
+        </p:txBody>
+      </p:sp>
+      <p:sp>
+        <p:nvSpPr>
+          <p:cNvPr id="3" name="Content Placeholder 2">
+            <a:extLst>
+              <a:ext uri="{FF2B5EF4-FFF2-40B4-BE49-F238E27FC236}">
+                <a16:creationId xmlns:a16="http://schemas.microsoft.com/office/drawing/2014/main" id="{37BC5CEB-47EF-47C0-A6F6-AB2320CCE3A5}"/>
+              </a:ext>
+            </a:extLst>
+          </p:cNvPr>
+          <p:cNvSpPr>
+            <a:spLocks noGrp="1"/>
+          </p:cNvSpPr>
+          <p:nvPr>
+            <p:ph idx="1"/>
+          </p:nvPr>
+        </p:nvSpPr>
+        <p:spPr/>
+        <p:txBody>
+          <a:bodyPr/>
+          <a:lstStyle/>
+          <a:p>
+            <a:r>
+              <a:rPr lang="en-US" dirty="0"/>
+              <a:t>Time difficulty with the reporting of data</a:t>
+            </a:r>
+          </a:p>
+          <a:p>
+            <a:r>
+              <a:rPr lang="en-US" dirty="0"/>
+              <a:t>With more time use the newly incoming census data to look at poverty rate as a factor </a:t>
+            </a:r>
+          </a:p>
+        </p:txBody>
+      </p:sp>
+    </p:spTree>
+    <p:extLst>
+      <p:ext uri="{BB962C8B-B14F-4D97-AF65-F5344CB8AC3E}">
+        <p14:creationId xmlns:p14="http://schemas.microsoft.com/office/powerpoint/2010/main" val="2873331056"/>
+      </p:ext>
+    </p:extLst>
+  </p:cSld>
+  <p:clrMapOvr>
+    <a:masterClrMapping/>
+  </p:clrMapOvr>
+  <mc:AlternateContent xmlns:mc="http://schemas.openxmlformats.org/markup-compatibility/2006" xmlns:p14="http://schemas.microsoft.com/office/powerpoint/2010/main">
+    <mc:Choice Requires="p14">
+      <p:transition spd="med" p14:dur="700">
+        <p:fade/>
+      </p:transition>
+    </mc:Choice>
+    <mc:Fallback xmlns="">
+      <p:transition spd="med">
+        <p:fade/>
+      </p:transition>
+    </mc:Fallback>
+  </mc:AlternateContent>
+</p:sld>
+</file>
+
+<file path=ppt/slides/slide14.xml><?xml version="1.0" encoding="utf-8"?>
+<p:sld xmlns:a="http://schemas.openxmlformats.org/drawingml/2006/main" xmlns:r="http://schemas.openxmlformats.org/officeDocument/2006/relationships" xmlns:p="http://schemas.openxmlformats.org/presentationml/2006/main">
+  <p:cSld>
+    <p:spTree>
+      <p:nvGrpSpPr>
+        <p:cNvPr id="1" name=""/>
+        <p:cNvGrpSpPr/>
+        <p:nvPr/>
+      </p:nvGrpSpPr>
+      <p:grpSpPr>
+        <a:xfrm>
+          <a:off x="0" y="0"/>
+          <a:ext cx="0" cy="0"/>
+          <a:chOff x="0" y="0"/>
+          <a:chExt cx="0" cy="0"/>
+        </a:xfrm>
+      </p:grpSpPr>
+      <p:sp>
+        <p:nvSpPr>
+          <p:cNvPr id="2" name="Title 1">
+            <a:extLst>
+              <a:ext uri="{FF2B5EF4-FFF2-40B4-BE49-F238E27FC236}">
                 <a16:creationId xmlns:a16="http://schemas.microsoft.com/office/drawing/2014/main" id="{6BE8BB0F-361F-4019-95E8-2B2388D3A89E}"/>
               </a:ext>
             </a:extLst>
@@ -4350,13 +4934,13 @@
   <p:clrMapOvr>
     <a:masterClrMapping/>
   </p:clrMapOvr>
-  <mc:AlternateContent xmlns:mc="http://schemas.openxmlformats.org/markup-compatibility/2006">
-    <mc:Choice xmlns:p14="http://schemas.microsoft.com/office/powerpoint/2010/main" Requires="p14">
+  <mc:AlternateContent xmlns:mc="http://schemas.openxmlformats.org/markup-compatibility/2006" xmlns:p14="http://schemas.microsoft.com/office/powerpoint/2010/main">
+    <mc:Choice Requires="p14">
       <p:transition spd="med" p14:dur="700">
         <p:fade/>
       </p:transition>
     </mc:Choice>
-    <mc:Fallback>
+    <mc:Fallback xmlns="">
       <p:transition spd="med">
         <p:fade/>
       </p:transition>
@@ -4482,13 +5066,13 @@
   <p:clrMapOvr>
     <a:masterClrMapping/>
   </p:clrMapOvr>
-  <mc:AlternateContent xmlns:mc="http://schemas.openxmlformats.org/markup-compatibility/2006">
-    <mc:Choice xmlns:p14="http://schemas.microsoft.com/office/powerpoint/2010/main" Requires="p14">
+  <mc:AlternateContent xmlns:mc="http://schemas.openxmlformats.org/markup-compatibility/2006" xmlns:p14="http://schemas.microsoft.com/office/powerpoint/2010/main">
+    <mc:Choice Requires="p14">
       <p:transition spd="med" p14:dur="700">
         <p:fade/>
       </p:transition>
     </mc:Choice>
-    <mc:Fallback>
+    <mc:Fallback xmlns="">
       <p:transition spd="med">
         <p:fade/>
       </p:transition>
@@ -4566,7 +5150,7 @@
           <a:p>
             <a:r>
               <a:rPr lang="en-US" dirty="0"/>
-              <a:t>Kaggle CSV cribbed from the Our World in Data </a:t>
+              <a:t>Kaggle CSV of world vaccination progress cribbed from the Our World in Data </a:t>
             </a:r>
             <a:r>
               <a:rPr lang="en-US" dirty="0" err="1"/>
@@ -4614,7 +5198,7 @@
           <a:p>
             <a:r>
               <a:rPr lang="en-US" dirty="0"/>
-              <a:t>World Bank API</a:t>
+              <a:t>Pulled from the World Bank API</a:t>
             </a:r>
           </a:p>
           <a:p>
@@ -4633,13 +5217,13 @@
   <p:clrMapOvr>
     <a:masterClrMapping/>
   </p:clrMapOvr>
-  <mc:AlternateContent xmlns:mc="http://schemas.openxmlformats.org/markup-compatibility/2006">
-    <mc:Choice xmlns:p14="http://schemas.microsoft.com/office/powerpoint/2010/main" Requires="p14">
+  <mc:AlternateContent xmlns:mc="http://schemas.openxmlformats.org/markup-compatibility/2006" xmlns:p14="http://schemas.microsoft.com/office/powerpoint/2010/main">
+    <mc:Choice Requires="p14">
       <p:transition spd="med" p14:dur="700">
         <p:fade/>
       </p:transition>
     </mc:Choice>
-    <mc:Fallback>
+    <mc:Fallback xmlns="">
       <p:transition spd="med">
         <p:fade/>
       </p:transition>
@@ -4709,13 +5293,13 @@
             <a:spLocks noGrp="1"/>
           </p:cNvSpPr>
           <p:nvPr>
-            <p:ph sz="half" idx="1"/>
+            <p:ph idx="1"/>
           </p:nvPr>
         </p:nvSpPr>
         <p:spPr>
           <a:xfrm>
-            <a:off x="838200" y="3246539"/>
-            <a:ext cx="5181600" cy="2930424"/>
+            <a:off x="838200" y="1382233"/>
+            <a:ext cx="10515600" cy="4794730"/>
           </a:xfrm>
         </p:spPr>
         <p:txBody>
@@ -4724,36 +5308,66 @@
           <a:p>
             <a:r>
               <a:rPr lang="en-US" dirty="0"/>
-              <a:t>Cleaning the CSV</a:t>
-            </a:r>
-          </a:p>
-        </p:txBody>
-      </p:sp>
-      <p:sp>
-        <p:nvSpPr>
-          <p:cNvPr id="4" name="Content Placeholder 3">
-            <a:extLst>
-              <a:ext uri="{FF2B5EF4-FFF2-40B4-BE49-F238E27FC236}">
-                <a16:creationId xmlns:a16="http://schemas.microsoft.com/office/drawing/2014/main" id="{827C9768-D987-454C-B4F5-3B2C0480DB3E}"/>
-              </a:ext>
-            </a:extLst>
-          </p:cNvPr>
-          <p:cNvSpPr>
-            <a:spLocks noGrp="1"/>
-          </p:cNvSpPr>
-          <p:nvPr>
-            <p:ph sz="half" idx="2"/>
-          </p:nvPr>
-        </p:nvSpPr>
-        <p:spPr/>
-        <p:txBody>
-          <a:bodyPr/>
-          <a:lstStyle/>
-          <a:p>
-            <a:endParaRPr lang="en-US"/>
-          </a:p>
-        </p:txBody>
-      </p:sp>
+              <a:t>A CSV was pulled containing data cribbed from the Our World in Data </a:t>
+            </a:r>
+            <a:r>
+              <a:rPr lang="en-US" dirty="0" err="1"/>
+              <a:t>Github</a:t>
+            </a:r>
+            <a:r>
+              <a:rPr lang="en-US" dirty="0"/>
+              <a:t> Repository</a:t>
+            </a:r>
+          </a:p>
+          <a:p>
+            <a:r>
+              <a:rPr lang="en-US" dirty="0"/>
+              <a:t>The data was grouped by ISO Code, and aggregated by the Total Vaccinations and People Fully Vaccinated Per Hundred</a:t>
+            </a:r>
+          </a:p>
+          <a:p>
+            <a:r>
+              <a:rPr lang="en-US" dirty="0"/>
+              <a:t>The data of any countries that did not have any data in the People Fully Vaccinated Per Hundred column was dropped</a:t>
+            </a:r>
+          </a:p>
+        </p:txBody>
+      </p:sp>
+      <p:pic>
+        <p:nvPicPr>
+          <p:cNvPr id="6" name="Content Placeholder 5">
+            <a:extLst>
+              <a:ext uri="{FF2B5EF4-FFF2-40B4-BE49-F238E27FC236}">
+                <a16:creationId xmlns:a16="http://schemas.microsoft.com/office/drawing/2014/main" id="{CBC58375-A09B-44D4-A2E0-6A108D396C5B}"/>
+              </a:ext>
+            </a:extLst>
+          </p:cNvPr>
+          <p:cNvPicPr>
+            <a:picLocks noGrp="1" noChangeAspect="1"/>
+          </p:cNvPicPr>
+          <p:nvPr>
+            <p:ph sz="half" idx="4294967295"/>
+          </p:nvPr>
+        </p:nvPicPr>
+        <p:blipFill>
+          <a:blip r:embed="rId2">
+            <a:extLst>
+              <a:ext uri="{28A0092B-C50C-407E-A947-70E740481C1C}">
+                <a14:useLocalDpi xmlns:a14="http://schemas.microsoft.com/office/drawing/2010/main" val="0"/>
+              </a:ext>
+            </a:extLst>
+          </a:blip>
+          <a:stretch>
+            <a:fillRect/>
+          </a:stretch>
+        </p:blipFill>
+        <p:spPr>
+          <a:xfrm>
+            <a:off x="786962" y="4001294"/>
+            <a:ext cx="10618075" cy="2491581"/>
+          </a:xfrm>
+        </p:spPr>
+      </p:pic>
     </p:spTree>
     <p:extLst>
       <p:ext uri="{BB962C8B-B14F-4D97-AF65-F5344CB8AC3E}">
@@ -4764,13 +5378,13 @@
   <p:clrMapOvr>
     <a:masterClrMapping/>
   </p:clrMapOvr>
-  <mc:AlternateContent xmlns:mc="http://schemas.openxmlformats.org/markup-compatibility/2006">
-    <mc:Choice xmlns:p14="http://schemas.microsoft.com/office/powerpoint/2010/main" Requires="p14">
+  <mc:AlternateContent xmlns:mc="http://schemas.openxmlformats.org/markup-compatibility/2006" xmlns:p14="http://schemas.microsoft.com/office/powerpoint/2010/main">
+    <mc:Choice Requires="p14">
       <p:transition spd="med" p14:dur="700">
         <p:fade/>
       </p:transition>
     </mc:Choice>
-    <mc:Fallback>
+    <mc:Fallback xmlns="">
       <p:transition spd="med">
         <p:fade/>
       </p:transition>
@@ -4812,7 +5426,12 @@
             <p:ph type="title"/>
           </p:nvPr>
         </p:nvSpPr>
-        <p:spPr/>
+        <p:spPr>
+          <a:xfrm>
+            <a:off x="838200" y="-287079"/>
+            <a:ext cx="10515600" cy="2445487"/>
+          </a:xfrm>
+        </p:spPr>
         <p:txBody>
           <a:bodyPr/>
           <a:lstStyle/>
@@ -4838,19 +5457,42 @@
             <a:spLocks noGrp="1"/>
           </p:cNvSpPr>
           <p:nvPr>
-            <p:ph sz="half" idx="1"/>
-          </p:nvPr>
-        </p:nvSpPr>
-        <p:spPr/>
-        <p:txBody>
-          <a:bodyPr>
-            <a:normAutofit fontScale="92500" lnSpcReduction="10000"/>
+            <p:ph idx="1"/>
+          </p:nvPr>
+        </p:nvSpPr>
+        <p:spPr>
+          <a:xfrm>
+            <a:off x="838200" y="1424763"/>
+            <a:ext cx="10515600" cy="5124892"/>
+          </a:xfrm>
+        </p:spPr>
+        <p:txBody>
+          <a:bodyPr numCol="1">
+            <a:normAutofit/>
           </a:bodyPr>
           <a:lstStyle/>
           <a:p>
             <a:r>
               <a:rPr lang="en-US" dirty="0"/>
-              <a:t>Economic Factors</a:t>
+              <a:t>Columns were added to the data frame for each variable being analyzed.</a:t>
+            </a:r>
+          </a:p>
+          <a:p>
+            <a:r>
+              <a:rPr lang="en-US" dirty="0"/>
+              <a:t>A pair of nested for loops were run to cycle through each of the variables and then request the necessary data from the World Bank API</a:t>
+            </a:r>
+          </a:p>
+          <a:p>
+            <a:r>
+              <a:rPr lang="en-US" dirty="0"/>
+              <a:t>The data was then printed into the data frame</a:t>
+            </a:r>
+          </a:p>
+          <a:p>
+            <a:r>
+              <a:rPr lang="en-US" dirty="0"/>
+              <a:t>While other measures, such as poverty rate and educational factors, were desirable, four major factors ended up being used</a:t>
             </a:r>
           </a:p>
           <a:p>
@@ -4864,19 +5506,6 @@
             <a:pPr lvl="1"/>
             <a:r>
               <a:rPr lang="en-US" dirty="0"/>
-              <a:t>Poverty Rate</a:t>
-            </a:r>
-          </a:p>
-          <a:p>
-            <a:r>
-              <a:rPr lang="en-US" dirty="0"/>
-              <a:t>Populace Factors</a:t>
-            </a:r>
-          </a:p>
-          <a:p>
-            <a:pPr lvl="1"/>
-            <a:r>
-              <a:rPr lang="en-US" dirty="0"/>
               <a:t>Total Population</a:t>
             </a:r>
           </a:p>
@@ -4888,64 +5517,11 @@
             </a:r>
           </a:p>
           <a:p>
-            <a:r>
-              <a:rPr lang="en-US" dirty="0"/>
-              <a:t>Educational</a:t>
-            </a:r>
-          </a:p>
-          <a:p>
-            <a:pPr lvl="1"/>
-            <a:r>
-              <a:rPr lang="en-US" dirty="0"/>
-              <a:t>Primary School Completion Rate</a:t>
-            </a:r>
-          </a:p>
-          <a:p>
-            <a:pPr lvl="1"/>
-            <a:r>
-              <a:rPr lang="en-US" dirty="0"/>
-              <a:t>Literacy</a:t>
-            </a:r>
-          </a:p>
-          <a:p>
-            <a:r>
-              <a:rPr lang="en-US" dirty="0"/>
-              <a:t>Health</a:t>
-            </a:r>
-          </a:p>
-          <a:p>
             <a:pPr lvl="1"/>
             <a:r>
               <a:rPr lang="en-US" dirty="0"/>
               <a:t>Percentage of Health Expenditure in the Private Sector</a:t>
             </a:r>
-          </a:p>
-        </p:txBody>
-      </p:sp>
-      <p:sp>
-        <p:nvSpPr>
-          <p:cNvPr id="4" name="Content Placeholder 3">
-            <a:extLst>
-              <a:ext uri="{FF2B5EF4-FFF2-40B4-BE49-F238E27FC236}">
-                <a16:creationId xmlns:a16="http://schemas.microsoft.com/office/drawing/2014/main" id="{8CCD9045-86C6-4E21-8C7B-60D4607021EA}"/>
-              </a:ext>
-            </a:extLst>
-          </p:cNvPr>
-          <p:cNvSpPr>
-            <a:spLocks noGrp="1"/>
-          </p:cNvSpPr>
-          <p:nvPr>
-            <p:ph sz="half" idx="2"/>
-          </p:nvPr>
-        </p:nvSpPr>
-        <p:spPr/>
-        <p:txBody>
-          <a:bodyPr>
-            <a:normAutofit fontScale="92500" lnSpcReduction="10000"/>
-          </a:bodyPr>
-          <a:lstStyle/>
-          <a:p>
-            <a:endParaRPr lang="en-US" dirty="0"/>
           </a:p>
         </p:txBody>
       </p:sp>
@@ -4959,13 +5535,13 @@
   <p:clrMapOvr>
     <a:masterClrMapping/>
   </p:clrMapOvr>
-  <mc:AlternateContent xmlns:mc="http://schemas.openxmlformats.org/markup-compatibility/2006">
-    <mc:Choice xmlns:p14="http://schemas.microsoft.com/office/powerpoint/2010/main" Requires="p14">
+  <mc:AlternateContent xmlns:mc="http://schemas.openxmlformats.org/markup-compatibility/2006" xmlns:p14="http://schemas.microsoft.com/office/powerpoint/2010/main">
+    <mc:Choice Requires="p14">
       <p:transition spd="med" p14:dur="700">
         <p:fade/>
       </p:transition>
     </mc:Choice>
-    <mc:Fallback>
+    <mc:Fallback xmlns="">
       <p:transition spd="med">
         <p:fade/>
       </p:transition>
@@ -5069,13 +5645,13 @@
   <p:clrMapOvr>
     <a:masterClrMapping/>
   </p:clrMapOvr>
-  <mc:AlternateContent xmlns:mc="http://schemas.openxmlformats.org/markup-compatibility/2006">
-    <mc:Choice xmlns:p14="http://schemas.microsoft.com/office/powerpoint/2010/main" Requires="p14">
+  <mc:AlternateContent xmlns:mc="http://schemas.openxmlformats.org/markup-compatibility/2006" xmlns:p14="http://schemas.microsoft.com/office/powerpoint/2010/main">
+    <mc:Choice Requires="p14">
       <p:transition spd="med" p14:dur="700">
         <p:fade/>
       </p:transition>
     </mc:Choice>
-    <mc:Fallback>
+    <mc:Fallback xmlns="">
       <p:transition spd="med">
         <p:fade/>
       </p:transition>
@@ -5189,13 +5765,13 @@
   <p:clrMapOvr>
     <a:masterClrMapping/>
   </p:clrMapOvr>
-  <mc:AlternateContent xmlns:mc="http://schemas.openxmlformats.org/markup-compatibility/2006">
-    <mc:Choice xmlns:p14="http://schemas.microsoft.com/office/powerpoint/2010/main" Requires="p14">
+  <mc:AlternateContent xmlns:mc="http://schemas.openxmlformats.org/markup-compatibility/2006" xmlns:p14="http://schemas.microsoft.com/office/powerpoint/2010/main">
+    <mc:Choice Requires="p14">
       <p:transition spd="med" p14:dur="700">
         <p:fade/>
       </p:transition>
     </mc:Choice>
-    <mc:Fallback>
+    <mc:Fallback xmlns="">
       <p:transition spd="med">
         <p:fade/>
       </p:transition>
@@ -5223,10 +5799,10 @@
       </p:grpSpPr>
       <p:sp>
         <p:nvSpPr>
-          <p:cNvPr id="2" name="Title 1">
-            <a:extLst>
-              <a:ext uri="{FF2B5EF4-FFF2-40B4-BE49-F238E27FC236}">
-                <a16:creationId xmlns:a16="http://schemas.microsoft.com/office/drawing/2014/main" id="{ABF86C2E-231F-40B8-8AD6-02C95CCD1E7E}"/>
+          <p:cNvPr id="6" name="Title 5">
+            <a:extLst>
+              <a:ext uri="{FF2B5EF4-FFF2-40B4-BE49-F238E27FC236}">
+                <a16:creationId xmlns:a16="http://schemas.microsoft.com/office/drawing/2014/main" id="{2415EC17-CDAA-4D6C-9B43-5C8E6DCEEA30}"/>
               </a:ext>
             </a:extLst>
           </p:cNvPr>
@@ -5237,22 +5813,66 @@
             <p:ph type="title"/>
           </p:nvPr>
         </p:nvSpPr>
-        <p:spPr/>
-        <p:txBody>
-          <a:bodyPr/>
-          <a:lstStyle/>
-          <a:p>
-            <a:pPr algn="ctr"/>
-            <a:endParaRPr lang="en-US" dirty="0"/>
+        <p:spPr>
+          <a:xfrm>
+            <a:off x="839788" y="365125"/>
+            <a:ext cx="10515600" cy="45720"/>
+          </a:xfrm>
+        </p:spPr>
+        <p:txBody>
+          <a:bodyPr>
+            <a:normAutofit fontScale="90000"/>
+          </a:bodyPr>
+          <a:lstStyle/>
+          <a:p>
+            <a:r>
+              <a:rPr lang="en-US" dirty="0"/>
+              <a:t> </a:t>
+            </a:r>
+          </a:p>
+        </p:txBody>
+      </p:sp>
+      <p:sp>
+        <p:nvSpPr>
+          <p:cNvPr id="8" name="Text Placeholder 7">
+            <a:extLst>
+              <a:ext uri="{FF2B5EF4-FFF2-40B4-BE49-F238E27FC236}">
+                <a16:creationId xmlns:a16="http://schemas.microsoft.com/office/drawing/2014/main" id="{4CC4C537-53CF-46CF-9D35-8A76BE90B82E}"/>
+              </a:ext>
+            </a:extLst>
+          </p:cNvPr>
+          <p:cNvSpPr>
+            <a:spLocks noGrp="1"/>
+          </p:cNvSpPr>
+          <p:nvPr>
+            <p:ph type="body" idx="1"/>
+          </p:nvPr>
+        </p:nvSpPr>
+        <p:spPr>
+          <a:xfrm>
+            <a:off x="839788" y="365125"/>
+            <a:ext cx="5157787" cy="2139950"/>
+          </a:xfrm>
+        </p:spPr>
+        <p:txBody>
+          <a:bodyPr>
+            <a:normAutofit fontScale="92500"/>
+          </a:bodyPr>
+          <a:lstStyle/>
+          <a:p>
+            <a:r>
+              <a:rPr lang="en-US" b="0" dirty="0"/>
+              <a:t>The first variable to be analyzed was the Vaccination Progress compared to the Total Population. While first glance would suggest that the smaller the population the higher the rate of vaccination, this does not hold to be true</a:t>
+            </a:r>
           </a:p>
         </p:txBody>
       </p:sp>
       <p:pic>
         <p:nvPicPr>
-          <p:cNvPr id="5" name="Content Placeholder 4">
-            <a:extLst>
-              <a:ext uri="{FF2B5EF4-FFF2-40B4-BE49-F238E27FC236}">
-                <a16:creationId xmlns:a16="http://schemas.microsoft.com/office/drawing/2014/main" id="{76CEB22F-39AC-4062-B28C-B0677D838823}"/>
+          <p:cNvPr id="17" name="Content Placeholder 16">
+            <a:extLst>
+              <a:ext uri="{FF2B5EF4-FFF2-40B4-BE49-F238E27FC236}">
+                <a16:creationId xmlns:a16="http://schemas.microsoft.com/office/drawing/2014/main" id="{A3349B92-19FF-4437-BA14-472E7B88E3EE}"/>
               </a:ext>
             </a:extLst>
           </p:cNvPr>
@@ -5260,7 +5880,7 @@
             <a:picLocks noGrp="1" noChangeAspect="1"/>
           </p:cNvPicPr>
           <p:nvPr>
-            <p:ph idx="1"/>
+            <p:ph sz="half" idx="2"/>
           </p:nvPr>
         </p:nvPicPr>
         <p:blipFill>
@@ -5277,24 +5897,61 @@
         </p:blipFill>
         <p:spPr>
           <a:xfrm>
-            <a:off x="926271" y="365125"/>
-            <a:ext cx="4708678" cy="3139119"/>
+            <a:off x="839788" y="2628107"/>
+            <a:ext cx="5157787" cy="3438524"/>
           </a:xfrm>
         </p:spPr>
       </p:pic>
+      <p:sp>
+        <p:nvSpPr>
+          <p:cNvPr id="12" name="Text Placeholder 11">
+            <a:extLst>
+              <a:ext uri="{FF2B5EF4-FFF2-40B4-BE49-F238E27FC236}">
+                <a16:creationId xmlns:a16="http://schemas.microsoft.com/office/drawing/2014/main" id="{28797D2E-DF25-4DEB-B568-C7C03EB5D2CB}"/>
+              </a:ext>
+            </a:extLst>
+          </p:cNvPr>
+          <p:cNvSpPr>
+            <a:spLocks noGrp="1"/>
+          </p:cNvSpPr>
+          <p:nvPr>
+            <p:ph type="body" sz="quarter" idx="3"/>
+          </p:nvPr>
+        </p:nvSpPr>
+        <p:spPr>
+          <a:xfrm>
+            <a:off x="6172200" y="365125"/>
+            <a:ext cx="5183188" cy="1527470"/>
+          </a:xfrm>
+        </p:spPr>
+        <p:txBody>
+          <a:bodyPr>
+            <a:normAutofit fontScale="92500"/>
+          </a:bodyPr>
+          <a:lstStyle/>
+          <a:p>
+            <a:r>
+              <a:rPr lang="en-US" b="0" dirty="0"/>
+              <a:t>This data failed to reject the null hypothesis, thus there is no statistical difference between the data in the different quartiles.</a:t>
+            </a:r>
+          </a:p>
+        </p:txBody>
+      </p:sp>
       <p:pic>
         <p:nvPicPr>
-          <p:cNvPr id="7" name="Picture 6">
-            <a:extLst>
-              <a:ext uri="{FF2B5EF4-FFF2-40B4-BE49-F238E27FC236}">
-                <a16:creationId xmlns:a16="http://schemas.microsoft.com/office/drawing/2014/main" id="{1DBD1EA5-7599-465A-AE6A-CD70AC8E376A}"/>
+          <p:cNvPr id="19" name="Content Placeholder 18">
+            <a:extLst>
+              <a:ext uri="{FF2B5EF4-FFF2-40B4-BE49-F238E27FC236}">
+                <a16:creationId xmlns:a16="http://schemas.microsoft.com/office/drawing/2014/main" id="{04396126-D6CF-48A1-B279-1DE1B511A262}"/>
               </a:ext>
             </a:extLst>
           </p:cNvPr>
           <p:cNvPicPr>
-            <a:picLocks noChangeAspect="1"/>
+            <a:picLocks noGrp="1" noChangeAspect="1"/>
           </p:cNvPicPr>
-          <p:nvPr/>
+          <p:nvPr>
+            <p:ph sz="quarter" idx="4"/>
+          </p:nvPr>
         </p:nvPicPr>
         <p:blipFill>
           <a:blip r:embed="rId3">
@@ -5310,84 +5967,9 @@
         </p:blipFill>
         <p:spPr>
           <a:xfrm>
-            <a:off x="6544354" y="365306"/>
-            <a:ext cx="4721376" cy="3147584"/>
+            <a:off x="6172200" y="2619640"/>
+            <a:ext cx="5183188" cy="3455458"/>
           </a:xfrm>
-          <a:prstGeom prst="rect">
-            <a:avLst/>
-          </a:prstGeom>
-        </p:spPr>
-      </p:pic>
-      <p:pic>
-        <p:nvPicPr>
-          <p:cNvPr id="9" name="Picture 8">
-            <a:extLst>
-              <a:ext uri="{FF2B5EF4-FFF2-40B4-BE49-F238E27FC236}">
-                <a16:creationId xmlns:a16="http://schemas.microsoft.com/office/drawing/2014/main" id="{011A5029-1F18-45CA-877F-B7785231BBCD}"/>
-              </a:ext>
-            </a:extLst>
-          </p:cNvPr>
-          <p:cNvPicPr>
-            <a:picLocks noChangeAspect="1"/>
-          </p:cNvPicPr>
-          <p:nvPr/>
-        </p:nvPicPr>
-        <p:blipFill>
-          <a:blip r:embed="rId4">
-            <a:extLst>
-              <a:ext uri="{28A0092B-C50C-407E-A947-70E740481C1C}">
-                <a14:useLocalDpi xmlns:a14="http://schemas.microsoft.com/office/drawing/2010/main" val="0"/>
-              </a:ext>
-            </a:extLst>
-          </a:blip>
-          <a:stretch>
-            <a:fillRect/>
-          </a:stretch>
-        </p:blipFill>
-        <p:spPr>
-          <a:xfrm>
-            <a:off x="842280" y="3468707"/>
-            <a:ext cx="4809447" cy="3206298"/>
-          </a:xfrm>
-          <a:prstGeom prst="rect">
-            <a:avLst/>
-          </a:prstGeom>
-        </p:spPr>
-      </p:pic>
-      <p:pic>
-        <p:nvPicPr>
-          <p:cNvPr id="11" name="Picture 10">
-            <a:extLst>
-              <a:ext uri="{FF2B5EF4-FFF2-40B4-BE49-F238E27FC236}">
-                <a16:creationId xmlns:a16="http://schemas.microsoft.com/office/drawing/2014/main" id="{7ABEE123-B957-4258-9DE4-36F51EE8EE96}"/>
-              </a:ext>
-            </a:extLst>
-          </p:cNvPr>
-          <p:cNvPicPr>
-            <a:picLocks noChangeAspect="1"/>
-          </p:cNvPicPr>
-          <p:nvPr/>
-        </p:nvPicPr>
-        <p:blipFill>
-          <a:blip r:embed="rId5">
-            <a:extLst>
-              <a:ext uri="{28A0092B-C50C-407E-A947-70E740481C1C}">
-                <a14:useLocalDpi xmlns:a14="http://schemas.microsoft.com/office/drawing/2010/main" val="0"/>
-              </a:ext>
-            </a:extLst>
-          </a:blip>
-          <a:stretch>
-            <a:fillRect/>
-          </a:stretch>
-        </p:blipFill>
-        <p:spPr>
-          <a:xfrm>
-            <a:off x="6531654" y="3463284"/>
-            <a:ext cx="4809448" cy="3206299"/>
-          </a:xfrm>
-          <a:prstGeom prst="rect">
-            <a:avLst/>
-          </a:prstGeom>
         </p:spPr>
       </p:pic>
     </p:spTree>
@@ -5400,13 +5982,13 @@
   <p:clrMapOvr>
     <a:masterClrMapping/>
   </p:clrMapOvr>
-  <mc:AlternateContent xmlns:mc="http://schemas.openxmlformats.org/markup-compatibility/2006">
-    <mc:Choice xmlns:p14="http://schemas.microsoft.com/office/powerpoint/2010/main" Requires="p14">
+  <mc:AlternateContent xmlns:mc="http://schemas.openxmlformats.org/markup-compatibility/2006" xmlns:p14="http://schemas.microsoft.com/office/powerpoint/2010/main">
+    <mc:Choice Requires="p14">
       <p:transition spd="med" p14:dur="700">
         <p:fade/>
       </p:transition>
     </mc:Choice>
-    <mc:Fallback>
+    <mc:Fallback xmlns="">
       <p:transition spd="med">
         <p:fade/>
       </p:transition>
@@ -5437,7 +6019,7 @@
           <p:cNvPr id="2" name="Title 1">
             <a:extLst>
               <a:ext uri="{FF2B5EF4-FFF2-40B4-BE49-F238E27FC236}">
-                <a16:creationId xmlns:a16="http://schemas.microsoft.com/office/drawing/2014/main" id="{9465B42F-D2D6-4EC1-836D-661E95F38FAA}"/>
+                <a16:creationId xmlns:a16="http://schemas.microsoft.com/office/drawing/2014/main" id="{498D281F-3D16-489C-B0DC-D1BEA3665997}"/>
               </a:ext>
             </a:extLst>
           </p:cNvPr>
@@ -5448,52 +6030,31 @@
             <p:ph type="title"/>
           </p:nvPr>
         </p:nvSpPr>
-        <p:spPr/>
-        <p:txBody>
-          <a:bodyPr/>
+        <p:spPr>
+          <a:xfrm>
+            <a:off x="839788" y="365125"/>
+            <a:ext cx="10515600" cy="45719"/>
+          </a:xfrm>
+        </p:spPr>
+        <p:txBody>
+          <a:bodyPr>
+            <a:normAutofit fontScale="90000"/>
+          </a:bodyPr>
           <a:lstStyle/>
           <a:p>
             <a:r>
               <a:rPr lang="en-US" dirty="0"/>
-              <a:t>Private Healthcare Expenditure	</a:t>
-            </a:r>
-          </a:p>
-        </p:txBody>
-      </p:sp>
-      <p:sp>
-        <p:nvSpPr>
-          <p:cNvPr id="3" name="Text Placeholder 2">
-            <a:extLst>
-              <a:ext uri="{FF2B5EF4-FFF2-40B4-BE49-F238E27FC236}">
-                <a16:creationId xmlns:a16="http://schemas.microsoft.com/office/drawing/2014/main" id="{7F06FBF8-4F4C-4401-B430-DDA78954DA72}"/>
-              </a:ext>
-            </a:extLst>
-          </p:cNvPr>
-          <p:cNvSpPr>
-            <a:spLocks noGrp="1"/>
-          </p:cNvSpPr>
-          <p:nvPr>
-            <p:ph type="body" idx="1"/>
-          </p:nvPr>
-        </p:nvSpPr>
-        <p:spPr/>
-        <p:txBody>
-          <a:bodyPr/>
-          <a:lstStyle/>
-          <a:p>
-            <a:r>
-              <a:rPr lang="en-US" dirty="0"/>
-              <a:t>Per quartile</a:t>
+              <a:t> </a:t>
             </a:r>
           </a:p>
         </p:txBody>
       </p:sp>
       <p:pic>
         <p:nvPicPr>
-          <p:cNvPr id="8" name="Content Placeholder 7">
-            <a:extLst>
-              <a:ext uri="{FF2B5EF4-FFF2-40B4-BE49-F238E27FC236}">
-                <a16:creationId xmlns:a16="http://schemas.microsoft.com/office/drawing/2014/main" id="{49ED9D2D-C1C1-49D8-BF73-BB8E07DA0315}"/>
+          <p:cNvPr id="10" name="Content Placeholder 9">
+            <a:extLst>
+              <a:ext uri="{FF2B5EF4-FFF2-40B4-BE49-F238E27FC236}">
+                <a16:creationId xmlns:a16="http://schemas.microsoft.com/office/drawing/2014/main" id="{95AA9A84-DE60-4280-A3C7-BB4F6FD04958}"/>
               </a:ext>
             </a:extLst>
           </p:cNvPr>
@@ -5528,7 +6089,7 @@
           <p:cNvPr id="5" name="Text Placeholder 4">
             <a:extLst>
               <a:ext uri="{FF2B5EF4-FFF2-40B4-BE49-F238E27FC236}">
-                <a16:creationId xmlns:a16="http://schemas.microsoft.com/office/drawing/2014/main" id="{6AAA2E70-BD26-4F45-A1DC-52D3E8F764FE}"/>
+                <a16:creationId xmlns:a16="http://schemas.microsoft.com/office/drawing/2014/main" id="{1775ED7F-0239-4324-8F8A-65D0D11F4E50}"/>
               </a:ext>
             </a:extLst>
           </p:cNvPr>
@@ -5539,24 +6100,31 @@
             <p:ph type="body" sz="quarter" idx="3"/>
           </p:nvPr>
         </p:nvSpPr>
-        <p:spPr/>
-        <p:txBody>
-          <a:bodyPr/>
-          <a:lstStyle/>
-          <a:p>
-            <a:r>
-              <a:rPr lang="en-US" dirty="0"/>
-              <a:t>Linear Regression across all countries</a:t>
+        <p:spPr>
+          <a:xfrm>
+            <a:off x="6172200" y="520994"/>
+            <a:ext cx="5183188" cy="1392865"/>
+          </a:xfrm>
+        </p:spPr>
+        <p:txBody>
+          <a:bodyPr>
+            <a:normAutofit lnSpcReduction="10000"/>
+          </a:bodyPr>
+          <a:lstStyle/>
+          <a:p>
+            <a:r>
+              <a:rPr lang="en-US" b="0" dirty="0"/>
+              <a:t>This data failed to reject the null hypothesis, thus there is no statistical difference between the data in the different quartiles.</a:t>
             </a:r>
           </a:p>
         </p:txBody>
       </p:sp>
       <p:pic>
         <p:nvPicPr>
-          <p:cNvPr id="10" name="Content Placeholder 9">
-            <a:extLst>
-              <a:ext uri="{FF2B5EF4-FFF2-40B4-BE49-F238E27FC236}">
-                <a16:creationId xmlns:a16="http://schemas.microsoft.com/office/drawing/2014/main" id="{042C3FEF-9FCC-4F0E-987C-5DC75AC5886A}"/>
+          <p:cNvPr id="12" name="Content Placeholder 11">
+            <a:extLst>
+              <a:ext uri="{FF2B5EF4-FFF2-40B4-BE49-F238E27FC236}">
+                <a16:creationId xmlns:a16="http://schemas.microsoft.com/office/drawing/2014/main" id="{F1427122-48C4-4571-8A4C-1395129AE599}"/>
               </a:ext>
             </a:extLst>
           </p:cNvPr>
@@ -5586,28 +6154,51 @@
           </a:xfrm>
         </p:spPr>
       </p:pic>
+      <p:sp>
+        <p:nvSpPr>
+          <p:cNvPr id="7" name="Text Placeholder 7">
+            <a:extLst>
+              <a:ext uri="{FF2B5EF4-FFF2-40B4-BE49-F238E27FC236}">
+                <a16:creationId xmlns:a16="http://schemas.microsoft.com/office/drawing/2014/main" id="{5EAD9029-8924-4194-8BE8-381AAABAEACB}"/>
+              </a:ext>
+            </a:extLst>
+          </p:cNvPr>
+          <p:cNvSpPr>
+            <a:spLocks noGrp="1"/>
+          </p:cNvSpPr>
+          <p:nvPr>
+            <p:ph type="body" idx="1"/>
+          </p:nvPr>
+        </p:nvSpPr>
+        <p:spPr>
+          <a:xfrm>
+            <a:off x="839788" y="552893"/>
+            <a:ext cx="5157787" cy="1623593"/>
+          </a:xfrm>
+        </p:spPr>
+        <p:txBody>
+          <a:bodyPr>
+            <a:normAutofit lnSpcReduction="10000"/>
+          </a:bodyPr>
+          <a:lstStyle/>
+          <a:p>
+            <a:r>
+              <a:rPr lang="en-US" b="0" dirty="0"/>
+              <a:t>The next variable to be analyzed was the Vaccination Progress compared to the GDP. While there was a higher correlation with these variables, it was still not statistically significant.</a:t>
+            </a:r>
+          </a:p>
+        </p:txBody>
+      </p:sp>
     </p:spTree>
     <p:extLst>
       <p:ext uri="{BB962C8B-B14F-4D97-AF65-F5344CB8AC3E}">
-        <p14:creationId xmlns:p14="http://schemas.microsoft.com/office/powerpoint/2010/main" val="1138257485"/>
+        <p14:creationId xmlns:p14="http://schemas.microsoft.com/office/powerpoint/2010/main" val="2067421192"/>
       </p:ext>
     </p:extLst>
   </p:cSld>
   <p:clrMapOvr>
     <a:masterClrMapping/>
   </p:clrMapOvr>
-  <mc:AlternateContent xmlns:mc="http://schemas.openxmlformats.org/markup-compatibility/2006">
-    <mc:Choice xmlns:p14="http://schemas.microsoft.com/office/powerpoint/2010/main" Requires="p14">
-      <p:transition spd="med" p14:dur="700">
-        <p:fade/>
-      </p:transition>
-    </mc:Choice>
-    <mc:Fallback>
-      <p:transition spd="med">
-        <p:fade/>
-      </p:transition>
-    </mc:Fallback>
-  </mc:AlternateContent>
 </p:sld>
 </file>
 

</xml_diff>

<commit_message>
Cleaning up the powerpoint
</commit_message>
<xml_diff>
--- a/Covid 19 Presentation.pptx
+++ b/Covid 19 Presentation.pptx
@@ -4,6 +4,9 @@
   <p:sldMasterIdLst>
     <p:sldMasterId id="2147483648" r:id="rId1"/>
   </p:sldMasterIdLst>
+  <p:notesMasterIdLst>
+    <p:notesMasterId r:id="rId17"/>
+  </p:notesMasterIdLst>
   <p:sldIdLst>
     <p:sldId id="256" r:id="rId2"/>
     <p:sldId id="257" r:id="rId3"/>
@@ -12,13 +15,14 @@
     <p:sldId id="260" r:id="rId6"/>
     <p:sldId id="261" r:id="rId7"/>
     <p:sldId id="262" r:id="rId8"/>
-    <p:sldId id="268" r:id="rId9"/>
-    <p:sldId id="269" r:id="rId10"/>
-    <p:sldId id="263" r:id="rId11"/>
-    <p:sldId id="264" r:id="rId12"/>
-    <p:sldId id="265" r:id="rId13"/>
-    <p:sldId id="266" r:id="rId14"/>
-    <p:sldId id="267" r:id="rId15"/>
+    <p:sldId id="270" r:id="rId9"/>
+    <p:sldId id="268" r:id="rId10"/>
+    <p:sldId id="269" r:id="rId11"/>
+    <p:sldId id="263" r:id="rId12"/>
+    <p:sldId id="264" r:id="rId13"/>
+    <p:sldId id="265" r:id="rId14"/>
+    <p:sldId id="266" r:id="rId15"/>
+    <p:sldId id="267" r:id="rId16"/>
   </p:sldIdLst>
   <p:sldSz cx="12192000" cy="6858000"/>
   <p:notesSz cx="6858000" cy="9144000"/>
@@ -129,8 +133,8 @@
 <pc:chgInfo xmlns:a="http://schemas.openxmlformats.org/drawingml/2006/main" xmlns:r="http://schemas.openxmlformats.org/officeDocument/2006/relationships" xmlns:ac="http://schemas.microsoft.com/office/drawing/2013/main/command" xmlns:pc="http://schemas.microsoft.com/office/powerpoint/2013/main/command">
   <pc:docChgLst>
     <pc:chgData name="Zachary Owen" userId="d1254ce893023eb5" providerId="LiveId" clId="{5481171A-B7C3-41C8-AC9C-C25C4A57EECB}"/>
-    <pc:docChg chg="undo custSel addSld modSld">
-      <pc:chgData name="Zachary Owen" userId="d1254ce893023eb5" providerId="LiveId" clId="{5481171A-B7C3-41C8-AC9C-C25C4A57EECB}" dt="2021-05-07T23:06:11.631" v="3157" actId="20577"/>
+    <pc:docChg chg="undo custSel addSld modSld sldOrd">
+      <pc:chgData name="Zachary Owen" userId="d1254ce893023eb5" providerId="LiveId" clId="{5481171A-B7C3-41C8-AC9C-C25C4A57EECB}" dt="2021-05-08T00:06:21.261" v="6032" actId="1076"/>
       <pc:docMkLst>
         <pc:docMk/>
       </pc:docMkLst>
@@ -220,69 +224,305 @@
         </pc:spChg>
       </pc:sldChg>
       <pc:sldChg chg="modSp mod">
-        <pc:chgData name="Zachary Owen" userId="d1254ce893023eb5" providerId="LiveId" clId="{5481171A-B7C3-41C8-AC9C-C25C4A57EECB}" dt="2021-05-07T02:54:51.728" v="2796" actId="20577"/>
+        <pc:chgData name="Zachary Owen" userId="d1254ce893023eb5" providerId="LiveId" clId="{5481171A-B7C3-41C8-AC9C-C25C4A57EECB}" dt="2021-05-07T23:55:18.183" v="4927" actId="20577"/>
+        <pc:sldMkLst>
+          <pc:docMk/>
+          <pc:sldMk cId="3644890434" sldId="261"/>
+        </pc:sldMkLst>
+        <pc:spChg chg="mod">
+          <ac:chgData name="Zachary Owen" userId="d1254ce893023eb5" providerId="LiveId" clId="{5481171A-B7C3-41C8-AC9C-C25C4A57EECB}" dt="2021-05-07T23:55:18.183" v="4927" actId="20577"/>
+          <ac:spMkLst>
+            <pc:docMk/>
+            <pc:sldMk cId="3644890434" sldId="261"/>
+            <ac:spMk id="11" creationId="{AFB9226F-0367-43F1-92A6-7D9B35D680FE}"/>
+          </ac:spMkLst>
+        </pc:spChg>
+      </pc:sldChg>
+      <pc:sldChg chg="addSp delSp modSp mod modClrScheme chgLayout">
+        <pc:chgData name="Zachary Owen" userId="d1254ce893023eb5" providerId="LiveId" clId="{5481171A-B7C3-41C8-AC9C-C25C4A57EECB}" dt="2021-05-08T00:04:26.100" v="5972" actId="20577"/>
+        <pc:sldMkLst>
+          <pc:docMk/>
+          <pc:sldMk cId="281725530" sldId="262"/>
+        </pc:sldMkLst>
+        <pc:spChg chg="mod ord">
+          <ac:chgData name="Zachary Owen" userId="d1254ce893023eb5" providerId="LiveId" clId="{5481171A-B7C3-41C8-AC9C-C25C4A57EECB}" dt="2021-05-08T00:00:39.139" v="5471" actId="20577"/>
+          <ac:spMkLst>
+            <pc:docMk/>
+            <pc:sldMk cId="281725530" sldId="262"/>
+            <ac:spMk id="2" creationId="{7BC281AA-506C-41F3-B78C-D67244BD833B}"/>
+          </ac:spMkLst>
+        </pc:spChg>
+        <pc:spChg chg="del mod ord">
+          <ac:chgData name="Zachary Owen" userId="d1254ce893023eb5" providerId="LiveId" clId="{5481171A-B7C3-41C8-AC9C-C25C4A57EECB}" dt="2021-05-08T00:00:19.639" v="5458" actId="700"/>
+          <ac:spMkLst>
+            <pc:docMk/>
+            <pc:sldMk cId="281725530" sldId="262"/>
+            <ac:spMk id="3" creationId="{3718D614-D035-4A4C-ACBB-17183EC7FE8E}"/>
+          </ac:spMkLst>
+        </pc:spChg>
+        <pc:spChg chg="del">
+          <ac:chgData name="Zachary Owen" userId="d1254ce893023eb5" providerId="LiveId" clId="{5481171A-B7C3-41C8-AC9C-C25C4A57EECB}" dt="2021-05-08T00:00:19.639" v="5458" actId="700"/>
+          <ac:spMkLst>
+            <pc:docMk/>
+            <pc:sldMk cId="281725530" sldId="262"/>
+            <ac:spMk id="4" creationId="{29941416-6CBE-474E-97AC-6E2D57B678FA}"/>
+          </ac:spMkLst>
+        </pc:spChg>
+        <pc:spChg chg="add mod ord">
+          <ac:chgData name="Zachary Owen" userId="d1254ce893023eb5" providerId="LiveId" clId="{5481171A-B7C3-41C8-AC9C-C25C4A57EECB}" dt="2021-05-08T00:04:26.100" v="5972" actId="20577"/>
+          <ac:spMkLst>
+            <pc:docMk/>
+            <pc:sldMk cId="281725530" sldId="262"/>
+            <ac:spMk id="5" creationId="{AD78B15D-8C93-475F-A14A-3C87BA0DA604}"/>
+          </ac:spMkLst>
+        </pc:spChg>
+      </pc:sldChg>
+      <pc:sldChg chg="addSp delSp modSp mod modClrScheme chgLayout">
+        <pc:chgData name="Zachary Owen" userId="d1254ce893023eb5" providerId="LiveId" clId="{5481171A-B7C3-41C8-AC9C-C25C4A57EECB}" dt="2021-05-07T23:43:11.681" v="3626" actId="6549"/>
         <pc:sldMkLst>
           <pc:docMk/>
           <pc:sldMk cId="1138257485" sldId="263"/>
         </pc:sldMkLst>
-        <pc:spChg chg="mod">
-          <ac:chgData name="Zachary Owen" userId="d1254ce893023eb5" providerId="LiveId" clId="{5481171A-B7C3-41C8-AC9C-C25C4A57EECB}" dt="2021-05-07T02:02:24.556" v="2375" actId="20577"/>
+        <pc:spChg chg="mod ord">
+          <ac:chgData name="Zachary Owen" userId="d1254ce893023eb5" providerId="LiveId" clId="{5481171A-B7C3-41C8-AC9C-C25C4A57EECB}" dt="2021-05-07T23:40:11.412" v="3535" actId="700"/>
           <ac:spMkLst>
             <pc:docMk/>
             <pc:sldMk cId="1138257485" sldId="263"/>
             <ac:spMk id="2" creationId="{9465B42F-D2D6-4EC1-836D-661E95F38FAA}"/>
           </ac:spMkLst>
         </pc:spChg>
-        <pc:spChg chg="mod">
-          <ac:chgData name="Zachary Owen" userId="d1254ce893023eb5" providerId="LiveId" clId="{5481171A-B7C3-41C8-AC9C-C25C4A57EECB}" dt="2021-05-07T02:54:51.728" v="2796" actId="20577"/>
+        <pc:spChg chg="del mod ord">
+          <ac:chgData name="Zachary Owen" userId="d1254ce893023eb5" providerId="LiveId" clId="{5481171A-B7C3-41C8-AC9C-C25C4A57EECB}" dt="2021-05-07T23:40:27.544" v="3541" actId="21"/>
           <ac:spMkLst>
             <pc:docMk/>
             <pc:sldMk cId="1138257485" sldId="263"/>
             <ac:spMk id="3" creationId="{7F06FBF8-4F4C-4401-B430-DDA78954DA72}"/>
           </ac:spMkLst>
         </pc:spChg>
-        <pc:spChg chg="mod">
-          <ac:chgData name="Zachary Owen" userId="d1254ce893023eb5" providerId="LiveId" clId="{5481171A-B7C3-41C8-AC9C-C25C4A57EECB}" dt="2021-05-07T02:33:36.647" v="2795" actId="14100"/>
+        <pc:spChg chg="mod ord">
+          <ac:chgData name="Zachary Owen" userId="d1254ce893023eb5" providerId="LiveId" clId="{5481171A-B7C3-41C8-AC9C-C25C4A57EECB}" dt="2021-05-07T23:43:11.681" v="3626" actId="6549"/>
           <ac:spMkLst>
             <pc:docMk/>
             <pc:sldMk cId="1138257485" sldId="263"/>
             <ac:spMk id="5" creationId="{6AAA2E70-BD26-4F45-A1DC-52D3E8F764FE}"/>
           </ac:spMkLst>
         </pc:spChg>
+        <pc:spChg chg="add del mod">
+          <ac:chgData name="Zachary Owen" userId="d1254ce893023eb5" providerId="LiveId" clId="{5481171A-B7C3-41C8-AC9C-C25C4A57EECB}" dt="2021-05-07T23:26:20.336" v="3243" actId="931"/>
+          <ac:spMkLst>
+            <pc:docMk/>
+            <pc:sldMk cId="1138257485" sldId="263"/>
+            <ac:spMk id="6" creationId="{ABB79C95-83BC-4025-89DA-B1A352A30279}"/>
+          </ac:spMkLst>
+        </pc:spChg>
+        <pc:spChg chg="add del mod">
+          <ac:chgData name="Zachary Owen" userId="d1254ce893023eb5" providerId="LiveId" clId="{5481171A-B7C3-41C8-AC9C-C25C4A57EECB}" dt="2021-05-07T23:28:13" v="3255" actId="931"/>
+          <ac:spMkLst>
+            <pc:docMk/>
+            <pc:sldMk cId="1138257485" sldId="263"/>
+            <ac:spMk id="18" creationId="{0D21ECE3-E7DE-404C-9D79-192C8DB5956D}"/>
+          </ac:spMkLst>
+        </pc:spChg>
+        <pc:spChg chg="add del mod">
+          <ac:chgData name="Zachary Owen" userId="d1254ce893023eb5" providerId="LiveId" clId="{5481171A-B7C3-41C8-AC9C-C25C4A57EECB}" dt="2021-05-07T23:40:41.423" v="3547"/>
+          <ac:spMkLst>
+            <pc:docMk/>
+            <pc:sldMk cId="1138257485" sldId="263"/>
+            <ac:spMk id="21" creationId="{C16C1A80-74BF-42B1-8709-95572D762917}"/>
+          </ac:spMkLst>
+        </pc:spChg>
+        <pc:picChg chg="del">
+          <ac:chgData name="Zachary Owen" userId="d1254ce893023eb5" providerId="LiveId" clId="{5481171A-B7C3-41C8-AC9C-C25C4A57EECB}" dt="2021-05-07T23:28:06.244" v="3254" actId="21"/>
+          <ac:picMkLst>
+            <pc:docMk/>
+            <pc:sldMk cId="1138257485" sldId="263"/>
+            <ac:picMk id="8" creationId="{49ED9D2D-C1C1-49D8-BF73-BB8E07DA0315}"/>
+          </ac:picMkLst>
+        </pc:picChg>
+        <pc:picChg chg="add mod ord">
+          <ac:chgData name="Zachary Owen" userId="d1254ce893023eb5" providerId="LiveId" clId="{5481171A-B7C3-41C8-AC9C-C25C4A57EECB}" dt="2021-05-07T23:40:23.237" v="3540" actId="1036"/>
+          <ac:picMkLst>
+            <pc:docMk/>
+            <pc:sldMk cId="1138257485" sldId="263"/>
+            <ac:picMk id="9" creationId="{5B92ABD6-BC09-41A2-92F7-5DBB7D5436DD}"/>
+          </ac:picMkLst>
+        </pc:picChg>
+        <pc:picChg chg="del">
+          <ac:chgData name="Zachary Owen" userId="d1254ce893023eb5" providerId="LiveId" clId="{5481171A-B7C3-41C8-AC9C-C25C4A57EECB}" dt="2021-05-07T23:26:13.757" v="3242" actId="21"/>
+          <ac:picMkLst>
+            <pc:docMk/>
+            <pc:sldMk cId="1138257485" sldId="263"/>
+            <ac:picMk id="10" creationId="{042C3FEF-9FCC-4F0E-987C-5DC75AC5886A}"/>
+          </ac:picMkLst>
+        </pc:picChg>
+        <pc:picChg chg="add mod">
+          <ac:chgData name="Zachary Owen" userId="d1254ce893023eb5" providerId="LiveId" clId="{5481171A-B7C3-41C8-AC9C-C25C4A57EECB}" dt="2021-05-07T23:26:59.306" v="3247" actId="1076"/>
+          <ac:picMkLst>
+            <pc:docMk/>
+            <pc:sldMk cId="1138257485" sldId="263"/>
+            <ac:picMk id="12" creationId="{AB080098-B93E-4E22-B9E3-1990565E308C}"/>
+          </ac:picMkLst>
+        </pc:picChg>
+        <pc:picChg chg="add mod">
+          <ac:chgData name="Zachary Owen" userId="d1254ce893023eb5" providerId="LiveId" clId="{5481171A-B7C3-41C8-AC9C-C25C4A57EECB}" dt="2021-05-07T23:27:24.212" v="3250" actId="1076"/>
+          <ac:picMkLst>
+            <pc:docMk/>
+            <pc:sldMk cId="1138257485" sldId="263"/>
+            <ac:picMk id="14" creationId="{5056C991-98AA-4B59-8276-149F28325D39}"/>
+          </ac:picMkLst>
+        </pc:picChg>
+        <pc:picChg chg="add mod">
+          <ac:chgData name="Zachary Owen" userId="d1254ce893023eb5" providerId="LiveId" clId="{5481171A-B7C3-41C8-AC9C-C25C4A57EECB}" dt="2021-05-07T23:27:46.673" v="3253" actId="1076"/>
+          <ac:picMkLst>
+            <pc:docMk/>
+            <pc:sldMk cId="1138257485" sldId="263"/>
+            <ac:picMk id="16" creationId="{9FDF3129-C844-41DC-B2E2-B8FA966DD458}"/>
+          </ac:picMkLst>
+        </pc:picChg>
+        <pc:picChg chg="add mod ord">
+          <ac:chgData name="Zachary Owen" userId="d1254ce893023eb5" providerId="LiveId" clId="{5481171A-B7C3-41C8-AC9C-C25C4A57EECB}" dt="2021-05-07T23:40:11.412" v="3535" actId="700"/>
+          <ac:picMkLst>
+            <pc:docMk/>
+            <pc:sldMk cId="1138257485" sldId="263"/>
+            <ac:picMk id="20" creationId="{36F9AF64-BAF9-4D6E-B8DD-35A1DAB97453}"/>
+          </ac:picMkLst>
+        </pc:picChg>
       </pc:sldChg>
-      <pc:sldChg chg="modSp mod">
-        <pc:chgData name="Zachary Owen" userId="d1254ce893023eb5" providerId="LiveId" clId="{5481171A-B7C3-41C8-AC9C-C25C4A57EECB}" dt="2021-05-07T02:59:39.921" v="3052" actId="27636"/>
+      <pc:sldChg chg="addSp delSp modSp mod modClrScheme chgLayout">
+        <pc:chgData name="Zachary Owen" userId="d1254ce893023eb5" providerId="LiveId" clId="{5481171A-B7C3-41C8-AC9C-C25C4A57EECB}" dt="2021-05-07T23:45:10.587" v="3799" actId="20577"/>
         <pc:sldMkLst>
           <pc:docMk/>
           <pc:sldMk cId="245820475" sldId="264"/>
         </pc:sldMkLst>
-        <pc:spChg chg="mod">
-          <ac:chgData name="Zachary Owen" userId="d1254ce893023eb5" providerId="LiveId" clId="{5481171A-B7C3-41C8-AC9C-C25C4A57EECB}" dt="2021-05-07T02:02:38.524" v="2378" actId="20577"/>
+        <pc:spChg chg="mod ord">
+          <ac:chgData name="Zachary Owen" userId="d1254ce893023eb5" providerId="LiveId" clId="{5481171A-B7C3-41C8-AC9C-C25C4A57EECB}" dt="2021-05-07T23:41:50.018" v="3614" actId="700"/>
           <ac:spMkLst>
             <pc:docMk/>
             <pc:sldMk cId="245820475" sldId="264"/>
             <ac:spMk id="2" creationId="{CF2F4417-6ADD-4BE7-9C57-95BA49F8A6AF}"/>
           </ac:spMkLst>
         </pc:spChg>
-        <pc:spChg chg="mod">
-          <ac:chgData name="Zachary Owen" userId="d1254ce893023eb5" providerId="LiveId" clId="{5481171A-B7C3-41C8-AC9C-C25C4A57EECB}" dt="2021-05-07T02:59:39.920" v="3051" actId="27636"/>
+        <pc:spChg chg="del mod ord">
+          <ac:chgData name="Zachary Owen" userId="d1254ce893023eb5" providerId="LiveId" clId="{5481171A-B7C3-41C8-AC9C-C25C4A57EECB}" dt="2021-05-07T23:42:01.036" v="3619" actId="21"/>
           <ac:spMkLst>
             <pc:docMk/>
             <pc:sldMk cId="245820475" sldId="264"/>
             <ac:spMk id="3" creationId="{4297D99A-3B39-46D0-88FD-5F62849FBEA2}"/>
           </ac:spMkLst>
         </pc:spChg>
-        <pc:spChg chg="mod">
-          <ac:chgData name="Zachary Owen" userId="d1254ce893023eb5" providerId="LiveId" clId="{5481171A-B7C3-41C8-AC9C-C25C4A57EECB}" dt="2021-05-07T02:59:39.921" v="3052" actId="27636"/>
+        <pc:spChg chg="mod ord">
+          <ac:chgData name="Zachary Owen" userId="d1254ce893023eb5" providerId="LiveId" clId="{5481171A-B7C3-41C8-AC9C-C25C4A57EECB}" dt="2021-05-07T23:45:10.587" v="3799" actId="20577"/>
           <ac:spMkLst>
             <pc:docMk/>
             <pc:sldMk cId="245820475" sldId="264"/>
             <ac:spMk id="5" creationId="{B865C62A-5914-4786-B24E-EE3631EFAFCC}"/>
           </ac:spMkLst>
         </pc:spChg>
+        <pc:spChg chg="add del mod">
+          <ac:chgData name="Zachary Owen" userId="d1254ce893023eb5" providerId="LiveId" clId="{5481171A-B7C3-41C8-AC9C-C25C4A57EECB}" dt="2021-05-07T23:28:29.234" v="3257" actId="931"/>
+          <ac:spMkLst>
+            <pc:docMk/>
+            <pc:sldMk cId="245820475" sldId="264"/>
+            <ac:spMk id="6" creationId="{CCBC3A43-03EF-4ECE-A469-FC549A38EE43}"/>
+          </ac:spMkLst>
+        </pc:spChg>
+        <pc:spChg chg="add del mod">
+          <ac:chgData name="Zachary Owen" userId="d1254ce893023eb5" providerId="LiveId" clId="{5481171A-B7C3-41C8-AC9C-C25C4A57EECB}" dt="2021-05-07T23:28:49.962" v="3259" actId="931"/>
+          <ac:spMkLst>
+            <pc:docMk/>
+            <pc:sldMk cId="245820475" sldId="264"/>
+            <ac:spMk id="11" creationId="{D31FEC37-3222-4460-8979-0AE23FF63876}"/>
+          </ac:spMkLst>
+        </pc:spChg>
+        <pc:picChg chg="add mod ord">
+          <ac:chgData name="Zachary Owen" userId="d1254ce893023eb5" providerId="LiveId" clId="{5481171A-B7C3-41C8-AC9C-C25C4A57EECB}" dt="2021-05-07T23:41:50.018" v="3614" actId="700"/>
+          <ac:picMkLst>
+            <pc:docMk/>
+            <pc:sldMk cId="245820475" sldId="264"/>
+            <ac:picMk id="8" creationId="{38CA3494-8DC3-4829-8B47-A12068612DF6}"/>
+          </ac:picMkLst>
+        </pc:picChg>
+        <pc:picChg chg="del">
+          <ac:chgData name="Zachary Owen" userId="d1254ce893023eb5" providerId="LiveId" clId="{5481171A-B7C3-41C8-AC9C-C25C4A57EECB}" dt="2021-05-07T23:28:40.071" v="3258" actId="21"/>
+          <ac:picMkLst>
+            <pc:docMk/>
+            <pc:sldMk cId="245820475" sldId="264"/>
+            <ac:picMk id="10" creationId="{45DF83FE-FC71-4661-9C6B-7863524CCB70}"/>
+          </ac:picMkLst>
+        </pc:picChg>
+        <pc:picChg chg="add mod ord">
+          <ac:chgData name="Zachary Owen" userId="d1254ce893023eb5" providerId="LiveId" clId="{5481171A-B7C3-41C8-AC9C-C25C4A57EECB}" dt="2021-05-07T23:41:56.662" v="3618" actId="1076"/>
+          <ac:picMkLst>
+            <pc:docMk/>
+            <pc:sldMk cId="245820475" sldId="264"/>
+            <ac:picMk id="13" creationId="{34470B16-E026-4201-888D-3B91EA3C6A15}"/>
+          </ac:picMkLst>
+        </pc:picChg>
+        <pc:picChg chg="del">
+          <ac:chgData name="Zachary Owen" userId="d1254ce893023eb5" providerId="LiveId" clId="{5481171A-B7C3-41C8-AC9C-C25C4A57EECB}" dt="2021-05-07T23:28:21.899" v="3256" actId="21"/>
+          <ac:picMkLst>
+            <pc:docMk/>
+            <pc:sldMk cId="245820475" sldId="264"/>
+            <ac:picMk id="14" creationId="{166FF831-7E78-435D-AFA5-983C435BDDDD}"/>
+          </ac:picMkLst>
+        </pc:picChg>
+        <pc:picChg chg="add mod">
+          <ac:chgData name="Zachary Owen" userId="d1254ce893023eb5" providerId="LiveId" clId="{5481171A-B7C3-41C8-AC9C-C25C4A57EECB}" dt="2021-05-07T23:29:10.542" v="3263" actId="1076"/>
+          <ac:picMkLst>
+            <pc:docMk/>
+            <pc:sldMk cId="245820475" sldId="264"/>
+            <ac:picMk id="16" creationId="{C5E7E54E-1E42-4AB7-A711-91C438EE6B30}"/>
+          </ac:picMkLst>
+        </pc:picChg>
+        <pc:picChg chg="add mod">
+          <ac:chgData name="Zachary Owen" userId="d1254ce893023eb5" providerId="LiveId" clId="{5481171A-B7C3-41C8-AC9C-C25C4A57EECB}" dt="2021-05-07T23:29:35.706" v="3267" actId="14100"/>
+          <ac:picMkLst>
+            <pc:docMk/>
+            <pc:sldMk cId="245820475" sldId="264"/>
+            <ac:picMk id="18" creationId="{903F1C55-4C98-4540-A03D-BBB39AB7ADE2}"/>
+          </ac:picMkLst>
+        </pc:picChg>
+        <pc:picChg chg="add mod">
+          <ac:chgData name="Zachary Owen" userId="d1254ce893023eb5" providerId="LiveId" clId="{5481171A-B7C3-41C8-AC9C-C25C4A57EECB}" dt="2021-05-07T23:30:11.152" v="3274" actId="1076"/>
+          <ac:picMkLst>
+            <pc:docMk/>
+            <pc:sldMk cId="245820475" sldId="264"/>
+            <ac:picMk id="20" creationId="{7BACF36F-B668-4669-9115-4958F808BE4A}"/>
+          </ac:picMkLst>
+        </pc:picChg>
       </pc:sldChg>
-      <pc:sldChg chg="addSp delSp modSp mod modClrScheme chgLayout">
-        <pc:chgData name="Zachary Owen" userId="d1254ce893023eb5" providerId="LiveId" clId="{5481171A-B7C3-41C8-AC9C-C25C4A57EECB}" dt="2021-05-07T02:02:27.729" v="2376" actId="20577"/>
+      <pc:sldChg chg="modSp mod">
+        <pc:chgData name="Zachary Owen" userId="d1254ce893023eb5" providerId="LiveId" clId="{5481171A-B7C3-41C8-AC9C-C25C4A57EECB}" dt="2021-05-07T23:53:55.446" v="4718" actId="20577"/>
+        <pc:sldMkLst>
+          <pc:docMk/>
+          <pc:sldMk cId="1124292129" sldId="265"/>
+        </pc:sldMkLst>
+        <pc:spChg chg="mod">
+          <ac:chgData name="Zachary Owen" userId="d1254ce893023eb5" providerId="LiveId" clId="{5481171A-B7C3-41C8-AC9C-C25C4A57EECB}" dt="2021-05-07T23:53:55.446" v="4718" actId="20577"/>
+          <ac:spMkLst>
+            <pc:docMk/>
+            <pc:sldMk cId="1124292129" sldId="265"/>
+            <ac:spMk id="5" creationId="{DE5518ED-C692-4AB4-968A-DB790776D463}"/>
+          </ac:spMkLst>
+        </pc:spChg>
+      </pc:sldChg>
+      <pc:sldChg chg="modSp mod">
+        <pc:chgData name="Zachary Owen" userId="d1254ce893023eb5" providerId="LiveId" clId="{5481171A-B7C3-41C8-AC9C-C25C4A57EECB}" dt="2021-05-07T23:59:53.797" v="5457" actId="20577"/>
+        <pc:sldMkLst>
+          <pc:docMk/>
+          <pc:sldMk cId="2873331056" sldId="266"/>
+        </pc:sldMkLst>
+        <pc:spChg chg="mod">
+          <ac:chgData name="Zachary Owen" userId="d1254ce893023eb5" providerId="LiveId" clId="{5481171A-B7C3-41C8-AC9C-C25C4A57EECB}" dt="2021-05-07T23:59:53.797" v="5457" actId="20577"/>
+          <ac:spMkLst>
+            <pc:docMk/>
+            <pc:sldMk cId="2873331056" sldId="266"/>
+            <ac:spMk id="3" creationId="{37BC5CEB-47EF-47C0-A6F6-AB2320CCE3A5}"/>
+          </ac:spMkLst>
+        </pc:spChg>
+      </pc:sldChg>
+      <pc:sldChg chg="addSp delSp modSp mod modClrScheme chgLayout modNotesTx">
+        <pc:chgData name="Zachary Owen" userId="d1254ce893023eb5" providerId="LiveId" clId="{5481171A-B7C3-41C8-AC9C-C25C4A57EECB}" dt="2021-05-07T23:37:11.197" v="3516" actId="27636"/>
         <pc:sldMkLst>
           <pc:docMk/>
           <pc:sldMk cId="3399668416" sldId="268"/>
@@ -295,6 +535,14 @@
             <ac:spMk id="2" creationId="{ABF86C2E-231F-40B8-8AD6-02C95CCD1E7E}"/>
           </ac:spMkLst>
         </pc:spChg>
+        <pc:spChg chg="add del mod">
+          <ac:chgData name="Zachary Owen" userId="d1254ce893023eb5" providerId="LiveId" clId="{5481171A-B7C3-41C8-AC9C-C25C4A57EECB}" dt="2021-05-07T23:22:04.596" v="3159" actId="931"/>
+          <ac:spMkLst>
+            <pc:docMk/>
+            <pc:sldMk cId="3399668416" sldId="268"/>
+            <ac:spMk id="3" creationId="{2F5A975B-8414-4E14-94C9-80B53CF0EED6}"/>
+          </ac:spMkLst>
+        </pc:spChg>
         <pc:spChg chg="add del mod ord">
           <ac:chgData name="Zachary Owen" userId="d1254ce893023eb5" providerId="LiveId" clId="{5481171A-B7C3-41C8-AC9C-C25C4A57EECB}" dt="2021-05-07T01:38:12.063" v="1602" actId="700"/>
           <ac:spMkLst>
@@ -304,19 +552,27 @@
           </ac:spMkLst>
         </pc:spChg>
         <pc:spChg chg="add mod ord">
-          <ac:chgData name="Zachary Owen" userId="d1254ce893023eb5" providerId="LiveId" clId="{5481171A-B7C3-41C8-AC9C-C25C4A57EECB}" dt="2021-05-07T02:02:27.729" v="2376" actId="20577"/>
+          <ac:chgData name="Zachary Owen" userId="d1254ce893023eb5" providerId="LiveId" clId="{5481171A-B7C3-41C8-AC9C-C25C4A57EECB}" dt="2021-05-07T23:35:55.243" v="3473" actId="27636"/>
           <ac:spMkLst>
             <pc:docMk/>
             <pc:sldMk cId="3399668416" sldId="268"/>
             <ac:spMk id="6" creationId="{2415EC17-CDAA-4D6C-9B43-5C8E6DCEEA30}"/>
           </ac:spMkLst>
         </pc:spChg>
-        <pc:spChg chg="add mod ord">
-          <ac:chgData name="Zachary Owen" userId="d1254ce893023eb5" providerId="LiveId" clId="{5481171A-B7C3-41C8-AC9C-C25C4A57EECB}" dt="2021-05-07T01:44:08.756" v="2191" actId="1076"/>
+        <pc:spChg chg="add del mod ord">
+          <ac:chgData name="Zachary Owen" userId="d1254ce893023eb5" providerId="LiveId" clId="{5481171A-B7C3-41C8-AC9C-C25C4A57EECB}" dt="2021-05-07T23:35:08.549" v="3440" actId="478"/>
           <ac:spMkLst>
             <pc:docMk/>
             <pc:sldMk cId="3399668416" sldId="268"/>
             <ac:spMk id="8" creationId="{4CC4C537-53CF-46CF-9D35-8A76BE90B82E}"/>
+          </ac:spMkLst>
+        </pc:spChg>
+        <pc:spChg chg="add del mod">
+          <ac:chgData name="Zachary Owen" userId="d1254ce893023eb5" providerId="LiveId" clId="{5481171A-B7C3-41C8-AC9C-C25C4A57EECB}" dt="2021-05-07T23:22:33.853" v="3161" actId="931"/>
+          <ac:spMkLst>
+            <pc:docMk/>
+            <pc:sldMk cId="3399668416" sldId="268"/>
+            <ac:spMk id="9" creationId="{363929B2-4578-4A3D-87E4-A566937314E4}"/>
           </ac:spMkLst>
         </pc:spChg>
         <pc:spChg chg="add del mod ord">
@@ -328,7 +584,7 @@
           </ac:spMkLst>
         </pc:spChg>
         <pc:spChg chg="add mod ord">
-          <ac:chgData name="Zachary Owen" userId="d1254ce893023eb5" providerId="LiveId" clId="{5481171A-B7C3-41C8-AC9C-C25C4A57EECB}" dt="2021-05-07T01:43:27.160" v="2180" actId="14100"/>
+          <ac:chgData name="Zachary Owen" userId="d1254ce893023eb5" providerId="LiveId" clId="{5481171A-B7C3-41C8-AC9C-C25C4A57EECB}" dt="2021-05-07T23:37:11.197" v="3516" actId="27636"/>
           <ac:spMkLst>
             <pc:docMk/>
             <pc:sldMk cId="3399668416" sldId="268"/>
@@ -343,12 +599,36 @@
             <ac:spMk id="13" creationId="{53EA2494-A1FB-4D85-99C7-DCD12D9FC5D0}"/>
           </ac:spMkLst>
         </pc:spChg>
+        <pc:spChg chg="add del mod ord">
+          <ac:chgData name="Zachary Owen" userId="d1254ce893023eb5" providerId="LiveId" clId="{5481171A-B7C3-41C8-AC9C-C25C4A57EECB}" dt="2021-05-07T23:36:21.090" v="3480" actId="21"/>
+          <ac:spMkLst>
+            <pc:docMk/>
+            <pc:sldMk cId="3399668416" sldId="268"/>
+            <ac:spMk id="22" creationId="{116F40BC-8AB2-47FF-BDD4-397EE405566B}"/>
+          </ac:spMkLst>
+        </pc:spChg>
+        <pc:spChg chg="add del mod">
+          <ac:chgData name="Zachary Owen" userId="d1254ce893023eb5" providerId="LiveId" clId="{5481171A-B7C3-41C8-AC9C-C25C4A57EECB}" dt="2021-05-07T23:36:47.086" v="3508"/>
+          <ac:spMkLst>
+            <pc:docMk/>
+            <pc:sldMk cId="3399668416" sldId="268"/>
+            <ac:spMk id="23" creationId="{9054B2F4-56AA-49DD-B62B-B9401121EAC5}"/>
+          </ac:spMkLst>
+        </pc:spChg>
         <pc:picChg chg="del">
           <ac:chgData name="Zachary Owen" userId="d1254ce893023eb5" providerId="LiveId" clId="{5481171A-B7C3-41C8-AC9C-C25C4A57EECB}" dt="2021-05-07T01:37:46.593" v="1597" actId="478"/>
           <ac:picMkLst>
             <pc:docMk/>
             <pc:sldMk cId="3399668416" sldId="268"/>
             <ac:picMk id="5" creationId="{76CEB22F-39AC-4062-B28C-B0677D838823}"/>
+          </ac:picMkLst>
+        </pc:picChg>
+        <pc:picChg chg="add mod ord">
+          <ac:chgData name="Zachary Owen" userId="d1254ce893023eb5" providerId="LiveId" clId="{5481171A-B7C3-41C8-AC9C-C25C4A57EECB}" dt="2021-05-07T23:35:55.226" v="3472" actId="700"/>
+          <ac:picMkLst>
+            <pc:docMk/>
+            <pc:sldMk cId="3399668416" sldId="268"/>
+            <ac:picMk id="5" creationId="{7DEC3078-992B-4D94-AC5F-2E51333C7D16}"/>
           </ac:picMkLst>
         </pc:picChg>
         <pc:picChg chg="del">
@@ -375,6 +655,22 @@
             <ac:picMk id="11" creationId="{7ABEE123-B957-4258-9DE4-36F51EE8EE96}"/>
           </ac:picMkLst>
         </pc:picChg>
+        <pc:picChg chg="add mod ord">
+          <ac:chgData name="Zachary Owen" userId="d1254ce893023eb5" providerId="LiveId" clId="{5481171A-B7C3-41C8-AC9C-C25C4A57EECB}" dt="2021-05-07T23:36:06.672" v="3476" actId="1076"/>
+          <ac:picMkLst>
+            <pc:docMk/>
+            <pc:sldMk cId="3399668416" sldId="268"/>
+            <ac:picMk id="11" creationId="{AC6172F2-058C-4A73-8191-6002414092D6}"/>
+          </ac:picMkLst>
+        </pc:picChg>
+        <pc:picChg chg="add mod">
+          <ac:chgData name="Zachary Owen" userId="d1254ce893023eb5" providerId="LiveId" clId="{5481171A-B7C3-41C8-AC9C-C25C4A57EECB}" dt="2021-05-07T23:23:45.786" v="3216" actId="1035"/>
+          <ac:picMkLst>
+            <pc:docMk/>
+            <pc:sldMk cId="3399668416" sldId="268"/>
+            <ac:picMk id="14" creationId="{52F2F952-BE94-48C0-AB4E-1110B8F2974D}"/>
+          </ac:picMkLst>
+        </pc:picChg>
         <pc:picChg chg="add del mod">
           <ac:chgData name="Zachary Owen" userId="d1254ce893023eb5" providerId="LiveId" clId="{5481171A-B7C3-41C8-AC9C-C25C4A57EECB}" dt="2021-05-07T01:39:40.888" v="1608" actId="931"/>
           <ac:picMkLst>
@@ -384,30 +680,46 @@
           </ac:picMkLst>
         </pc:picChg>
         <pc:picChg chg="add mod">
-          <ac:chgData name="Zachary Owen" userId="d1254ce893023eb5" providerId="LiveId" clId="{5481171A-B7C3-41C8-AC9C-C25C4A57EECB}" dt="2021-05-07T01:39:46.497" v="1609" actId="931"/>
+          <ac:chgData name="Zachary Owen" userId="d1254ce893023eb5" providerId="LiveId" clId="{5481171A-B7C3-41C8-AC9C-C25C4A57EECB}" dt="2021-05-07T23:23:38.962" v="3214" actId="1036"/>
+          <ac:picMkLst>
+            <pc:docMk/>
+            <pc:sldMk cId="3399668416" sldId="268"/>
+            <ac:picMk id="16" creationId="{2295A3B0-BF3D-4B84-8861-D4471F95F4A5}"/>
+          </ac:picMkLst>
+        </pc:picChg>
+        <pc:picChg chg="add del mod">
+          <ac:chgData name="Zachary Owen" userId="d1254ce893023eb5" providerId="LiveId" clId="{5481171A-B7C3-41C8-AC9C-C25C4A57EECB}" dt="2021-05-07T23:21:43.605" v="3158" actId="21"/>
           <ac:picMkLst>
             <pc:docMk/>
             <pc:sldMk cId="3399668416" sldId="268"/>
             <ac:picMk id="17" creationId="{A3349B92-19FF-4437-BA14-472E7B88E3EE}"/>
           </ac:picMkLst>
         </pc:picChg>
-        <pc:picChg chg="add mod">
-          <ac:chgData name="Zachary Owen" userId="d1254ce893023eb5" providerId="LiveId" clId="{5481171A-B7C3-41C8-AC9C-C25C4A57EECB}" dt="2021-05-07T01:39:52.492" v="1610" actId="931"/>
+        <pc:picChg chg="add del mod">
+          <ac:chgData name="Zachary Owen" userId="d1254ce893023eb5" providerId="LiveId" clId="{5481171A-B7C3-41C8-AC9C-C25C4A57EECB}" dt="2021-05-07T23:22:13.055" v="3160" actId="21"/>
           <ac:picMkLst>
             <pc:docMk/>
             <pc:sldMk cId="3399668416" sldId="268"/>
             <ac:picMk id="19" creationId="{04396126-D6CF-48A1-B279-1DE1B511A262}"/>
           </ac:picMkLst>
         </pc:picChg>
+        <pc:picChg chg="add mod">
+          <ac:chgData name="Zachary Owen" userId="d1254ce893023eb5" providerId="LiveId" clId="{5481171A-B7C3-41C8-AC9C-C25C4A57EECB}" dt="2021-05-07T23:24:10.472" v="3224" actId="1035"/>
+          <ac:picMkLst>
+            <pc:docMk/>
+            <pc:sldMk cId="3399668416" sldId="268"/>
+            <ac:picMk id="20" creationId="{ECA59790-F2D9-4938-85A8-AAA0186BBA30}"/>
+          </ac:picMkLst>
+        </pc:picChg>
       </pc:sldChg>
-      <pc:sldChg chg="addSp delSp modSp new mod">
-        <pc:chgData name="Zachary Owen" userId="d1254ce893023eb5" providerId="LiveId" clId="{5481171A-B7C3-41C8-AC9C-C25C4A57EECB}" dt="2021-05-07T02:05:48.305" v="2459" actId="20577"/>
+      <pc:sldChg chg="addSp delSp modSp new mod modClrScheme chgLayout">
+        <pc:chgData name="Zachary Owen" userId="d1254ce893023eb5" providerId="LiveId" clId="{5481171A-B7C3-41C8-AC9C-C25C4A57EECB}" dt="2021-05-07T23:40:01.365" v="3534" actId="20577"/>
         <pc:sldMkLst>
           <pc:docMk/>
           <pc:sldMk cId="2067421192" sldId="269"/>
         </pc:sldMkLst>
-        <pc:spChg chg="mod">
-          <ac:chgData name="Zachary Owen" userId="d1254ce893023eb5" providerId="LiveId" clId="{5481171A-B7C3-41C8-AC9C-C25C4A57EECB}" dt="2021-05-07T02:02:30.567" v="2377" actId="20577"/>
+        <pc:spChg chg="mod ord">
+          <ac:chgData name="Zachary Owen" userId="d1254ce893023eb5" providerId="LiveId" clId="{5481171A-B7C3-41C8-AC9C-C25C4A57EECB}" dt="2021-05-07T23:39:17.508" v="3518" actId="27636"/>
           <ac:spMkLst>
             <pc:docMk/>
             <pc:sldMk cId="2067421192" sldId="269"/>
@@ -431,7 +743,15 @@
           </ac:spMkLst>
         </pc:spChg>
         <pc:spChg chg="add del mod">
-          <ac:chgData name="Zachary Owen" userId="d1254ce893023eb5" providerId="LiveId" clId="{5481171A-B7C3-41C8-AC9C-C25C4A57EECB}" dt="2021-05-07T01:57:06.829" v="2370" actId="27636"/>
+          <ac:chgData name="Zachary Owen" userId="d1254ce893023eb5" providerId="LiveId" clId="{5481171A-B7C3-41C8-AC9C-C25C4A57EECB}" dt="2021-05-07T23:24:27.090" v="3226" actId="931"/>
+          <ac:spMkLst>
+            <pc:docMk/>
+            <pc:sldMk cId="2067421192" sldId="269"/>
+            <ac:spMk id="4" creationId="{F441C6B9-7FDF-4E40-892B-27353BB96CD9}"/>
+          </ac:spMkLst>
+        </pc:spChg>
+        <pc:spChg chg="add del mod ord">
+          <ac:chgData name="Zachary Owen" userId="d1254ce893023eb5" providerId="LiveId" clId="{5481171A-B7C3-41C8-AC9C-C25C4A57EECB}" dt="2021-05-07T23:39:33.349" v="3523" actId="21"/>
           <ac:spMkLst>
             <pc:docMk/>
             <pc:sldMk cId="2067421192" sldId="269"/>
@@ -446,8 +766,8 @@
             <ac:spMk id="6" creationId="{11D41EB6-0336-4F69-9C1E-9E86F2967D95}"/>
           </ac:spMkLst>
         </pc:spChg>
-        <pc:spChg chg="add mod">
-          <ac:chgData name="Zachary Owen" userId="d1254ce893023eb5" providerId="LiveId" clId="{5481171A-B7C3-41C8-AC9C-C25C4A57EECB}" dt="2021-05-07T02:05:48.305" v="2459" actId="20577"/>
+        <pc:spChg chg="add mod ord">
+          <ac:chgData name="Zachary Owen" userId="d1254ce893023eb5" providerId="LiveId" clId="{5481171A-B7C3-41C8-AC9C-C25C4A57EECB}" dt="2021-05-07T23:40:01.365" v="3534" actId="20577"/>
           <ac:spMkLst>
             <pc:docMk/>
             <pc:sldMk cId="2067421192" sldId="269"/>
@@ -462,20 +782,131 @@
             <ac:spMk id="8" creationId="{44497BEB-4392-4FE8-906A-849804560A30}"/>
           </ac:spMkLst>
         </pc:spChg>
-        <pc:picChg chg="add mod">
-          <ac:chgData name="Zachary Owen" userId="d1254ce893023eb5" providerId="LiveId" clId="{5481171A-B7C3-41C8-AC9C-C25C4A57EECB}" dt="2021-05-07T01:50:17.677" v="2366" actId="931"/>
+        <pc:spChg chg="add del mod">
+          <ac:chgData name="Zachary Owen" userId="d1254ce893023eb5" providerId="LiveId" clId="{5481171A-B7C3-41C8-AC9C-C25C4A57EECB}" dt="2021-05-07T23:24:45.449" v="3229" actId="931"/>
+          <ac:spMkLst>
+            <pc:docMk/>
+            <pc:sldMk cId="2067421192" sldId="269"/>
+            <ac:spMk id="11" creationId="{6DE8FED1-BBC5-441B-AE51-654323AD83A7}"/>
+          </ac:spMkLst>
+        </pc:spChg>
+        <pc:spChg chg="add del mod">
+          <ac:chgData name="Zachary Owen" userId="d1254ce893023eb5" providerId="LiveId" clId="{5481171A-B7C3-41C8-AC9C-C25C4A57EECB}" dt="2021-05-07T23:39:46.874" v="3528"/>
+          <ac:spMkLst>
+            <pc:docMk/>
+            <pc:sldMk cId="2067421192" sldId="269"/>
+            <ac:spMk id="21" creationId="{2FA5B7EC-9FCF-4D93-8A86-A3999E313C15}"/>
+          </ac:spMkLst>
+        </pc:spChg>
+        <pc:picChg chg="add mod ord">
+          <ac:chgData name="Zachary Owen" userId="d1254ce893023eb5" providerId="LiveId" clId="{5481171A-B7C3-41C8-AC9C-C25C4A57EECB}" dt="2021-05-07T23:39:17.499" v="3517" actId="700"/>
+          <ac:picMkLst>
+            <pc:docMk/>
+            <pc:sldMk cId="2067421192" sldId="269"/>
+            <ac:picMk id="8" creationId="{85EB10AD-B41B-41E5-BC5D-375751FC60DE}"/>
+          </ac:picMkLst>
+        </pc:picChg>
+        <pc:picChg chg="add del mod">
+          <ac:chgData name="Zachary Owen" userId="d1254ce893023eb5" providerId="LiveId" clId="{5481171A-B7C3-41C8-AC9C-C25C4A57EECB}" dt="2021-05-07T23:24:17.239" v="3225" actId="21"/>
           <ac:picMkLst>
             <pc:docMk/>
             <pc:sldMk cId="2067421192" sldId="269"/>
             <ac:picMk id="10" creationId="{95AA9A84-DE60-4280-A3C7-BB4F6FD04958}"/>
           </ac:picMkLst>
         </pc:picChg>
-        <pc:picChg chg="add mod">
-          <ac:chgData name="Zachary Owen" userId="d1254ce893023eb5" providerId="LiveId" clId="{5481171A-B7C3-41C8-AC9C-C25C4A57EECB}" dt="2021-05-07T01:50:25.266" v="2367" actId="931"/>
+        <pc:picChg chg="add del mod">
+          <ac:chgData name="Zachary Owen" userId="d1254ce893023eb5" providerId="LiveId" clId="{5481171A-B7C3-41C8-AC9C-C25C4A57EECB}" dt="2021-05-07T23:24:36.067" v="3228" actId="21"/>
           <ac:picMkLst>
             <pc:docMk/>
             <pc:sldMk cId="2067421192" sldId="269"/>
             <ac:picMk id="12" creationId="{F1427122-48C4-4571-8A4C-1395129AE599}"/>
+          </ac:picMkLst>
+        </pc:picChg>
+        <pc:picChg chg="add mod ord">
+          <ac:chgData name="Zachary Owen" userId="d1254ce893023eb5" providerId="LiveId" clId="{5481171A-B7C3-41C8-AC9C-C25C4A57EECB}" dt="2021-05-07T23:39:25.480" v="3522" actId="1076"/>
+          <ac:picMkLst>
+            <pc:docMk/>
+            <pc:sldMk cId="2067421192" sldId="269"/>
+            <ac:picMk id="14" creationId="{0D57450E-4C92-4B02-B3C7-5AB334F79890}"/>
+          </ac:picMkLst>
+        </pc:picChg>
+        <pc:picChg chg="add mod">
+          <ac:chgData name="Zachary Owen" userId="d1254ce893023eb5" providerId="LiveId" clId="{5481171A-B7C3-41C8-AC9C-C25C4A57EECB}" dt="2021-05-07T23:25:19.739" v="3235" actId="1076"/>
+          <ac:picMkLst>
+            <pc:docMk/>
+            <pc:sldMk cId="2067421192" sldId="269"/>
+            <ac:picMk id="16" creationId="{1E06DF62-496B-4C72-9331-6D47D92AEC22}"/>
+          </ac:picMkLst>
+        </pc:picChg>
+        <pc:picChg chg="add mod">
+          <ac:chgData name="Zachary Owen" userId="d1254ce893023eb5" providerId="LiveId" clId="{5481171A-B7C3-41C8-AC9C-C25C4A57EECB}" dt="2021-05-07T23:25:50.497" v="3238" actId="1076"/>
+          <ac:picMkLst>
+            <pc:docMk/>
+            <pc:sldMk cId="2067421192" sldId="269"/>
+            <ac:picMk id="18" creationId="{648B3D4E-C24B-45DA-B948-08588568732F}"/>
+          </ac:picMkLst>
+        </pc:picChg>
+        <pc:picChg chg="add mod">
+          <ac:chgData name="Zachary Owen" userId="d1254ce893023eb5" providerId="LiveId" clId="{5481171A-B7C3-41C8-AC9C-C25C4A57EECB}" dt="2021-05-07T23:26:05.291" v="3241" actId="1076"/>
+          <ac:picMkLst>
+            <pc:docMk/>
+            <pc:sldMk cId="2067421192" sldId="269"/>
+            <ac:picMk id="20" creationId="{1940A2E7-F5E1-4D38-92D3-274BE2621A96}"/>
+          </ac:picMkLst>
+        </pc:picChg>
+      </pc:sldChg>
+      <pc:sldChg chg="addSp delSp modSp new mod ord modClrScheme chgLayout">
+        <pc:chgData name="Zachary Owen" userId="d1254ce893023eb5" providerId="LiveId" clId="{5481171A-B7C3-41C8-AC9C-C25C4A57EECB}" dt="2021-05-08T00:06:21.261" v="6032" actId="1076"/>
+        <pc:sldMkLst>
+          <pc:docMk/>
+          <pc:sldMk cId="2927825439" sldId="270"/>
+        </pc:sldMkLst>
+        <pc:spChg chg="del">
+          <ac:chgData name="Zachary Owen" userId="d1254ce893023eb5" providerId="LiveId" clId="{5481171A-B7C3-41C8-AC9C-C25C4A57EECB}" dt="2021-05-08T00:05:00.305" v="5976" actId="700"/>
+          <ac:spMkLst>
+            <pc:docMk/>
+            <pc:sldMk cId="2927825439" sldId="270"/>
+            <ac:spMk id="2" creationId="{2C6D87E3-971A-43AF-8E3F-C90506F365E4}"/>
+          </ac:spMkLst>
+        </pc:spChg>
+        <pc:spChg chg="del">
+          <ac:chgData name="Zachary Owen" userId="d1254ce893023eb5" providerId="LiveId" clId="{5481171A-B7C3-41C8-AC9C-C25C4A57EECB}" dt="2021-05-08T00:05:00.305" v="5976" actId="700"/>
+          <ac:spMkLst>
+            <pc:docMk/>
+            <pc:sldMk cId="2927825439" sldId="270"/>
+            <ac:spMk id="3" creationId="{C0EEF124-1E92-48DE-B78A-33F4D620278C}"/>
+          </ac:spMkLst>
+        </pc:spChg>
+        <pc:picChg chg="add mod">
+          <ac:chgData name="Zachary Owen" userId="d1254ce893023eb5" providerId="LiveId" clId="{5481171A-B7C3-41C8-AC9C-C25C4A57EECB}" dt="2021-05-08T00:05:49.864" v="5995" actId="1035"/>
+          <ac:picMkLst>
+            <pc:docMk/>
+            <pc:sldMk cId="2927825439" sldId="270"/>
+            <ac:picMk id="5" creationId="{2A35F4CA-F943-4229-A5BA-0C15165609F0}"/>
+          </ac:picMkLst>
+        </pc:picChg>
+        <pc:picChg chg="add mod">
+          <ac:chgData name="Zachary Owen" userId="d1254ce893023eb5" providerId="LiveId" clId="{5481171A-B7C3-41C8-AC9C-C25C4A57EECB}" dt="2021-05-08T00:06:06.678" v="6028" actId="1076"/>
+          <ac:picMkLst>
+            <pc:docMk/>
+            <pc:sldMk cId="2927825439" sldId="270"/>
+            <ac:picMk id="7" creationId="{4D5B7F5E-B2FD-4873-BC06-4F55EFD246BF}"/>
+          </ac:picMkLst>
+        </pc:picChg>
+        <pc:picChg chg="add mod">
+          <ac:chgData name="Zachary Owen" userId="d1254ce893023eb5" providerId="LiveId" clId="{5481171A-B7C3-41C8-AC9C-C25C4A57EECB}" dt="2021-05-08T00:05:58.881" v="6026" actId="1037"/>
+          <ac:picMkLst>
+            <pc:docMk/>
+            <pc:sldMk cId="2927825439" sldId="270"/>
+            <ac:picMk id="9" creationId="{8F91ECCF-40D6-4AE5-B22F-5EBCD2CB9056}"/>
+          </ac:picMkLst>
+        </pc:picChg>
+        <pc:picChg chg="add mod">
+          <ac:chgData name="Zachary Owen" userId="d1254ce893023eb5" providerId="LiveId" clId="{5481171A-B7C3-41C8-AC9C-C25C4A57EECB}" dt="2021-05-08T00:06:21.261" v="6032" actId="1076"/>
+          <ac:picMkLst>
+            <pc:docMk/>
+            <pc:sldMk cId="2927825439" sldId="270"/>
+            <ac:picMk id="11" creationId="{8CB37DE4-12B4-4DAA-92C7-F1578D53715E}"/>
           </ac:picMkLst>
         </pc:picChg>
       </pc:sldChg>
@@ -885,6 +1316,439 @@
     </pc:docChg>
   </pc:docChgLst>
 </pc:chgInfo>
+</file>
+
+<file path=ppt/notesMasters/notesMaster1.xml><?xml version="1.0" encoding="utf-8"?>
+<p:notesMaster xmlns:a="http://schemas.openxmlformats.org/drawingml/2006/main" xmlns:r="http://schemas.openxmlformats.org/officeDocument/2006/relationships" xmlns:p="http://schemas.openxmlformats.org/presentationml/2006/main">
+  <p:cSld>
+    <p:bg>
+      <p:bgRef idx="1001">
+        <a:schemeClr val="bg1"/>
+      </p:bgRef>
+    </p:bg>
+    <p:spTree>
+      <p:nvGrpSpPr>
+        <p:cNvPr id="1" name=""/>
+        <p:cNvGrpSpPr/>
+        <p:nvPr/>
+      </p:nvGrpSpPr>
+      <p:grpSpPr>
+        <a:xfrm>
+          <a:off x="0" y="0"/>
+          <a:ext cx="0" cy="0"/>
+          <a:chOff x="0" y="0"/>
+          <a:chExt cx="0" cy="0"/>
+        </a:xfrm>
+      </p:grpSpPr>
+      <p:sp>
+        <p:nvSpPr>
+          <p:cNvPr id="2" name="Header Placeholder 1"/>
+          <p:cNvSpPr>
+            <a:spLocks noGrp="1"/>
+          </p:cNvSpPr>
+          <p:nvPr>
+            <p:ph type="hdr" sz="quarter"/>
+          </p:nvPr>
+        </p:nvSpPr>
+        <p:spPr>
+          <a:xfrm>
+            <a:off x="0" y="0"/>
+            <a:ext cx="2971800" cy="458788"/>
+          </a:xfrm>
+          <a:prstGeom prst="rect">
+            <a:avLst/>
+          </a:prstGeom>
+        </p:spPr>
+        <p:txBody>
+          <a:bodyPr vert="horz" lIns="91440" tIns="45720" rIns="91440" bIns="45720" rtlCol="0"/>
+          <a:lstStyle>
+            <a:lvl1pPr algn="l">
+              <a:defRPr sz="1200"/>
+            </a:lvl1pPr>
+          </a:lstStyle>
+          <a:p>
+            <a:endParaRPr lang="en-US"/>
+          </a:p>
+        </p:txBody>
+      </p:sp>
+      <p:sp>
+        <p:nvSpPr>
+          <p:cNvPr id="3" name="Date Placeholder 2"/>
+          <p:cNvSpPr>
+            <a:spLocks noGrp="1"/>
+          </p:cNvSpPr>
+          <p:nvPr>
+            <p:ph type="dt" idx="1"/>
+          </p:nvPr>
+        </p:nvSpPr>
+        <p:spPr>
+          <a:xfrm>
+            <a:off x="3884613" y="0"/>
+            <a:ext cx="2971800" cy="458788"/>
+          </a:xfrm>
+          <a:prstGeom prst="rect">
+            <a:avLst/>
+          </a:prstGeom>
+        </p:spPr>
+        <p:txBody>
+          <a:bodyPr vert="horz" lIns="91440" tIns="45720" rIns="91440" bIns="45720" rtlCol="0"/>
+          <a:lstStyle>
+            <a:lvl1pPr algn="r">
+              <a:defRPr sz="1200"/>
+            </a:lvl1pPr>
+          </a:lstStyle>
+          <a:p>
+            <a:fld id="{EE67E564-C22B-4662-A520-8BB37938AEDD}" type="datetimeFigureOut">
+              <a:rPr lang="en-US" smtClean="0"/>
+              <a:t>5/7/2021</a:t>
+            </a:fld>
+            <a:endParaRPr lang="en-US"/>
+          </a:p>
+        </p:txBody>
+      </p:sp>
+      <p:sp>
+        <p:nvSpPr>
+          <p:cNvPr id="4" name="Slide Image Placeholder 3"/>
+          <p:cNvSpPr>
+            <a:spLocks noGrp="1" noRot="1" noChangeAspect="1"/>
+          </p:cNvSpPr>
+          <p:nvPr>
+            <p:ph type="sldImg" idx="2"/>
+          </p:nvPr>
+        </p:nvSpPr>
+        <p:spPr>
+          <a:xfrm>
+            <a:off x="685800" y="1143000"/>
+            <a:ext cx="5486400" cy="3086100"/>
+          </a:xfrm>
+          <a:prstGeom prst="rect">
+            <a:avLst/>
+          </a:prstGeom>
+          <a:noFill/>
+          <a:ln w="12700">
+            <a:solidFill>
+              <a:prstClr val="black"/>
+            </a:solidFill>
+          </a:ln>
+        </p:spPr>
+        <p:txBody>
+          <a:bodyPr vert="horz" lIns="91440" tIns="45720" rIns="91440" bIns="45720" rtlCol="0" anchor="ctr"/>
+          <a:lstStyle/>
+          <a:p>
+            <a:endParaRPr lang="en-US"/>
+          </a:p>
+        </p:txBody>
+      </p:sp>
+      <p:sp>
+        <p:nvSpPr>
+          <p:cNvPr id="5" name="Notes Placeholder 4"/>
+          <p:cNvSpPr>
+            <a:spLocks noGrp="1"/>
+          </p:cNvSpPr>
+          <p:nvPr>
+            <p:ph type="body" sz="quarter" idx="3"/>
+          </p:nvPr>
+        </p:nvSpPr>
+        <p:spPr>
+          <a:xfrm>
+            <a:off x="685800" y="4400550"/>
+            <a:ext cx="5486400" cy="3600450"/>
+          </a:xfrm>
+          <a:prstGeom prst="rect">
+            <a:avLst/>
+          </a:prstGeom>
+        </p:spPr>
+        <p:txBody>
+          <a:bodyPr vert="horz" lIns="91440" tIns="45720" rIns="91440" bIns="45720" rtlCol="0"/>
+          <a:lstStyle/>
+          <a:p>
+            <a:pPr lvl="0"/>
+            <a:r>
+              <a:rPr lang="en-US"/>
+              <a:t>Click to edit Master text styles</a:t>
+            </a:r>
+          </a:p>
+          <a:p>
+            <a:pPr lvl="1"/>
+            <a:r>
+              <a:rPr lang="en-US"/>
+              <a:t>Second level</a:t>
+            </a:r>
+          </a:p>
+          <a:p>
+            <a:pPr lvl="2"/>
+            <a:r>
+              <a:rPr lang="en-US"/>
+              <a:t>Third level</a:t>
+            </a:r>
+          </a:p>
+          <a:p>
+            <a:pPr lvl="3"/>
+            <a:r>
+              <a:rPr lang="en-US"/>
+              <a:t>Fourth level</a:t>
+            </a:r>
+          </a:p>
+          <a:p>
+            <a:pPr lvl="4"/>
+            <a:r>
+              <a:rPr lang="en-US"/>
+              <a:t>Fifth level</a:t>
+            </a:r>
+          </a:p>
+        </p:txBody>
+      </p:sp>
+      <p:sp>
+        <p:nvSpPr>
+          <p:cNvPr id="6" name="Footer Placeholder 5"/>
+          <p:cNvSpPr>
+            <a:spLocks noGrp="1"/>
+          </p:cNvSpPr>
+          <p:nvPr>
+            <p:ph type="ftr" sz="quarter" idx="4"/>
+          </p:nvPr>
+        </p:nvSpPr>
+        <p:spPr>
+          <a:xfrm>
+            <a:off x="0" y="8685213"/>
+            <a:ext cx="2971800" cy="458787"/>
+          </a:xfrm>
+          <a:prstGeom prst="rect">
+            <a:avLst/>
+          </a:prstGeom>
+        </p:spPr>
+        <p:txBody>
+          <a:bodyPr vert="horz" lIns="91440" tIns="45720" rIns="91440" bIns="45720" rtlCol="0" anchor="b"/>
+          <a:lstStyle>
+            <a:lvl1pPr algn="l">
+              <a:defRPr sz="1200"/>
+            </a:lvl1pPr>
+          </a:lstStyle>
+          <a:p>
+            <a:endParaRPr lang="en-US"/>
+          </a:p>
+        </p:txBody>
+      </p:sp>
+      <p:sp>
+        <p:nvSpPr>
+          <p:cNvPr id="7" name="Slide Number Placeholder 6"/>
+          <p:cNvSpPr>
+            <a:spLocks noGrp="1"/>
+          </p:cNvSpPr>
+          <p:nvPr>
+            <p:ph type="sldNum" sz="quarter" idx="5"/>
+          </p:nvPr>
+        </p:nvSpPr>
+        <p:spPr>
+          <a:xfrm>
+            <a:off x="3884613" y="8685213"/>
+            <a:ext cx="2971800" cy="458787"/>
+          </a:xfrm>
+          <a:prstGeom prst="rect">
+            <a:avLst/>
+          </a:prstGeom>
+        </p:spPr>
+        <p:txBody>
+          <a:bodyPr vert="horz" lIns="91440" tIns="45720" rIns="91440" bIns="45720" rtlCol="0" anchor="b"/>
+          <a:lstStyle>
+            <a:lvl1pPr algn="r">
+              <a:defRPr sz="1200"/>
+            </a:lvl1pPr>
+          </a:lstStyle>
+          <a:p>
+            <a:fld id="{30EA3FC9-ABD8-49A9-8E7B-D1E74E2698C8}" type="slidenum">
+              <a:rPr lang="en-US" smtClean="0"/>
+              <a:t>‹#›</a:t>
+            </a:fld>
+            <a:endParaRPr lang="en-US"/>
+          </a:p>
+        </p:txBody>
+      </p:sp>
+    </p:spTree>
+    <p:extLst>
+      <p:ext uri="{BB962C8B-B14F-4D97-AF65-F5344CB8AC3E}">
+        <p14:creationId xmlns:p14="http://schemas.microsoft.com/office/powerpoint/2010/main" val="1820344664"/>
+      </p:ext>
+    </p:extLst>
+  </p:cSld>
+  <p:clrMap bg1="lt1" tx1="dk1" bg2="lt2" tx2="dk2" accent1="accent1" accent2="accent2" accent3="accent3" accent4="accent4" accent5="accent5" accent6="accent6" hlink="hlink" folHlink="folHlink"/>
+  <p:notesStyle>
+    <a:lvl1pPr marL="0" algn="l" defTabSz="914400" rtl="0" eaLnBrk="1" latinLnBrk="0" hangingPunct="1">
+      <a:defRPr sz="1200" kern="1200">
+        <a:solidFill>
+          <a:schemeClr val="tx1"/>
+        </a:solidFill>
+        <a:latin typeface="+mn-lt"/>
+        <a:ea typeface="+mn-ea"/>
+        <a:cs typeface="+mn-cs"/>
+      </a:defRPr>
+    </a:lvl1pPr>
+    <a:lvl2pPr marL="457200" algn="l" defTabSz="914400" rtl="0" eaLnBrk="1" latinLnBrk="0" hangingPunct="1">
+      <a:defRPr sz="1200" kern="1200">
+        <a:solidFill>
+          <a:schemeClr val="tx1"/>
+        </a:solidFill>
+        <a:latin typeface="+mn-lt"/>
+        <a:ea typeface="+mn-ea"/>
+        <a:cs typeface="+mn-cs"/>
+      </a:defRPr>
+    </a:lvl2pPr>
+    <a:lvl3pPr marL="914400" algn="l" defTabSz="914400" rtl="0" eaLnBrk="1" latinLnBrk="0" hangingPunct="1">
+      <a:defRPr sz="1200" kern="1200">
+        <a:solidFill>
+          <a:schemeClr val="tx1"/>
+        </a:solidFill>
+        <a:latin typeface="+mn-lt"/>
+        <a:ea typeface="+mn-ea"/>
+        <a:cs typeface="+mn-cs"/>
+      </a:defRPr>
+    </a:lvl3pPr>
+    <a:lvl4pPr marL="1371600" algn="l" defTabSz="914400" rtl="0" eaLnBrk="1" latinLnBrk="0" hangingPunct="1">
+      <a:defRPr sz="1200" kern="1200">
+        <a:solidFill>
+          <a:schemeClr val="tx1"/>
+        </a:solidFill>
+        <a:latin typeface="+mn-lt"/>
+        <a:ea typeface="+mn-ea"/>
+        <a:cs typeface="+mn-cs"/>
+      </a:defRPr>
+    </a:lvl4pPr>
+    <a:lvl5pPr marL="1828800" algn="l" defTabSz="914400" rtl="0" eaLnBrk="1" latinLnBrk="0" hangingPunct="1">
+      <a:defRPr sz="1200" kern="1200">
+        <a:solidFill>
+          <a:schemeClr val="tx1"/>
+        </a:solidFill>
+        <a:latin typeface="+mn-lt"/>
+        <a:ea typeface="+mn-ea"/>
+        <a:cs typeface="+mn-cs"/>
+      </a:defRPr>
+    </a:lvl5pPr>
+    <a:lvl6pPr marL="2286000" algn="l" defTabSz="914400" rtl="0" eaLnBrk="1" latinLnBrk="0" hangingPunct="1">
+      <a:defRPr sz="1200" kern="1200">
+        <a:solidFill>
+          <a:schemeClr val="tx1"/>
+        </a:solidFill>
+        <a:latin typeface="+mn-lt"/>
+        <a:ea typeface="+mn-ea"/>
+        <a:cs typeface="+mn-cs"/>
+      </a:defRPr>
+    </a:lvl6pPr>
+    <a:lvl7pPr marL="2743200" algn="l" defTabSz="914400" rtl="0" eaLnBrk="1" latinLnBrk="0" hangingPunct="1">
+      <a:defRPr sz="1200" kern="1200">
+        <a:solidFill>
+          <a:schemeClr val="tx1"/>
+        </a:solidFill>
+        <a:latin typeface="+mn-lt"/>
+        <a:ea typeface="+mn-ea"/>
+        <a:cs typeface="+mn-cs"/>
+      </a:defRPr>
+    </a:lvl7pPr>
+    <a:lvl8pPr marL="3200400" algn="l" defTabSz="914400" rtl="0" eaLnBrk="1" latinLnBrk="0" hangingPunct="1">
+      <a:defRPr sz="1200" kern="1200">
+        <a:solidFill>
+          <a:schemeClr val="tx1"/>
+        </a:solidFill>
+        <a:latin typeface="+mn-lt"/>
+        <a:ea typeface="+mn-ea"/>
+        <a:cs typeface="+mn-cs"/>
+      </a:defRPr>
+    </a:lvl8pPr>
+    <a:lvl9pPr marL="3657600" algn="l" defTabSz="914400" rtl="0" eaLnBrk="1" latinLnBrk="0" hangingPunct="1">
+      <a:defRPr sz="1200" kern="1200">
+        <a:solidFill>
+          <a:schemeClr val="tx1"/>
+        </a:solidFill>
+        <a:latin typeface="+mn-lt"/>
+        <a:ea typeface="+mn-ea"/>
+        <a:cs typeface="+mn-cs"/>
+      </a:defRPr>
+    </a:lvl9pPr>
+  </p:notesStyle>
+</p:notesMaster>
+</file>
+
+<file path=ppt/notesSlides/notesSlide1.xml><?xml version="1.0" encoding="utf-8"?>
+<p:notes xmlns:a="http://schemas.openxmlformats.org/drawingml/2006/main" xmlns:r="http://schemas.openxmlformats.org/officeDocument/2006/relationships" xmlns:p="http://schemas.openxmlformats.org/presentationml/2006/main">
+  <p:cSld>
+    <p:spTree>
+      <p:nvGrpSpPr>
+        <p:cNvPr id="1" name=""/>
+        <p:cNvGrpSpPr/>
+        <p:nvPr/>
+      </p:nvGrpSpPr>
+      <p:grpSpPr>
+        <a:xfrm>
+          <a:off x="0" y="0"/>
+          <a:ext cx="0" cy="0"/>
+          <a:chOff x="0" y="0"/>
+          <a:chExt cx="0" cy="0"/>
+        </a:xfrm>
+      </p:grpSpPr>
+      <p:sp>
+        <p:nvSpPr>
+          <p:cNvPr id="2" name="Slide Image Placeholder 1"/>
+          <p:cNvSpPr>
+            <a:spLocks noGrp="1" noRot="1" noChangeAspect="1"/>
+          </p:cNvSpPr>
+          <p:nvPr>
+            <p:ph type="sldImg"/>
+          </p:nvPr>
+        </p:nvSpPr>
+        <p:spPr/>
+      </p:sp>
+      <p:sp>
+        <p:nvSpPr>
+          <p:cNvPr id="3" name="Notes Placeholder 2"/>
+          <p:cNvSpPr>
+            <a:spLocks noGrp="1"/>
+          </p:cNvSpPr>
+          <p:nvPr>
+            <p:ph type="body" idx="1"/>
+          </p:nvPr>
+        </p:nvSpPr>
+        <p:spPr/>
+        <p:txBody>
+          <a:bodyPr/>
+          <a:lstStyle/>
+          <a:p>
+            <a:endParaRPr lang="en-US" dirty="0"/>
+          </a:p>
+        </p:txBody>
+      </p:sp>
+      <p:sp>
+        <p:nvSpPr>
+          <p:cNvPr id="4" name="Slide Number Placeholder 3"/>
+          <p:cNvSpPr>
+            <a:spLocks noGrp="1"/>
+          </p:cNvSpPr>
+          <p:nvPr>
+            <p:ph type="sldNum" sz="quarter" idx="5"/>
+          </p:nvPr>
+        </p:nvSpPr>
+        <p:spPr/>
+        <p:txBody>
+          <a:bodyPr/>
+          <a:lstStyle/>
+          <a:p>
+            <a:fld id="{30EA3FC9-ABD8-49A9-8E7B-D1E74E2698C8}" type="slidenum">
+              <a:rPr lang="en-US" smtClean="0"/>
+              <a:t>9</a:t>
+            </a:fld>
+            <a:endParaRPr lang="en-US"/>
+          </a:p>
+        </p:txBody>
+      </p:sp>
+    </p:spTree>
+    <p:extLst>
+      <p:ext uri="{BB962C8B-B14F-4D97-AF65-F5344CB8AC3E}">
+        <p14:creationId xmlns:p14="http://schemas.microsoft.com/office/powerpoint/2010/main" val="3583179474"/>
+      </p:ext>
+    </p:extLst>
+  </p:cSld>
+  <p:clrMapOvr>
+    <a:masterClrMapping/>
+  </p:clrMapOvr>
+</p:notes>
 </file>
 
 <file path=ppt/slideLayouts/slideLayout1.xml><?xml version="1.0" encoding="utf-8"?>
@@ -4236,7 +5100,7 @@
           <p:cNvPr id="2" name="Title 1">
             <a:extLst>
               <a:ext uri="{FF2B5EF4-FFF2-40B4-BE49-F238E27FC236}">
-                <a16:creationId xmlns:a16="http://schemas.microsoft.com/office/drawing/2014/main" id="{9465B42F-D2D6-4EC1-836D-661E95F38FAA}"/>
+                <a16:creationId xmlns:a16="http://schemas.microsoft.com/office/drawing/2014/main" id="{498D281F-3D16-489C-B0DC-D1BEA3665997}"/>
               </a:ext>
             </a:extLst>
           </p:cNvPr>
@@ -4249,47 +5113,14 @@
         </p:nvSpPr>
         <p:spPr/>
         <p:txBody>
-          <a:bodyPr/>
+          <a:bodyPr>
+            <a:normAutofit/>
+          </a:bodyPr>
           <a:lstStyle/>
           <a:p>
             <a:r>
               <a:rPr lang="en-US" dirty="0"/>
               <a:t> </a:t>
-            </a:r>
-          </a:p>
-        </p:txBody>
-      </p:sp>
-      <p:sp>
-        <p:nvSpPr>
-          <p:cNvPr id="3" name="Text Placeholder 2">
-            <a:extLst>
-              <a:ext uri="{FF2B5EF4-FFF2-40B4-BE49-F238E27FC236}">
-                <a16:creationId xmlns:a16="http://schemas.microsoft.com/office/drawing/2014/main" id="{7F06FBF8-4F4C-4401-B430-DDA78954DA72}"/>
-              </a:ext>
-            </a:extLst>
-          </p:cNvPr>
-          <p:cNvSpPr>
-            <a:spLocks noGrp="1"/>
-          </p:cNvSpPr>
-          <p:nvPr>
-            <p:ph type="body" idx="1"/>
-          </p:nvPr>
-        </p:nvSpPr>
-        <p:spPr>
-          <a:xfrm>
-            <a:off x="839788" y="365125"/>
-            <a:ext cx="5157787" cy="2139950"/>
-          </a:xfrm>
-        </p:spPr>
-        <p:txBody>
-          <a:bodyPr>
-            <a:normAutofit fontScale="85000" lnSpcReduction="20000"/>
-          </a:bodyPr>
-          <a:lstStyle/>
-          <a:p>
-            <a:r>
-              <a:rPr lang="en-US" b="0" dirty="0"/>
-              <a:t>The next variable to be analyzed was the Vaccination Progress compared to the Percent of Health Expenditure from the Private Sector. This was a very interesting set of data as it suggested that as the percentage of health expenditure in the private sector goes down, the rate of vaccinations go up. This suggests that public healthcare increases the rate of vaccinations.</a:t>
             </a:r>
           </a:p>
         </p:txBody>
@@ -4299,7 +5130,7 @@
           <p:cNvPr id="8" name="Content Placeholder 7">
             <a:extLst>
               <a:ext uri="{FF2B5EF4-FFF2-40B4-BE49-F238E27FC236}">
-                <a16:creationId xmlns:a16="http://schemas.microsoft.com/office/drawing/2014/main" id="{49ED9D2D-C1C1-49D8-BF73-BB8E07DA0315}"/>
+                <a16:creationId xmlns:a16="http://schemas.microsoft.com/office/drawing/2014/main" id="{85EB10AD-B41B-41E5-BC5D-375751FC60DE}"/>
               </a:ext>
             </a:extLst>
           </p:cNvPr>
@@ -4307,7 +5138,7 @@
             <a:picLocks noGrp="1" noChangeAspect="1"/>
           </p:cNvPicPr>
           <p:nvPr>
-            <p:ph sz="half" idx="2"/>
+            <p:ph sz="half" idx="1"/>
           </p:nvPr>
         </p:nvPicPr>
         <p:blipFill>
@@ -4324,52 +5155,17 @@
         </p:blipFill>
         <p:spPr>
           <a:xfrm>
-            <a:off x="839788" y="2628107"/>
-            <a:ext cx="5157787" cy="3438524"/>
+            <a:off x="838200" y="2274094"/>
+            <a:ext cx="5181600" cy="3454400"/>
           </a:xfrm>
         </p:spPr>
       </p:pic>
-      <p:sp>
-        <p:nvSpPr>
-          <p:cNvPr id="5" name="Text Placeholder 4">
-            <a:extLst>
-              <a:ext uri="{FF2B5EF4-FFF2-40B4-BE49-F238E27FC236}">
-                <a16:creationId xmlns:a16="http://schemas.microsoft.com/office/drawing/2014/main" id="{6AAA2E70-BD26-4F45-A1DC-52D3E8F764FE}"/>
-              </a:ext>
-            </a:extLst>
-          </p:cNvPr>
-          <p:cNvSpPr>
-            <a:spLocks noGrp="1"/>
-          </p:cNvSpPr>
-          <p:nvPr>
-            <p:ph type="body" sz="quarter" idx="3"/>
-          </p:nvPr>
-        </p:nvSpPr>
-        <p:spPr>
-          <a:xfrm>
-            <a:off x="6172200" y="365125"/>
-            <a:ext cx="5183188" cy="889517"/>
-          </a:xfrm>
-        </p:spPr>
-        <p:txBody>
-          <a:bodyPr>
-            <a:normAutofit fontScale="85000" lnSpcReduction="20000"/>
-          </a:bodyPr>
-          <a:lstStyle/>
-          <a:p>
-            <a:r>
-              <a:rPr lang="en-US" b="0" dirty="0"/>
-              <a:t>This data failed to reject the null hypothesis, thus there is no statistical difference between the data in the different quartiles.</a:t>
-            </a:r>
-          </a:p>
-        </p:txBody>
-      </p:sp>
       <p:pic>
         <p:nvPicPr>
-          <p:cNvPr id="10" name="Content Placeholder 9">
-            <a:extLst>
-              <a:ext uri="{FF2B5EF4-FFF2-40B4-BE49-F238E27FC236}">
-                <a16:creationId xmlns:a16="http://schemas.microsoft.com/office/drawing/2014/main" id="{042C3FEF-9FCC-4F0E-987C-5DC75AC5886A}"/>
+          <p:cNvPr id="14" name="Content Placeholder 13">
+            <a:extLst>
+              <a:ext uri="{FF2B5EF4-FFF2-40B4-BE49-F238E27FC236}">
+                <a16:creationId xmlns:a16="http://schemas.microsoft.com/office/drawing/2014/main" id="{0D57450E-4C92-4B02-B3C7-5AB334F79890}"/>
               </a:ext>
             </a:extLst>
           </p:cNvPr>
@@ -4377,7 +5173,7 @@
             <a:picLocks noGrp="1" noChangeAspect="1"/>
           </p:cNvPicPr>
           <p:nvPr>
-            <p:ph sz="quarter" idx="4"/>
+            <p:ph sz="half" idx="2"/>
           </p:nvPr>
         </p:nvPicPr>
         <p:blipFill>
@@ -4394,33 +5190,183 @@
         </p:blipFill>
         <p:spPr>
           <a:xfrm>
-            <a:off x="6172200" y="2619640"/>
-            <a:ext cx="5183188" cy="3455458"/>
+            <a:off x="6172200" y="2636575"/>
+            <a:ext cx="2739788" cy="1826525"/>
           </a:xfrm>
+        </p:spPr>
+      </p:pic>
+      <p:sp>
+        <p:nvSpPr>
+          <p:cNvPr id="7" name="Text Placeholder 7">
+            <a:extLst>
+              <a:ext uri="{FF2B5EF4-FFF2-40B4-BE49-F238E27FC236}">
+                <a16:creationId xmlns:a16="http://schemas.microsoft.com/office/drawing/2014/main" id="{5EAD9029-8924-4194-8BE8-381AAABAEACB}"/>
+              </a:ext>
+            </a:extLst>
+          </p:cNvPr>
+          <p:cNvSpPr>
+            <a:spLocks noGrp="1"/>
+          </p:cNvSpPr>
+          <p:nvPr>
+            <p:ph type="body" idx="4294967295"/>
+          </p:nvPr>
+        </p:nvSpPr>
+        <p:spPr>
+          <a:xfrm>
+            <a:off x="838200" y="552450"/>
+            <a:ext cx="10640462" cy="1624013"/>
+          </a:xfrm>
+        </p:spPr>
+        <p:txBody>
+          <a:bodyPr>
+            <a:normAutofit/>
+          </a:bodyPr>
+          <a:lstStyle/>
+          <a:p>
+            <a:pPr marL="0" indent="0" algn="ctr">
+              <a:buNone/>
+            </a:pPr>
+            <a:r>
+              <a:rPr lang="en-US" sz="3900" b="0" dirty="0"/>
+              <a:t>GDP</a:t>
+            </a:r>
+            <a:endParaRPr lang="en-US" dirty="0"/>
+          </a:p>
+          <a:p>
+            <a:pPr marL="0" indent="0" algn="ctr">
+              <a:buNone/>
+            </a:pPr>
+            <a:r>
+              <a:rPr lang="en-US" b="0" dirty="0"/>
+              <a:t>This data failed to reject the null hypothesis, thus there is no statistical difference between the data in the different quartiles.</a:t>
+            </a:r>
+          </a:p>
+          <a:p>
+            <a:pPr marL="0" indent="0">
+              <a:buNone/>
+            </a:pPr>
+            <a:endParaRPr lang="en-US" b="0" dirty="0"/>
+          </a:p>
+        </p:txBody>
+      </p:sp>
+      <p:pic>
+        <p:nvPicPr>
+          <p:cNvPr id="16" name="Picture 15">
+            <a:extLst>
+              <a:ext uri="{FF2B5EF4-FFF2-40B4-BE49-F238E27FC236}">
+                <a16:creationId xmlns:a16="http://schemas.microsoft.com/office/drawing/2014/main" id="{1E06DF62-496B-4C72-9331-6D47D92AEC22}"/>
+              </a:ext>
+            </a:extLst>
+          </p:cNvPr>
+          <p:cNvPicPr>
+            <a:picLocks noChangeAspect="1"/>
+          </p:cNvPicPr>
+          <p:nvPr/>
+        </p:nvPicPr>
+        <p:blipFill>
+          <a:blip r:embed="rId4">
+            <a:extLst>
+              <a:ext uri="{28A0092B-C50C-407E-A947-70E740481C1C}">
+                <a14:useLocalDpi xmlns:a14="http://schemas.microsoft.com/office/drawing/2010/main" val="0"/>
+              </a:ext>
+            </a:extLst>
+          </a:blip>
+          <a:stretch>
+            <a:fillRect/>
+          </a:stretch>
+        </p:blipFill>
+        <p:spPr>
+          <a:xfrm>
+            <a:off x="8738875" y="2628107"/>
+            <a:ext cx="2739788" cy="1826526"/>
+          </a:xfrm>
+          <a:prstGeom prst="rect">
+            <a:avLst/>
+          </a:prstGeom>
+        </p:spPr>
+      </p:pic>
+      <p:pic>
+        <p:nvPicPr>
+          <p:cNvPr id="18" name="Picture 17">
+            <a:extLst>
+              <a:ext uri="{FF2B5EF4-FFF2-40B4-BE49-F238E27FC236}">
+                <a16:creationId xmlns:a16="http://schemas.microsoft.com/office/drawing/2014/main" id="{648B3D4E-C24B-45DA-B948-08588568732F}"/>
+              </a:ext>
+            </a:extLst>
+          </p:cNvPr>
+          <p:cNvPicPr>
+            <a:picLocks noChangeAspect="1"/>
+          </p:cNvPicPr>
+          <p:nvPr/>
+        </p:nvPicPr>
+        <p:blipFill>
+          <a:blip r:embed="rId5">
+            <a:extLst>
+              <a:ext uri="{28A0092B-C50C-407E-A947-70E740481C1C}">
+                <a14:useLocalDpi xmlns:a14="http://schemas.microsoft.com/office/drawing/2010/main" val="0"/>
+              </a:ext>
+            </a:extLst>
+          </a:blip>
+          <a:stretch>
+            <a:fillRect/>
+          </a:stretch>
+        </p:blipFill>
+        <p:spPr>
+          <a:xfrm>
+            <a:off x="6172200" y="4454632"/>
+            <a:ext cx="2739788" cy="1826525"/>
+          </a:xfrm>
+          <a:prstGeom prst="rect">
+            <a:avLst/>
+          </a:prstGeom>
+        </p:spPr>
+      </p:pic>
+      <p:pic>
+        <p:nvPicPr>
+          <p:cNvPr id="20" name="Picture 19">
+            <a:extLst>
+              <a:ext uri="{FF2B5EF4-FFF2-40B4-BE49-F238E27FC236}">
+                <a16:creationId xmlns:a16="http://schemas.microsoft.com/office/drawing/2014/main" id="{1940A2E7-F5E1-4D38-92D3-274BE2621A96}"/>
+              </a:ext>
+            </a:extLst>
+          </p:cNvPr>
+          <p:cNvPicPr>
+            <a:picLocks noChangeAspect="1"/>
+          </p:cNvPicPr>
+          <p:nvPr/>
+        </p:nvPicPr>
+        <p:blipFill>
+          <a:blip r:embed="rId6">
+            <a:extLst>
+              <a:ext uri="{28A0092B-C50C-407E-A947-70E740481C1C}">
+                <a14:useLocalDpi xmlns:a14="http://schemas.microsoft.com/office/drawing/2010/main" val="0"/>
+              </a:ext>
+            </a:extLst>
+          </a:blip>
+          <a:stretch>
+            <a:fillRect/>
+          </a:stretch>
+        </p:blipFill>
+        <p:spPr>
+          <a:xfrm>
+            <a:off x="8738875" y="4446165"/>
+            <a:ext cx="2739788" cy="1826525"/>
+          </a:xfrm>
+          <a:prstGeom prst="rect">
+            <a:avLst/>
+          </a:prstGeom>
         </p:spPr>
       </p:pic>
     </p:spTree>
     <p:extLst>
       <p:ext uri="{BB962C8B-B14F-4D97-AF65-F5344CB8AC3E}">
-        <p14:creationId xmlns:p14="http://schemas.microsoft.com/office/powerpoint/2010/main" val="1138257485"/>
+        <p14:creationId xmlns:p14="http://schemas.microsoft.com/office/powerpoint/2010/main" val="2067421192"/>
       </p:ext>
     </p:extLst>
   </p:cSld>
   <p:clrMapOvr>
     <a:masterClrMapping/>
   </p:clrMapOvr>
-  <mc:AlternateContent xmlns:mc="http://schemas.openxmlformats.org/markup-compatibility/2006" xmlns:p14="http://schemas.microsoft.com/office/powerpoint/2010/main">
-    <mc:Choice Requires="p14">
-      <p:transition spd="med" p14:dur="700">
-        <p:fade/>
-      </p:transition>
-    </mc:Choice>
-    <mc:Fallback xmlns="">
-      <p:transition spd="med">
-        <p:fade/>
-      </p:transition>
-    </mc:Fallback>
-  </mc:AlternateContent>
 </p:sld>
 </file>
 
@@ -4446,7 +5392,7 @@
           <p:cNvPr id="2" name="Title 1">
             <a:extLst>
               <a:ext uri="{FF2B5EF4-FFF2-40B4-BE49-F238E27FC236}">
-                <a16:creationId xmlns:a16="http://schemas.microsoft.com/office/drawing/2014/main" id="{CF2F4417-6ADD-4BE7-9C57-95BA49F8A6AF}"/>
+                <a16:creationId xmlns:a16="http://schemas.microsoft.com/office/drawing/2014/main" id="{9465B42F-D2D6-4EC1-836D-661E95F38FAA}"/>
               </a:ext>
             </a:extLst>
           </p:cNvPr>
@@ -4469,82 +5415,12 @@
           </a:p>
         </p:txBody>
       </p:sp>
-      <p:sp>
-        <p:nvSpPr>
-          <p:cNvPr id="3" name="Text Placeholder 2">
-            <a:extLst>
-              <a:ext uri="{FF2B5EF4-FFF2-40B4-BE49-F238E27FC236}">
-                <a16:creationId xmlns:a16="http://schemas.microsoft.com/office/drawing/2014/main" id="{4297D99A-3B39-46D0-88FD-5F62849FBEA2}"/>
-              </a:ext>
-            </a:extLst>
-          </p:cNvPr>
-          <p:cNvSpPr>
-            <a:spLocks noGrp="1"/>
-          </p:cNvSpPr>
-          <p:nvPr>
-            <p:ph type="body" idx="1"/>
-          </p:nvPr>
-        </p:nvSpPr>
-        <p:spPr>
-          <a:xfrm>
-            <a:off x="839788" y="457200"/>
-            <a:ext cx="5157787" cy="1223963"/>
-          </a:xfrm>
-        </p:spPr>
-        <p:txBody>
-          <a:bodyPr>
-            <a:normAutofit fontScale="92500" lnSpcReduction="10000"/>
-          </a:bodyPr>
-          <a:lstStyle/>
-          <a:p>
-            <a:r>
-              <a:rPr lang="en-US" b="0" dirty="0"/>
-              <a:t>The next variable to be analyzed was the Vaccination Progress compared to the Population Density. This was the dataset with the highest statistical correlation.</a:t>
-            </a:r>
-          </a:p>
-        </p:txBody>
-      </p:sp>
-      <p:sp>
-        <p:nvSpPr>
-          <p:cNvPr id="5" name="Text Placeholder 4">
-            <a:extLst>
-              <a:ext uri="{FF2B5EF4-FFF2-40B4-BE49-F238E27FC236}">
-                <a16:creationId xmlns:a16="http://schemas.microsoft.com/office/drawing/2014/main" id="{B865C62A-5914-4786-B24E-EE3631EFAFCC}"/>
-              </a:ext>
-            </a:extLst>
-          </p:cNvPr>
-          <p:cNvSpPr>
-            <a:spLocks noGrp="1"/>
-          </p:cNvSpPr>
-          <p:nvPr>
-            <p:ph type="body" sz="quarter" idx="3"/>
-          </p:nvPr>
-        </p:nvSpPr>
-        <p:spPr>
-          <a:xfrm>
-            <a:off x="6172200" y="542261"/>
-            <a:ext cx="5183188" cy="935666"/>
-          </a:xfrm>
-        </p:spPr>
-        <p:txBody>
-          <a:bodyPr>
-            <a:normAutofit fontScale="92500" lnSpcReduction="10000"/>
-          </a:bodyPr>
-          <a:lstStyle/>
-          <a:p>
-            <a:r>
-              <a:rPr lang="en-US" b="0" dirty="0"/>
-              <a:t>This data rejected the null hypothesis, suggesting that there is a statistical difference between the quartiles.</a:t>
-            </a:r>
-          </a:p>
-        </p:txBody>
-      </p:sp>
       <p:pic>
         <p:nvPicPr>
-          <p:cNvPr id="10" name="Content Placeholder 9">
-            <a:extLst>
-              <a:ext uri="{FF2B5EF4-FFF2-40B4-BE49-F238E27FC236}">
-                <a16:creationId xmlns:a16="http://schemas.microsoft.com/office/drawing/2014/main" id="{45DF83FE-FC71-4661-9C6B-7863524CCB70}"/>
+          <p:cNvPr id="20" name="Content Placeholder 19">
+            <a:extLst>
+              <a:ext uri="{FF2B5EF4-FFF2-40B4-BE49-F238E27FC236}">
+                <a16:creationId xmlns:a16="http://schemas.microsoft.com/office/drawing/2014/main" id="{36F9AF64-BAF9-4D6E-B8DD-35A1DAB97453}"/>
               </a:ext>
             </a:extLst>
           </p:cNvPr>
@@ -4552,7 +5428,7 @@
             <a:picLocks noGrp="1" noChangeAspect="1"/>
           </p:cNvPicPr>
           <p:nvPr>
-            <p:ph sz="quarter" idx="4"/>
+            <p:ph sz="half" idx="1"/>
           </p:nvPr>
         </p:nvPicPr>
         <p:blipFill>
@@ -4569,17 +5445,17 @@
         </p:blipFill>
         <p:spPr>
           <a:xfrm>
-            <a:off x="6172200" y="2619640"/>
-            <a:ext cx="5183188" cy="3455458"/>
+            <a:off x="838200" y="2274094"/>
+            <a:ext cx="5181600" cy="3454400"/>
           </a:xfrm>
         </p:spPr>
       </p:pic>
       <p:pic>
         <p:nvPicPr>
-          <p:cNvPr id="14" name="Content Placeholder 13">
-            <a:extLst>
-              <a:ext uri="{FF2B5EF4-FFF2-40B4-BE49-F238E27FC236}">
-                <a16:creationId xmlns:a16="http://schemas.microsoft.com/office/drawing/2014/main" id="{166FF831-7E78-435D-AFA5-983C435BDDDD}"/>
+          <p:cNvPr id="9" name="Content Placeholder 8">
+            <a:extLst>
+              <a:ext uri="{FF2B5EF4-FFF2-40B4-BE49-F238E27FC236}">
+                <a16:creationId xmlns:a16="http://schemas.microsoft.com/office/drawing/2014/main" id="{5B92ABD6-BC09-41A2-92F7-5DBB7D5436DD}"/>
               </a:ext>
             </a:extLst>
           </p:cNvPr>
@@ -4604,15 +5480,177 @@
         </p:blipFill>
         <p:spPr>
           <a:xfrm>
-            <a:off x="839788" y="2628107"/>
-            <a:ext cx="5157787" cy="3438524"/>
+            <a:off x="6172199" y="2630259"/>
+            <a:ext cx="2862744" cy="1908496"/>
           </a:xfrm>
+        </p:spPr>
+      </p:pic>
+      <p:sp>
+        <p:nvSpPr>
+          <p:cNvPr id="5" name="Text Placeholder 4">
+            <a:extLst>
+              <a:ext uri="{FF2B5EF4-FFF2-40B4-BE49-F238E27FC236}">
+                <a16:creationId xmlns:a16="http://schemas.microsoft.com/office/drawing/2014/main" id="{6AAA2E70-BD26-4F45-A1DC-52D3E8F764FE}"/>
+              </a:ext>
+            </a:extLst>
+          </p:cNvPr>
+          <p:cNvSpPr>
+            <a:spLocks noGrp="1"/>
+          </p:cNvSpPr>
+          <p:nvPr>
+            <p:ph type="body" sz="quarter" idx="4294967295"/>
+          </p:nvPr>
+        </p:nvSpPr>
+        <p:spPr>
+          <a:xfrm>
+            <a:off x="838201" y="365125"/>
+            <a:ext cx="10788335" cy="1534696"/>
+          </a:xfrm>
+        </p:spPr>
+        <p:txBody>
+          <a:bodyPr>
+            <a:normAutofit/>
+          </a:bodyPr>
+          <a:lstStyle/>
+          <a:p>
+            <a:pPr marL="0" indent="0" algn="ctr">
+              <a:buNone/>
+            </a:pPr>
+            <a:r>
+              <a:rPr lang="en-US" sz="3900" dirty="0"/>
+              <a:t>Percent of Health Expenditure in the Private Sector</a:t>
+            </a:r>
+            <a:endParaRPr lang="en-US" dirty="0"/>
+          </a:p>
+          <a:p>
+            <a:pPr marL="0" indent="0" algn="ctr">
+              <a:buNone/>
+            </a:pPr>
+            <a:r>
+              <a:rPr lang="en-US" b="0" dirty="0"/>
+              <a:t>This data failed to reject the null hypothesis, thus there is no statistical difference between the data in the different quartiles.</a:t>
+            </a:r>
+          </a:p>
+          <a:p>
+            <a:pPr marL="0" indent="0">
+              <a:buNone/>
+            </a:pPr>
+            <a:endParaRPr lang="en-US" b="0" dirty="0"/>
+          </a:p>
+        </p:txBody>
+      </p:sp>
+      <p:pic>
+        <p:nvPicPr>
+          <p:cNvPr id="12" name="Picture 11">
+            <a:extLst>
+              <a:ext uri="{FF2B5EF4-FFF2-40B4-BE49-F238E27FC236}">
+                <a16:creationId xmlns:a16="http://schemas.microsoft.com/office/drawing/2014/main" id="{AB080098-B93E-4E22-B9E3-1990565E308C}"/>
+              </a:ext>
+            </a:extLst>
+          </p:cNvPr>
+          <p:cNvPicPr>
+            <a:picLocks noChangeAspect="1"/>
+          </p:cNvPicPr>
+          <p:nvPr/>
+        </p:nvPicPr>
+        <p:blipFill>
+          <a:blip r:embed="rId4">
+            <a:extLst>
+              <a:ext uri="{28A0092B-C50C-407E-A947-70E740481C1C}">
+                <a14:useLocalDpi xmlns:a14="http://schemas.microsoft.com/office/drawing/2010/main" val="0"/>
+              </a:ext>
+            </a:extLst>
+          </a:blip>
+          <a:stretch>
+            <a:fillRect/>
+          </a:stretch>
+        </p:blipFill>
+        <p:spPr>
+          <a:xfrm>
+            <a:off x="8763794" y="2628107"/>
+            <a:ext cx="2862743" cy="1908496"/>
+          </a:xfrm>
+          <a:prstGeom prst="rect">
+            <a:avLst/>
+          </a:prstGeom>
+        </p:spPr>
+      </p:pic>
+      <p:pic>
+        <p:nvPicPr>
+          <p:cNvPr id="14" name="Picture 13">
+            <a:extLst>
+              <a:ext uri="{FF2B5EF4-FFF2-40B4-BE49-F238E27FC236}">
+                <a16:creationId xmlns:a16="http://schemas.microsoft.com/office/drawing/2014/main" id="{5056C991-98AA-4B59-8276-149F28325D39}"/>
+              </a:ext>
+            </a:extLst>
+          </p:cNvPr>
+          <p:cNvPicPr>
+            <a:picLocks noChangeAspect="1"/>
+          </p:cNvPicPr>
+          <p:nvPr/>
+        </p:nvPicPr>
+        <p:blipFill>
+          <a:blip r:embed="rId5">
+            <a:extLst>
+              <a:ext uri="{28A0092B-C50C-407E-A947-70E740481C1C}">
+                <a14:useLocalDpi xmlns:a14="http://schemas.microsoft.com/office/drawing/2010/main" val="0"/>
+              </a:ext>
+            </a:extLst>
+          </a:blip>
+          <a:stretch>
+            <a:fillRect/>
+          </a:stretch>
+        </p:blipFill>
+        <p:spPr>
+          <a:xfrm>
+            <a:off x="6172199" y="4589535"/>
+            <a:ext cx="2862743" cy="1908496"/>
+          </a:xfrm>
+          <a:prstGeom prst="rect">
+            <a:avLst/>
+          </a:prstGeom>
+        </p:spPr>
+      </p:pic>
+      <p:pic>
+        <p:nvPicPr>
+          <p:cNvPr id="16" name="Picture 15">
+            <a:extLst>
+              <a:ext uri="{FF2B5EF4-FFF2-40B4-BE49-F238E27FC236}">
+                <a16:creationId xmlns:a16="http://schemas.microsoft.com/office/drawing/2014/main" id="{9FDF3129-C844-41DC-B2E2-B8FA966DD458}"/>
+              </a:ext>
+            </a:extLst>
+          </p:cNvPr>
+          <p:cNvPicPr>
+            <a:picLocks noChangeAspect="1"/>
+          </p:cNvPicPr>
+          <p:nvPr/>
+        </p:nvPicPr>
+        <p:blipFill>
+          <a:blip r:embed="rId6">
+            <a:extLst>
+              <a:ext uri="{28A0092B-C50C-407E-A947-70E740481C1C}">
+                <a14:useLocalDpi xmlns:a14="http://schemas.microsoft.com/office/drawing/2010/main" val="0"/>
+              </a:ext>
+            </a:extLst>
+          </a:blip>
+          <a:stretch>
+            <a:fillRect/>
+          </a:stretch>
+        </p:blipFill>
+        <p:spPr>
+          <a:xfrm>
+            <a:off x="8763793" y="4596261"/>
+            <a:ext cx="2862743" cy="1908496"/>
+          </a:xfrm>
+          <a:prstGeom prst="rect">
+            <a:avLst/>
+          </a:prstGeom>
         </p:spPr>
       </p:pic>
     </p:spTree>
     <p:extLst>
       <p:ext uri="{BB962C8B-B14F-4D97-AF65-F5344CB8AC3E}">
-        <p14:creationId xmlns:p14="http://schemas.microsoft.com/office/powerpoint/2010/main" val="245820475"/>
+        <p14:creationId xmlns:p14="http://schemas.microsoft.com/office/powerpoint/2010/main" val="1138257485"/>
       </p:ext>
     </p:extLst>
   </p:cSld>
@@ -4656,7 +5694,7 @@
           <p:cNvPr id="2" name="Title 1">
             <a:extLst>
               <a:ext uri="{FF2B5EF4-FFF2-40B4-BE49-F238E27FC236}">
-                <a16:creationId xmlns:a16="http://schemas.microsoft.com/office/drawing/2014/main" id="{30815FA2-03BF-442A-8BD1-8201FC7B92A4}"/>
+                <a16:creationId xmlns:a16="http://schemas.microsoft.com/office/drawing/2014/main" id="{CF2F4417-6ADD-4BE7-9C57-95BA49F8A6AF}"/>
               </a:ext>
             </a:extLst>
           </p:cNvPr>
@@ -4674,55 +5712,240 @@
           <a:p>
             <a:r>
               <a:rPr lang="en-US" dirty="0"/>
-              <a:t>Discuss Findings	</a:t>
-            </a:r>
-          </a:p>
-        </p:txBody>
-      </p:sp>
-      <p:sp>
-        <p:nvSpPr>
-          <p:cNvPr id="5" name="Content Placeholder 4">
-            <a:extLst>
-              <a:ext uri="{FF2B5EF4-FFF2-40B4-BE49-F238E27FC236}">
-                <a16:creationId xmlns:a16="http://schemas.microsoft.com/office/drawing/2014/main" id="{DE5518ED-C692-4AB4-968A-DB790776D463}"/>
-              </a:ext>
-            </a:extLst>
-          </p:cNvPr>
-          <p:cNvSpPr>
-            <a:spLocks noGrp="1"/>
-          </p:cNvSpPr>
-          <p:nvPr>
-            <p:ph idx="1"/>
-          </p:nvPr>
-        </p:nvSpPr>
-        <p:spPr/>
-        <p:txBody>
-          <a:bodyPr/>
+              <a:t> </a:t>
+            </a:r>
+          </a:p>
+        </p:txBody>
+      </p:sp>
+      <p:pic>
+        <p:nvPicPr>
+          <p:cNvPr id="8" name="Content Placeholder 7">
+            <a:extLst>
+              <a:ext uri="{FF2B5EF4-FFF2-40B4-BE49-F238E27FC236}">
+                <a16:creationId xmlns:a16="http://schemas.microsoft.com/office/drawing/2014/main" id="{38CA3494-8DC3-4829-8B47-A12068612DF6}"/>
+              </a:ext>
+            </a:extLst>
+          </p:cNvPr>
+          <p:cNvPicPr>
+            <a:picLocks noGrp="1" noChangeAspect="1"/>
+          </p:cNvPicPr>
+          <p:nvPr>
+            <p:ph sz="half" idx="1"/>
+          </p:nvPr>
+        </p:nvPicPr>
+        <p:blipFill>
+          <a:blip r:embed="rId2">
+            <a:extLst>
+              <a:ext uri="{28A0092B-C50C-407E-A947-70E740481C1C}">
+                <a14:useLocalDpi xmlns:a14="http://schemas.microsoft.com/office/drawing/2010/main" val="0"/>
+              </a:ext>
+            </a:extLst>
+          </a:blip>
+          <a:stretch>
+            <a:fillRect/>
+          </a:stretch>
+        </p:blipFill>
+        <p:spPr>
+          <a:xfrm>
+            <a:off x="838200" y="2274094"/>
+            <a:ext cx="5181600" cy="3454400"/>
+          </a:xfrm>
+        </p:spPr>
+      </p:pic>
+      <p:pic>
+        <p:nvPicPr>
+          <p:cNvPr id="13" name="Content Placeholder 12">
+            <a:extLst>
+              <a:ext uri="{FF2B5EF4-FFF2-40B4-BE49-F238E27FC236}">
+                <a16:creationId xmlns:a16="http://schemas.microsoft.com/office/drawing/2014/main" id="{34470B16-E026-4201-888D-3B91EA3C6A15}"/>
+              </a:ext>
+            </a:extLst>
+          </p:cNvPr>
+          <p:cNvPicPr>
+            <a:picLocks noGrp="1" noChangeAspect="1"/>
+          </p:cNvPicPr>
+          <p:nvPr>
+            <p:ph sz="half" idx="2"/>
+          </p:nvPr>
+        </p:nvPicPr>
+        <p:blipFill>
+          <a:blip r:embed="rId3">
+            <a:extLst>
+              <a:ext uri="{28A0092B-C50C-407E-A947-70E740481C1C}">
+                <a14:useLocalDpi xmlns:a14="http://schemas.microsoft.com/office/drawing/2010/main" val="0"/>
+              </a:ext>
+            </a:extLst>
+          </a:blip>
+          <a:stretch>
+            <a:fillRect/>
+          </a:stretch>
+        </p:blipFill>
+        <p:spPr>
+          <a:xfrm>
+            <a:off x="6172200" y="2628107"/>
+            <a:ext cx="2711741" cy="1807827"/>
+          </a:xfrm>
+        </p:spPr>
+      </p:pic>
+      <p:sp>
+        <p:nvSpPr>
+          <p:cNvPr id="5" name="Text Placeholder 4">
+            <a:extLst>
+              <a:ext uri="{FF2B5EF4-FFF2-40B4-BE49-F238E27FC236}">
+                <a16:creationId xmlns:a16="http://schemas.microsoft.com/office/drawing/2014/main" id="{B865C62A-5914-4786-B24E-EE3631EFAFCC}"/>
+              </a:ext>
+            </a:extLst>
+          </p:cNvPr>
+          <p:cNvSpPr>
+            <a:spLocks noGrp="1"/>
+          </p:cNvSpPr>
+          <p:nvPr>
+            <p:ph type="body" sz="quarter" idx="4294967295"/>
+          </p:nvPr>
+        </p:nvSpPr>
+        <p:spPr>
+          <a:xfrm>
+            <a:off x="838201" y="542925"/>
+            <a:ext cx="10515599" cy="1325562"/>
+          </a:xfrm>
+        </p:spPr>
+        <p:txBody>
+          <a:bodyPr>
+            <a:normAutofit fontScale="92500" lnSpcReduction="10000"/>
+          </a:bodyPr>
           <a:lstStyle/>
           <a:p>
-            <a:r>
-              <a:rPr lang="en-US" dirty="0"/>
-              <a:t>GDP not as impactful as initially expected</a:t>
-            </a:r>
-          </a:p>
-          <a:p>
-            <a:r>
-              <a:rPr lang="en-US" dirty="0"/>
-              <a:t>Population Density had highest correlation</a:t>
-            </a:r>
-          </a:p>
-          <a:p>
-            <a:r>
-              <a:rPr lang="en-US" dirty="0"/>
-              <a:t>Private Healthcare Expenditure</a:t>
-            </a:r>
-          </a:p>
-        </p:txBody>
-      </p:sp>
+            <a:pPr marL="0" indent="0" algn="ctr">
+              <a:buNone/>
+            </a:pPr>
+            <a:r>
+              <a:rPr lang="en-US" sz="3900" b="0" dirty="0"/>
+              <a:t>Population Density</a:t>
+            </a:r>
+          </a:p>
+          <a:p>
+            <a:pPr marL="0" indent="0" algn="ctr">
+              <a:buNone/>
+            </a:pPr>
+            <a:r>
+              <a:rPr lang="en-US" b="0" dirty="0"/>
+              <a:t>This data rejected the null hypothesis, this suggests there is a statistical difference between the data in the different quartiles</a:t>
+            </a:r>
+          </a:p>
+        </p:txBody>
+      </p:sp>
+      <p:pic>
+        <p:nvPicPr>
+          <p:cNvPr id="16" name="Picture 15">
+            <a:extLst>
+              <a:ext uri="{FF2B5EF4-FFF2-40B4-BE49-F238E27FC236}">
+                <a16:creationId xmlns:a16="http://schemas.microsoft.com/office/drawing/2014/main" id="{C5E7E54E-1E42-4AB7-A711-91C438EE6B30}"/>
+              </a:ext>
+            </a:extLst>
+          </p:cNvPr>
+          <p:cNvPicPr>
+            <a:picLocks noChangeAspect="1"/>
+          </p:cNvPicPr>
+          <p:nvPr/>
+        </p:nvPicPr>
+        <p:blipFill>
+          <a:blip r:embed="rId4">
+            <a:extLst>
+              <a:ext uri="{28A0092B-C50C-407E-A947-70E740481C1C}">
+                <a14:useLocalDpi xmlns:a14="http://schemas.microsoft.com/office/drawing/2010/main" val="0"/>
+              </a:ext>
+            </a:extLst>
+          </a:blip>
+          <a:stretch>
+            <a:fillRect/>
+          </a:stretch>
+        </p:blipFill>
+        <p:spPr>
+          <a:xfrm>
+            <a:off x="8822765" y="2628107"/>
+            <a:ext cx="2711741" cy="1807827"/>
+          </a:xfrm>
+          <a:prstGeom prst="rect">
+            <a:avLst/>
+          </a:prstGeom>
+        </p:spPr>
+      </p:pic>
+      <p:pic>
+        <p:nvPicPr>
+          <p:cNvPr id="18" name="Picture 17">
+            <a:extLst>
+              <a:ext uri="{FF2B5EF4-FFF2-40B4-BE49-F238E27FC236}">
+                <a16:creationId xmlns:a16="http://schemas.microsoft.com/office/drawing/2014/main" id="{903F1C55-4C98-4540-A03D-BBB39AB7ADE2}"/>
+              </a:ext>
+            </a:extLst>
+          </p:cNvPr>
+          <p:cNvPicPr>
+            <a:picLocks noChangeAspect="1"/>
+          </p:cNvPicPr>
+          <p:nvPr/>
+        </p:nvPicPr>
+        <p:blipFill>
+          <a:blip r:embed="rId5">
+            <a:extLst>
+              <a:ext uri="{28A0092B-C50C-407E-A947-70E740481C1C}">
+                <a14:useLocalDpi xmlns:a14="http://schemas.microsoft.com/office/drawing/2010/main" val="0"/>
+              </a:ext>
+            </a:extLst>
+          </a:blip>
+          <a:stretch>
+            <a:fillRect/>
+          </a:stretch>
+        </p:blipFill>
+        <p:spPr>
+          <a:xfrm>
+            <a:off x="6172200" y="4427467"/>
+            <a:ext cx="2711741" cy="1807827"/>
+          </a:xfrm>
+          <a:prstGeom prst="rect">
+            <a:avLst/>
+          </a:prstGeom>
+        </p:spPr>
+      </p:pic>
+      <p:pic>
+        <p:nvPicPr>
+          <p:cNvPr id="20" name="Picture 19">
+            <a:extLst>
+              <a:ext uri="{FF2B5EF4-FFF2-40B4-BE49-F238E27FC236}">
+                <a16:creationId xmlns:a16="http://schemas.microsoft.com/office/drawing/2014/main" id="{7BACF36F-B668-4669-9115-4958F808BE4A}"/>
+              </a:ext>
+            </a:extLst>
+          </p:cNvPr>
+          <p:cNvPicPr>
+            <a:picLocks noChangeAspect="1"/>
+          </p:cNvPicPr>
+          <p:nvPr/>
+        </p:nvPicPr>
+        <p:blipFill>
+          <a:blip r:embed="rId6">
+            <a:extLst>
+              <a:ext uri="{28A0092B-C50C-407E-A947-70E740481C1C}">
+                <a14:useLocalDpi xmlns:a14="http://schemas.microsoft.com/office/drawing/2010/main" val="0"/>
+              </a:ext>
+            </a:extLst>
+          </a:blip>
+          <a:stretch>
+            <a:fillRect/>
+          </a:stretch>
+        </p:blipFill>
+        <p:spPr>
+          <a:xfrm>
+            <a:off x="8883941" y="4423233"/>
+            <a:ext cx="2711741" cy="1807828"/>
+          </a:xfrm>
+          <a:prstGeom prst="rect">
+            <a:avLst/>
+          </a:prstGeom>
+        </p:spPr>
+      </p:pic>
     </p:spTree>
     <p:extLst>
       <p:ext uri="{BB962C8B-B14F-4D97-AF65-F5344CB8AC3E}">
-        <p14:creationId xmlns:p14="http://schemas.microsoft.com/office/powerpoint/2010/main" val="1124292129"/>
+        <p14:creationId xmlns:p14="http://schemas.microsoft.com/office/powerpoint/2010/main" val="245820475"/>
       </p:ext>
     </p:extLst>
   </p:cSld>
@@ -4766,7 +5989,7 @@
           <p:cNvPr id="2" name="Title 1">
             <a:extLst>
               <a:ext uri="{FF2B5EF4-FFF2-40B4-BE49-F238E27FC236}">
-                <a16:creationId xmlns:a16="http://schemas.microsoft.com/office/drawing/2014/main" id="{72C13216-17B7-4511-86FF-7E1C5386C42A}"/>
+                <a16:creationId xmlns:a16="http://schemas.microsoft.com/office/drawing/2014/main" id="{30815FA2-03BF-442A-8BD1-8201FC7B92A4}"/>
               </a:ext>
             </a:extLst>
           </p:cNvPr>
@@ -4784,17 +6007,17 @@
           <a:p>
             <a:r>
               <a:rPr lang="en-US" dirty="0"/>
-              <a:t>Post-Mortem</a:t>
-            </a:r>
-          </a:p>
-        </p:txBody>
-      </p:sp>
-      <p:sp>
-        <p:nvSpPr>
-          <p:cNvPr id="3" name="Content Placeholder 2">
-            <a:extLst>
-              <a:ext uri="{FF2B5EF4-FFF2-40B4-BE49-F238E27FC236}">
-                <a16:creationId xmlns:a16="http://schemas.microsoft.com/office/drawing/2014/main" id="{37BC5CEB-47EF-47C0-A6F6-AB2320CCE3A5}"/>
+              <a:t>Discuss Findings	</a:t>
+            </a:r>
+          </a:p>
+        </p:txBody>
+      </p:sp>
+      <p:sp>
+        <p:nvSpPr>
+          <p:cNvPr id="5" name="Content Placeholder 4">
+            <a:extLst>
+              <a:ext uri="{FF2B5EF4-FFF2-40B4-BE49-F238E27FC236}">
+                <a16:creationId xmlns:a16="http://schemas.microsoft.com/office/drawing/2014/main" id="{DE5518ED-C692-4AB4-968A-DB790776D463}"/>
               </a:ext>
             </a:extLst>
           </p:cNvPr>
@@ -4812,13 +6035,129 @@
           <a:p>
             <a:r>
               <a:rPr lang="en-US" dirty="0"/>
-              <a:t>Time difficulty with the reporting of data</a:t>
+              <a:t>Based on the GDP scatter plots the r values suggest a relationship, but the ANOVA test did not find any statistically significant relationship</a:t>
             </a:r>
           </a:p>
           <a:p>
             <a:r>
               <a:rPr lang="en-US" dirty="0"/>
-              <a:t>With more time use the newly incoming census data to look at poverty rate as a factor </a:t>
+              <a:t>The ANOVA test proved that there was statistically significant difference per quartile based on Population Density</a:t>
+            </a:r>
+          </a:p>
+          <a:p>
+            <a:r>
+              <a:rPr lang="en-US" dirty="0"/>
+              <a:t>While Private Healthcare Expenditure did not have any statistically significant relationship, that data was very interesting for what it suggested about the effects of Public Healthcare.</a:t>
+            </a:r>
+          </a:p>
+        </p:txBody>
+      </p:sp>
+    </p:spTree>
+    <p:extLst>
+      <p:ext uri="{BB962C8B-B14F-4D97-AF65-F5344CB8AC3E}">
+        <p14:creationId xmlns:p14="http://schemas.microsoft.com/office/powerpoint/2010/main" val="1124292129"/>
+      </p:ext>
+    </p:extLst>
+  </p:cSld>
+  <p:clrMapOvr>
+    <a:masterClrMapping/>
+  </p:clrMapOvr>
+  <mc:AlternateContent xmlns:mc="http://schemas.openxmlformats.org/markup-compatibility/2006" xmlns:p14="http://schemas.microsoft.com/office/powerpoint/2010/main">
+    <mc:Choice Requires="p14">
+      <p:transition spd="med" p14:dur="700">
+        <p:fade/>
+      </p:transition>
+    </mc:Choice>
+    <mc:Fallback xmlns="">
+      <p:transition spd="med">
+        <p:fade/>
+      </p:transition>
+    </mc:Fallback>
+  </mc:AlternateContent>
+</p:sld>
+</file>
+
+<file path=ppt/slides/slide14.xml><?xml version="1.0" encoding="utf-8"?>
+<p:sld xmlns:a="http://schemas.openxmlformats.org/drawingml/2006/main" xmlns:r="http://schemas.openxmlformats.org/officeDocument/2006/relationships" xmlns:p="http://schemas.openxmlformats.org/presentationml/2006/main">
+  <p:cSld>
+    <p:spTree>
+      <p:nvGrpSpPr>
+        <p:cNvPr id="1" name=""/>
+        <p:cNvGrpSpPr/>
+        <p:nvPr/>
+      </p:nvGrpSpPr>
+      <p:grpSpPr>
+        <a:xfrm>
+          <a:off x="0" y="0"/>
+          <a:ext cx="0" cy="0"/>
+          <a:chOff x="0" y="0"/>
+          <a:chExt cx="0" cy="0"/>
+        </a:xfrm>
+      </p:grpSpPr>
+      <p:sp>
+        <p:nvSpPr>
+          <p:cNvPr id="2" name="Title 1">
+            <a:extLst>
+              <a:ext uri="{FF2B5EF4-FFF2-40B4-BE49-F238E27FC236}">
+                <a16:creationId xmlns:a16="http://schemas.microsoft.com/office/drawing/2014/main" id="{72C13216-17B7-4511-86FF-7E1C5386C42A}"/>
+              </a:ext>
+            </a:extLst>
+          </p:cNvPr>
+          <p:cNvSpPr>
+            <a:spLocks noGrp="1"/>
+          </p:cNvSpPr>
+          <p:nvPr>
+            <p:ph type="title"/>
+          </p:nvPr>
+        </p:nvSpPr>
+        <p:spPr/>
+        <p:txBody>
+          <a:bodyPr/>
+          <a:lstStyle/>
+          <a:p>
+            <a:r>
+              <a:rPr lang="en-US" dirty="0"/>
+              <a:t>Post-Mortem</a:t>
+            </a:r>
+          </a:p>
+        </p:txBody>
+      </p:sp>
+      <p:sp>
+        <p:nvSpPr>
+          <p:cNvPr id="3" name="Content Placeholder 2">
+            <a:extLst>
+              <a:ext uri="{FF2B5EF4-FFF2-40B4-BE49-F238E27FC236}">
+                <a16:creationId xmlns:a16="http://schemas.microsoft.com/office/drawing/2014/main" id="{37BC5CEB-47EF-47C0-A6F6-AB2320CCE3A5}"/>
+              </a:ext>
+            </a:extLst>
+          </p:cNvPr>
+          <p:cNvSpPr>
+            <a:spLocks noGrp="1"/>
+          </p:cNvSpPr>
+          <p:nvPr>
+            <p:ph idx="1"/>
+          </p:nvPr>
+        </p:nvSpPr>
+        <p:spPr/>
+        <p:txBody>
+          <a:bodyPr/>
+          <a:lstStyle/>
+          <a:p>
+            <a:r>
+              <a:rPr lang="en-US" dirty="0"/>
+              <a:t>The biggest struggle was finding data that was relevant to the dates being analyzed</a:t>
+            </a:r>
+          </a:p>
+          <a:p>
+            <a:r>
+              <a:rPr lang="en-US" dirty="0"/>
+              <a:t>Initially in the analysis a heatmap was explored to show vaccination progress, but it was not telling the story wanted, so a Choropleth map was used in its place</a:t>
+            </a:r>
+          </a:p>
+          <a:p>
+            <a:r>
+              <a:rPr lang="en-US" dirty="0"/>
+              <a:t>With additional time hopefully the census data would be more readily accessible, thus allowing the review of variables like Poverty Rate </a:t>
             </a:r>
           </a:p>
         </p:txBody>
@@ -4848,7 +6187,7 @@
 </p:sld>
 </file>
 
-<file path=ppt/slides/slide14.xml><?xml version="1.0" encoding="utf-8"?>
+<file path=ppt/slides/slide15.xml><?xml version="1.0" encoding="utf-8"?>
 <p:sld xmlns:a="http://schemas.openxmlformats.org/drawingml/2006/main" xmlns:r="http://schemas.openxmlformats.org/officeDocument/2006/relationships" xmlns:p="http://schemas.openxmlformats.org/presentationml/2006/main">
   <p:cSld>
     <p:spTree>
@@ -5613,7 +6952,9 @@
         </p:nvSpPr>
         <p:spPr/>
         <p:txBody>
-          <a:bodyPr/>
+          <a:bodyPr>
+            <a:normAutofit lnSpcReduction="10000"/>
+          </a:bodyPr>
           <a:lstStyle/>
           <a:p>
             <a:r>
@@ -5624,14 +6965,37 @@
           <a:p>
             <a:r>
               <a:rPr lang="en-US" dirty="0"/>
-              <a:t>Unable to use several measures that we had hoped due to lack of data</a:t>
+              <a:t>India was the #2 most vaccinated country in terms of number of vaccines administered, but since their population is so high, they are low in number fully vaccinated per hundred people</a:t>
             </a:r>
           </a:p>
           <a:p>
             <a:r>
               <a:rPr lang="en-US" dirty="0"/>
-              <a:t>Ended up using 2018 data so as to get the widest array of data points	</a:t>
-            </a:r>
+              <a:t>After doing the initial extraction an additional CSV was found to add country names to the data frame based on ISO Codes</a:t>
+            </a:r>
+          </a:p>
+          <a:p>
+            <a:pPr lvl="1"/>
+            <a:r>
+              <a:rPr lang="en-US" dirty="0"/>
+              <a:t>This allowed the data to be reviewed more easily</a:t>
+            </a:r>
+          </a:p>
+          <a:p>
+            <a:r>
+              <a:rPr lang="en-US" dirty="0"/>
+              <a:t>Many desired variables were not usable since there was no recent data for them</a:t>
+            </a:r>
+          </a:p>
+          <a:p>
+            <a:pPr lvl="1"/>
+            <a:r>
+              <a:rPr lang="en-US" dirty="0"/>
+              <a:t>Much of the poverty related data is only updated once a decade and had not been updated since 2011</a:t>
+            </a:r>
+          </a:p>
+          <a:p>
+            <a:endParaRPr lang="en-US" dirty="0"/>
           </a:p>
         </p:txBody>
       </p:sp>
@@ -5700,58 +7064,90 @@
           <a:p>
             <a:r>
               <a:rPr lang="en-US" dirty="0"/>
-              <a:t>Steps taken during data analysis</a:t>
-            </a:r>
-          </a:p>
-        </p:txBody>
-      </p:sp>
-      <p:sp>
-        <p:nvSpPr>
-          <p:cNvPr id="3" name="Content Placeholder 2">
-            <a:extLst>
-              <a:ext uri="{FF2B5EF4-FFF2-40B4-BE49-F238E27FC236}">
-                <a16:creationId xmlns:a16="http://schemas.microsoft.com/office/drawing/2014/main" id="{3718D614-D035-4A4C-ACBB-17183EC7FE8E}"/>
-              </a:ext>
-            </a:extLst>
-          </p:cNvPr>
-          <p:cNvSpPr>
-            <a:spLocks noGrp="1"/>
-          </p:cNvSpPr>
-          <p:nvPr>
-            <p:ph sz="half" idx="1"/>
+              <a:t>Data Analysis</a:t>
+            </a:r>
+          </a:p>
+        </p:txBody>
+      </p:sp>
+      <p:sp>
+        <p:nvSpPr>
+          <p:cNvPr id="5" name="Content Placeholder 4">
+            <a:extLst>
+              <a:ext uri="{FF2B5EF4-FFF2-40B4-BE49-F238E27FC236}">
+                <a16:creationId xmlns:a16="http://schemas.microsoft.com/office/drawing/2014/main" id="{AD78B15D-8C93-475F-A14A-3C87BA0DA604}"/>
+              </a:ext>
+            </a:extLst>
+          </p:cNvPr>
+          <p:cNvSpPr>
+            <a:spLocks noGrp="1"/>
+          </p:cNvSpPr>
+          <p:nvPr>
+            <p:ph idx="1"/>
           </p:nvPr>
         </p:nvSpPr>
         <p:spPr/>
         <p:txBody>
-          <a:bodyPr/>
+          <a:bodyPr>
+            <a:normAutofit lnSpcReduction="10000"/>
+          </a:bodyPr>
           <a:lstStyle/>
           <a:p>
-            <a:endParaRPr lang="en-US"/>
-          </a:p>
-        </p:txBody>
-      </p:sp>
-      <p:sp>
-        <p:nvSpPr>
-          <p:cNvPr id="4" name="Content Placeholder 3">
-            <a:extLst>
-              <a:ext uri="{FF2B5EF4-FFF2-40B4-BE49-F238E27FC236}">
-                <a16:creationId xmlns:a16="http://schemas.microsoft.com/office/drawing/2014/main" id="{29941416-6CBE-474E-97AC-6E2D57B678FA}"/>
-              </a:ext>
-            </a:extLst>
-          </p:cNvPr>
-          <p:cNvSpPr>
-            <a:spLocks noGrp="1"/>
-          </p:cNvSpPr>
-          <p:nvPr>
-            <p:ph sz="half" idx="2"/>
-          </p:nvPr>
-        </p:nvSpPr>
-        <p:spPr/>
-        <p:txBody>
-          <a:bodyPr/>
-          <a:lstStyle/>
-          <a:p>
-            <a:endParaRPr lang="en-US"/>
+            <a:r>
+              <a:rPr lang="en-US" dirty="0"/>
+              <a:t>The first step of analysis was to group the data into quartiles based on the different variables being used</a:t>
+            </a:r>
+          </a:p>
+          <a:p>
+            <a:r>
+              <a:rPr lang="en-US" dirty="0"/>
+              <a:t>From there a One Way </a:t>
+            </a:r>
+            <a:r>
+              <a:rPr lang="en-US" dirty="0" err="1"/>
+              <a:t>Anova</a:t>
+            </a:r>
+            <a:r>
+              <a:rPr lang="en-US" dirty="0"/>
+              <a:t> Test was performed </a:t>
+            </a:r>
+          </a:p>
+          <a:p>
+            <a:pPr lvl="1"/>
+            <a:r>
+              <a:rPr lang="en-US" b="0" i="0" dirty="0">
+                <a:solidFill>
+                  <a:srgbClr val="000000"/>
+                </a:solidFill>
+                <a:effectLst/>
+                <a:latin typeface="Helvetica Neue"/>
+              </a:rPr>
+              <a:t>Null Hypothesis: Each sample mean for indicators broken down by quartile are equivalent</a:t>
+            </a:r>
+          </a:p>
+          <a:p>
+            <a:pPr lvl="1"/>
+            <a:r>
+              <a:rPr lang="en-US" b="0" i="0" dirty="0">
+                <a:solidFill>
+                  <a:srgbClr val="000000"/>
+                </a:solidFill>
+                <a:effectLst/>
+                <a:latin typeface="Helvetica Neue"/>
+              </a:rPr>
+              <a:t>Alternative Hypothesis: There exists one mean such that the sample mean for indicators are not all equivalent</a:t>
+            </a:r>
+          </a:p>
+          <a:p>
+            <a:r>
+              <a:rPr lang="en-US" dirty="0"/>
+              <a:t>From there linear regression was performed for each quartile of each variable to look for additional statistically relevant points</a:t>
+            </a:r>
+          </a:p>
+          <a:p>
+            <a:r>
+              <a:rPr lang="en-US" dirty="0"/>
+              <a:t>Finally the Top 5 and Lowest 5 countries by both Percent of Population and Number of Vaccinated individuals were separated out </a:t>
+            </a:r>
           </a:p>
         </p:txBody>
       </p:sp>
@@ -5797,91 +7193,19 @@
           <a:chExt cx="0" cy="0"/>
         </a:xfrm>
       </p:grpSpPr>
-      <p:sp>
-        <p:nvSpPr>
-          <p:cNvPr id="6" name="Title 5">
-            <a:extLst>
-              <a:ext uri="{FF2B5EF4-FFF2-40B4-BE49-F238E27FC236}">
-                <a16:creationId xmlns:a16="http://schemas.microsoft.com/office/drawing/2014/main" id="{2415EC17-CDAA-4D6C-9B43-5C8E6DCEEA30}"/>
-              </a:ext>
-            </a:extLst>
-          </p:cNvPr>
-          <p:cNvSpPr>
-            <a:spLocks noGrp="1"/>
-          </p:cNvSpPr>
-          <p:nvPr>
-            <p:ph type="title"/>
-          </p:nvPr>
-        </p:nvSpPr>
-        <p:spPr>
-          <a:xfrm>
-            <a:off x="839788" y="365125"/>
-            <a:ext cx="10515600" cy="45720"/>
-          </a:xfrm>
-        </p:spPr>
-        <p:txBody>
-          <a:bodyPr>
-            <a:normAutofit fontScale="90000"/>
-          </a:bodyPr>
-          <a:lstStyle/>
-          <a:p>
-            <a:r>
-              <a:rPr lang="en-US" dirty="0"/>
-              <a:t> </a:t>
-            </a:r>
-          </a:p>
-        </p:txBody>
-      </p:sp>
-      <p:sp>
-        <p:nvSpPr>
-          <p:cNvPr id="8" name="Text Placeholder 7">
-            <a:extLst>
-              <a:ext uri="{FF2B5EF4-FFF2-40B4-BE49-F238E27FC236}">
-                <a16:creationId xmlns:a16="http://schemas.microsoft.com/office/drawing/2014/main" id="{4CC4C537-53CF-46CF-9D35-8A76BE90B82E}"/>
-              </a:ext>
-            </a:extLst>
-          </p:cNvPr>
-          <p:cNvSpPr>
-            <a:spLocks noGrp="1"/>
-          </p:cNvSpPr>
-          <p:nvPr>
-            <p:ph type="body" idx="1"/>
-          </p:nvPr>
-        </p:nvSpPr>
-        <p:spPr>
-          <a:xfrm>
-            <a:off x="839788" y="365125"/>
-            <a:ext cx="5157787" cy="2139950"/>
-          </a:xfrm>
-        </p:spPr>
-        <p:txBody>
-          <a:bodyPr>
-            <a:normAutofit fontScale="92500"/>
-          </a:bodyPr>
-          <a:lstStyle/>
-          <a:p>
-            <a:r>
-              <a:rPr lang="en-US" b="0" dirty="0"/>
-              <a:t>The first variable to be analyzed was the Vaccination Progress compared to the Total Population. While first glance would suggest that the smaller the population the higher the rate of vaccination, this does not hold to be true</a:t>
-            </a:r>
-          </a:p>
-        </p:txBody>
-      </p:sp>
       <p:pic>
         <p:nvPicPr>
-          <p:cNvPr id="17" name="Content Placeholder 16">
-            <a:extLst>
-              <a:ext uri="{FF2B5EF4-FFF2-40B4-BE49-F238E27FC236}">
-                <a16:creationId xmlns:a16="http://schemas.microsoft.com/office/drawing/2014/main" id="{A3349B92-19FF-4437-BA14-472E7B88E3EE}"/>
+          <p:cNvPr id="5" name="Picture 4">
+            <a:extLst>
+              <a:ext uri="{FF2B5EF4-FFF2-40B4-BE49-F238E27FC236}">
+                <a16:creationId xmlns:a16="http://schemas.microsoft.com/office/drawing/2014/main" id="{2A35F4CA-F943-4229-A5BA-0C15165609F0}"/>
               </a:ext>
             </a:extLst>
           </p:cNvPr>
           <p:cNvPicPr>
-            <a:picLocks noGrp="1" noChangeAspect="1"/>
+            <a:picLocks noChangeAspect="1"/>
           </p:cNvPicPr>
-          <p:nvPr>
-            <p:ph sz="half" idx="2"/>
-          </p:nvPr>
+          <p:nvPr/>
         </p:nvPicPr>
         <p:blipFill>
           <a:blip r:embed="rId2">
@@ -5897,61 +7221,27 @@
         </p:blipFill>
         <p:spPr>
           <a:xfrm>
-            <a:off x="839788" y="2628107"/>
-            <a:ext cx="5157787" cy="3438524"/>
+            <a:off x="890726" y="471860"/>
+            <a:ext cx="4796558" cy="3197706"/>
           </a:xfrm>
+          <a:prstGeom prst="rect">
+            <a:avLst/>
+          </a:prstGeom>
         </p:spPr>
       </p:pic>
-      <p:sp>
-        <p:nvSpPr>
-          <p:cNvPr id="12" name="Text Placeholder 11">
-            <a:extLst>
-              <a:ext uri="{FF2B5EF4-FFF2-40B4-BE49-F238E27FC236}">
-                <a16:creationId xmlns:a16="http://schemas.microsoft.com/office/drawing/2014/main" id="{28797D2E-DF25-4DEB-B568-C7C03EB5D2CB}"/>
-              </a:ext>
-            </a:extLst>
-          </p:cNvPr>
-          <p:cNvSpPr>
-            <a:spLocks noGrp="1"/>
-          </p:cNvSpPr>
-          <p:nvPr>
-            <p:ph type="body" sz="quarter" idx="3"/>
-          </p:nvPr>
-        </p:nvSpPr>
-        <p:spPr>
-          <a:xfrm>
-            <a:off x="6172200" y="365125"/>
-            <a:ext cx="5183188" cy="1527470"/>
-          </a:xfrm>
-        </p:spPr>
-        <p:txBody>
-          <a:bodyPr>
-            <a:normAutofit fontScale="92500"/>
-          </a:bodyPr>
-          <a:lstStyle/>
-          <a:p>
-            <a:r>
-              <a:rPr lang="en-US" b="0" dirty="0"/>
-              <a:t>This data failed to reject the null hypothesis, thus there is no statistical difference between the data in the different quartiles.</a:t>
-            </a:r>
-          </a:p>
-        </p:txBody>
-      </p:sp>
       <p:pic>
         <p:nvPicPr>
-          <p:cNvPr id="19" name="Content Placeholder 18">
-            <a:extLst>
-              <a:ext uri="{FF2B5EF4-FFF2-40B4-BE49-F238E27FC236}">
-                <a16:creationId xmlns:a16="http://schemas.microsoft.com/office/drawing/2014/main" id="{04396126-D6CF-48A1-B279-1DE1B511A262}"/>
+          <p:cNvPr id="7" name="Picture 6">
+            <a:extLst>
+              <a:ext uri="{FF2B5EF4-FFF2-40B4-BE49-F238E27FC236}">
+                <a16:creationId xmlns:a16="http://schemas.microsoft.com/office/drawing/2014/main" id="{4D5B7F5E-B2FD-4873-BC06-4F55EFD246BF}"/>
               </a:ext>
             </a:extLst>
           </p:cNvPr>
           <p:cNvPicPr>
-            <a:picLocks noGrp="1" noChangeAspect="1"/>
+            <a:picLocks noChangeAspect="1"/>
           </p:cNvPicPr>
-          <p:nvPr>
-            <p:ph sz="quarter" idx="4"/>
-          </p:nvPr>
+          <p:nvPr/>
         </p:nvPicPr>
         <p:blipFill>
           <a:blip r:embed="rId3">
@@ -5967,9 +7257,376 @@
         </p:blipFill>
         <p:spPr>
           <a:xfrm>
-            <a:off x="6172200" y="2619640"/>
-            <a:ext cx="5183188" cy="3455458"/>
+            <a:off x="5687284" y="471860"/>
+            <a:ext cx="4796560" cy="3197707"/>
           </a:xfrm>
+          <a:prstGeom prst="rect">
+            <a:avLst/>
+          </a:prstGeom>
+        </p:spPr>
+      </p:pic>
+      <p:pic>
+        <p:nvPicPr>
+          <p:cNvPr id="9" name="Picture 8">
+            <a:extLst>
+              <a:ext uri="{FF2B5EF4-FFF2-40B4-BE49-F238E27FC236}">
+                <a16:creationId xmlns:a16="http://schemas.microsoft.com/office/drawing/2014/main" id="{8F91ECCF-40D6-4AE5-B22F-5EBCD2CB9056}"/>
+              </a:ext>
+            </a:extLst>
+          </p:cNvPr>
+          <p:cNvPicPr>
+            <a:picLocks noChangeAspect="1"/>
+          </p:cNvPicPr>
+          <p:nvPr/>
+        </p:nvPicPr>
+        <p:blipFill>
+          <a:blip r:embed="rId4">
+            <a:extLst>
+              <a:ext uri="{28A0092B-C50C-407E-A947-70E740481C1C}">
+                <a14:useLocalDpi xmlns:a14="http://schemas.microsoft.com/office/drawing/2010/main" val="0"/>
+              </a:ext>
+            </a:extLst>
+          </a:blip>
+          <a:stretch>
+            <a:fillRect/>
+          </a:stretch>
+        </p:blipFill>
+        <p:spPr>
+          <a:xfrm>
+            <a:off x="894711" y="3604576"/>
+            <a:ext cx="4796558" cy="3197706"/>
+          </a:xfrm>
+          <a:prstGeom prst="rect">
+            <a:avLst/>
+          </a:prstGeom>
+        </p:spPr>
+      </p:pic>
+      <p:pic>
+        <p:nvPicPr>
+          <p:cNvPr id="11" name="Picture 10">
+            <a:extLst>
+              <a:ext uri="{FF2B5EF4-FFF2-40B4-BE49-F238E27FC236}">
+                <a16:creationId xmlns:a16="http://schemas.microsoft.com/office/drawing/2014/main" id="{8CB37DE4-12B4-4DAA-92C7-F1578D53715E}"/>
+              </a:ext>
+            </a:extLst>
+          </p:cNvPr>
+          <p:cNvPicPr>
+            <a:picLocks noChangeAspect="1"/>
+          </p:cNvPicPr>
+          <p:nvPr/>
+        </p:nvPicPr>
+        <p:blipFill>
+          <a:blip r:embed="rId5">
+            <a:extLst>
+              <a:ext uri="{28A0092B-C50C-407E-A947-70E740481C1C}">
+                <a14:useLocalDpi xmlns:a14="http://schemas.microsoft.com/office/drawing/2010/main" val="0"/>
+              </a:ext>
+            </a:extLst>
+          </a:blip>
+          <a:stretch>
+            <a:fillRect/>
+          </a:stretch>
+        </p:blipFill>
+        <p:spPr>
+          <a:xfrm>
+            <a:off x="5683299" y="3604576"/>
+            <a:ext cx="4796558" cy="3197706"/>
+          </a:xfrm>
+          <a:prstGeom prst="rect">
+            <a:avLst/>
+          </a:prstGeom>
+        </p:spPr>
+      </p:pic>
+    </p:spTree>
+    <p:extLst>
+      <p:ext uri="{BB962C8B-B14F-4D97-AF65-F5344CB8AC3E}">
+        <p14:creationId xmlns:p14="http://schemas.microsoft.com/office/powerpoint/2010/main" val="2927825439"/>
+      </p:ext>
+    </p:extLst>
+  </p:cSld>
+  <p:clrMapOvr>
+    <a:masterClrMapping/>
+  </p:clrMapOvr>
+</p:sld>
+</file>
+
+<file path=ppt/slides/slide9.xml><?xml version="1.0" encoding="utf-8"?>
+<p:sld xmlns:a="http://schemas.openxmlformats.org/drawingml/2006/main" xmlns:r="http://schemas.openxmlformats.org/officeDocument/2006/relationships" xmlns:p="http://schemas.openxmlformats.org/presentationml/2006/main">
+  <p:cSld>
+    <p:spTree>
+      <p:nvGrpSpPr>
+        <p:cNvPr id="1" name=""/>
+        <p:cNvGrpSpPr/>
+        <p:nvPr/>
+      </p:nvGrpSpPr>
+      <p:grpSpPr>
+        <a:xfrm>
+          <a:off x="0" y="0"/>
+          <a:ext cx="0" cy="0"/>
+          <a:chOff x="0" y="0"/>
+          <a:chExt cx="0" cy="0"/>
+        </a:xfrm>
+      </p:grpSpPr>
+      <p:sp>
+        <p:nvSpPr>
+          <p:cNvPr id="6" name="Title 5">
+            <a:extLst>
+              <a:ext uri="{FF2B5EF4-FFF2-40B4-BE49-F238E27FC236}">
+                <a16:creationId xmlns:a16="http://schemas.microsoft.com/office/drawing/2014/main" id="{2415EC17-CDAA-4D6C-9B43-5C8E6DCEEA30}"/>
+              </a:ext>
+            </a:extLst>
+          </p:cNvPr>
+          <p:cNvSpPr>
+            <a:spLocks noGrp="1"/>
+          </p:cNvSpPr>
+          <p:nvPr>
+            <p:ph type="title"/>
+          </p:nvPr>
+        </p:nvSpPr>
+        <p:spPr/>
+        <p:txBody>
+          <a:bodyPr>
+            <a:normAutofit/>
+          </a:bodyPr>
+          <a:lstStyle/>
+          <a:p>
+            <a:r>
+              <a:rPr lang="en-US" dirty="0"/>
+              <a:t> </a:t>
+            </a:r>
+          </a:p>
+        </p:txBody>
+      </p:sp>
+      <p:pic>
+        <p:nvPicPr>
+          <p:cNvPr id="5" name="Content Placeholder 4">
+            <a:extLst>
+              <a:ext uri="{FF2B5EF4-FFF2-40B4-BE49-F238E27FC236}">
+                <a16:creationId xmlns:a16="http://schemas.microsoft.com/office/drawing/2014/main" id="{7DEC3078-992B-4D94-AC5F-2E51333C7D16}"/>
+              </a:ext>
+            </a:extLst>
+          </p:cNvPr>
+          <p:cNvPicPr>
+            <a:picLocks noGrp="1" noChangeAspect="1"/>
+          </p:cNvPicPr>
+          <p:nvPr>
+            <p:ph sz="half" idx="1"/>
+          </p:nvPr>
+        </p:nvPicPr>
+        <p:blipFill>
+          <a:blip r:embed="rId3">
+            <a:extLst>
+              <a:ext uri="{28A0092B-C50C-407E-A947-70E740481C1C}">
+                <a14:useLocalDpi xmlns:a14="http://schemas.microsoft.com/office/drawing/2010/main" val="0"/>
+              </a:ext>
+            </a:extLst>
+          </a:blip>
+          <a:stretch>
+            <a:fillRect/>
+          </a:stretch>
+        </p:blipFill>
+        <p:spPr>
+          <a:xfrm>
+            <a:off x="838200" y="2274094"/>
+            <a:ext cx="5181600" cy="3454400"/>
+          </a:xfrm>
+        </p:spPr>
+      </p:pic>
+      <p:pic>
+        <p:nvPicPr>
+          <p:cNvPr id="11" name="Content Placeholder 10">
+            <a:extLst>
+              <a:ext uri="{FF2B5EF4-FFF2-40B4-BE49-F238E27FC236}">
+                <a16:creationId xmlns:a16="http://schemas.microsoft.com/office/drawing/2014/main" id="{AC6172F2-058C-4A73-8191-6002414092D6}"/>
+              </a:ext>
+            </a:extLst>
+          </p:cNvPr>
+          <p:cNvPicPr>
+            <a:picLocks noGrp="1" noChangeAspect="1"/>
+          </p:cNvPicPr>
+          <p:nvPr>
+            <p:ph sz="half" idx="2"/>
+          </p:nvPr>
+        </p:nvPicPr>
+        <p:blipFill>
+          <a:blip r:embed="rId4">
+            <a:extLst>
+              <a:ext uri="{28A0092B-C50C-407E-A947-70E740481C1C}">
+                <a14:useLocalDpi xmlns:a14="http://schemas.microsoft.com/office/drawing/2010/main" val="0"/>
+              </a:ext>
+            </a:extLst>
+          </a:blip>
+          <a:stretch>
+            <a:fillRect/>
+          </a:stretch>
+        </p:blipFill>
+        <p:spPr>
+          <a:xfrm>
+            <a:off x="6172199" y="2618233"/>
+            <a:ext cx="2653019" cy="1768679"/>
+          </a:xfrm>
+        </p:spPr>
+      </p:pic>
+      <p:sp>
+        <p:nvSpPr>
+          <p:cNvPr id="12" name="Text Placeholder 11">
+            <a:extLst>
+              <a:ext uri="{FF2B5EF4-FFF2-40B4-BE49-F238E27FC236}">
+                <a16:creationId xmlns:a16="http://schemas.microsoft.com/office/drawing/2014/main" id="{28797D2E-DF25-4DEB-B568-C7C03EB5D2CB}"/>
+              </a:ext>
+            </a:extLst>
+          </p:cNvPr>
+          <p:cNvSpPr>
+            <a:spLocks noGrp="1"/>
+          </p:cNvSpPr>
+          <p:nvPr>
+            <p:ph type="body" sz="quarter" idx="4294967295"/>
+          </p:nvPr>
+        </p:nvSpPr>
+        <p:spPr>
+          <a:xfrm>
+            <a:off x="710214" y="365125"/>
+            <a:ext cx="10777491" cy="1527175"/>
+          </a:xfrm>
+        </p:spPr>
+        <p:txBody>
+          <a:bodyPr>
+            <a:normAutofit/>
+          </a:bodyPr>
+          <a:lstStyle/>
+          <a:p>
+            <a:pPr marL="0" indent="0" algn="ctr">
+              <a:buNone/>
+            </a:pPr>
+            <a:r>
+              <a:rPr lang="en-US" sz="3900" b="0" dirty="0"/>
+              <a:t>Total Population</a:t>
+            </a:r>
+            <a:endParaRPr lang="en-US" dirty="0"/>
+          </a:p>
+          <a:p>
+            <a:pPr marL="0" indent="0" algn="ctr">
+              <a:buNone/>
+            </a:pPr>
+            <a:r>
+              <a:rPr lang="en-US" b="0" dirty="0"/>
+              <a:t>This data failed to reject the null hypothesis, thus there is no statistical difference between the data in the different quartiles.</a:t>
+            </a:r>
+          </a:p>
+          <a:p>
+            <a:pPr marL="0" indent="0" algn="ctr">
+              <a:buNone/>
+            </a:pPr>
+            <a:endParaRPr lang="en-US" b="0" dirty="0"/>
+          </a:p>
+        </p:txBody>
+      </p:sp>
+      <p:pic>
+        <p:nvPicPr>
+          <p:cNvPr id="14" name="Picture 13">
+            <a:extLst>
+              <a:ext uri="{FF2B5EF4-FFF2-40B4-BE49-F238E27FC236}">
+                <a16:creationId xmlns:a16="http://schemas.microsoft.com/office/drawing/2014/main" id="{52F2F952-BE94-48C0-AB4E-1110B8F2974D}"/>
+              </a:ext>
+            </a:extLst>
+          </p:cNvPr>
+          <p:cNvPicPr>
+            <a:picLocks noChangeAspect="1"/>
+          </p:cNvPicPr>
+          <p:nvPr/>
+        </p:nvPicPr>
+        <p:blipFill>
+          <a:blip r:embed="rId5">
+            <a:extLst>
+              <a:ext uri="{28A0092B-C50C-407E-A947-70E740481C1C}">
+                <a14:useLocalDpi xmlns:a14="http://schemas.microsoft.com/office/drawing/2010/main" val="0"/>
+              </a:ext>
+            </a:extLst>
+          </a:blip>
+          <a:stretch>
+            <a:fillRect/>
+          </a:stretch>
+        </p:blipFill>
+        <p:spPr>
+          <a:xfrm>
+            <a:off x="8713709" y="2618233"/>
+            <a:ext cx="2653018" cy="1768679"/>
+          </a:xfrm>
+          <a:prstGeom prst="rect">
+            <a:avLst/>
+          </a:prstGeom>
+        </p:spPr>
+      </p:pic>
+      <p:pic>
+        <p:nvPicPr>
+          <p:cNvPr id="16" name="Picture 15">
+            <a:extLst>
+              <a:ext uri="{FF2B5EF4-FFF2-40B4-BE49-F238E27FC236}">
+                <a16:creationId xmlns:a16="http://schemas.microsoft.com/office/drawing/2014/main" id="{2295A3B0-BF3D-4B84-8861-D4471F95F4A5}"/>
+              </a:ext>
+            </a:extLst>
+          </p:cNvPr>
+          <p:cNvPicPr>
+            <a:picLocks noChangeAspect="1"/>
+          </p:cNvPicPr>
+          <p:nvPr/>
+        </p:nvPicPr>
+        <p:blipFill>
+          <a:blip r:embed="rId6">
+            <a:extLst>
+              <a:ext uri="{28A0092B-C50C-407E-A947-70E740481C1C}">
+                <a14:useLocalDpi xmlns:a14="http://schemas.microsoft.com/office/drawing/2010/main" val="0"/>
+              </a:ext>
+            </a:extLst>
+          </a:blip>
+          <a:stretch>
+            <a:fillRect/>
+          </a:stretch>
+        </p:blipFill>
+        <p:spPr>
+          <a:xfrm>
+            <a:off x="6172200" y="4373453"/>
+            <a:ext cx="2653018" cy="1768679"/>
+          </a:xfrm>
+          <a:prstGeom prst="rect">
+            <a:avLst/>
+          </a:prstGeom>
+        </p:spPr>
+      </p:pic>
+      <p:pic>
+        <p:nvPicPr>
+          <p:cNvPr id="20" name="Picture 19">
+            <a:extLst>
+              <a:ext uri="{FF2B5EF4-FFF2-40B4-BE49-F238E27FC236}">
+                <a16:creationId xmlns:a16="http://schemas.microsoft.com/office/drawing/2014/main" id="{ECA59790-F2D9-4938-85A8-AAA0186BBA30}"/>
+              </a:ext>
+            </a:extLst>
+          </p:cNvPr>
+          <p:cNvPicPr>
+            <a:picLocks noChangeAspect="1"/>
+          </p:cNvPicPr>
+          <p:nvPr/>
+        </p:nvPicPr>
+        <p:blipFill>
+          <a:blip r:embed="rId7">
+            <a:extLst>
+              <a:ext uri="{28A0092B-C50C-407E-A947-70E740481C1C}">
+                <a14:useLocalDpi xmlns:a14="http://schemas.microsoft.com/office/drawing/2010/main" val="0"/>
+              </a:ext>
+            </a:extLst>
+          </a:blip>
+          <a:stretch>
+            <a:fillRect/>
+          </a:stretch>
+        </p:blipFill>
+        <p:spPr>
+          <a:xfrm>
+            <a:off x="8707583" y="4370134"/>
+            <a:ext cx="2653018" cy="1768679"/>
+          </a:xfrm>
+          <a:prstGeom prst="rect">
+            <a:avLst/>
+          </a:prstGeom>
         </p:spPr>
       </p:pic>
     </p:spTree>
@@ -5994,211 +7651,6 @@
       </p:transition>
     </mc:Fallback>
   </mc:AlternateContent>
-</p:sld>
-</file>
-
-<file path=ppt/slides/slide9.xml><?xml version="1.0" encoding="utf-8"?>
-<p:sld xmlns:a="http://schemas.openxmlformats.org/drawingml/2006/main" xmlns:r="http://schemas.openxmlformats.org/officeDocument/2006/relationships" xmlns:p="http://schemas.openxmlformats.org/presentationml/2006/main">
-  <p:cSld>
-    <p:spTree>
-      <p:nvGrpSpPr>
-        <p:cNvPr id="1" name=""/>
-        <p:cNvGrpSpPr/>
-        <p:nvPr/>
-      </p:nvGrpSpPr>
-      <p:grpSpPr>
-        <a:xfrm>
-          <a:off x="0" y="0"/>
-          <a:ext cx="0" cy="0"/>
-          <a:chOff x="0" y="0"/>
-          <a:chExt cx="0" cy="0"/>
-        </a:xfrm>
-      </p:grpSpPr>
-      <p:sp>
-        <p:nvSpPr>
-          <p:cNvPr id="2" name="Title 1">
-            <a:extLst>
-              <a:ext uri="{FF2B5EF4-FFF2-40B4-BE49-F238E27FC236}">
-                <a16:creationId xmlns:a16="http://schemas.microsoft.com/office/drawing/2014/main" id="{498D281F-3D16-489C-B0DC-D1BEA3665997}"/>
-              </a:ext>
-            </a:extLst>
-          </p:cNvPr>
-          <p:cNvSpPr>
-            <a:spLocks noGrp="1"/>
-          </p:cNvSpPr>
-          <p:nvPr>
-            <p:ph type="title"/>
-          </p:nvPr>
-        </p:nvSpPr>
-        <p:spPr>
-          <a:xfrm>
-            <a:off x="839788" y="365125"/>
-            <a:ext cx="10515600" cy="45719"/>
-          </a:xfrm>
-        </p:spPr>
-        <p:txBody>
-          <a:bodyPr>
-            <a:normAutofit fontScale="90000"/>
-          </a:bodyPr>
-          <a:lstStyle/>
-          <a:p>
-            <a:r>
-              <a:rPr lang="en-US" dirty="0"/>
-              <a:t> </a:t>
-            </a:r>
-          </a:p>
-        </p:txBody>
-      </p:sp>
-      <p:pic>
-        <p:nvPicPr>
-          <p:cNvPr id="10" name="Content Placeholder 9">
-            <a:extLst>
-              <a:ext uri="{FF2B5EF4-FFF2-40B4-BE49-F238E27FC236}">
-                <a16:creationId xmlns:a16="http://schemas.microsoft.com/office/drawing/2014/main" id="{95AA9A84-DE60-4280-A3C7-BB4F6FD04958}"/>
-              </a:ext>
-            </a:extLst>
-          </p:cNvPr>
-          <p:cNvPicPr>
-            <a:picLocks noGrp="1" noChangeAspect="1"/>
-          </p:cNvPicPr>
-          <p:nvPr>
-            <p:ph sz="half" idx="2"/>
-          </p:nvPr>
-        </p:nvPicPr>
-        <p:blipFill>
-          <a:blip r:embed="rId2">
-            <a:extLst>
-              <a:ext uri="{28A0092B-C50C-407E-A947-70E740481C1C}">
-                <a14:useLocalDpi xmlns:a14="http://schemas.microsoft.com/office/drawing/2010/main" val="0"/>
-              </a:ext>
-            </a:extLst>
-          </a:blip>
-          <a:stretch>
-            <a:fillRect/>
-          </a:stretch>
-        </p:blipFill>
-        <p:spPr>
-          <a:xfrm>
-            <a:off x="839788" y="2628107"/>
-            <a:ext cx="5157787" cy="3438524"/>
-          </a:xfrm>
-        </p:spPr>
-      </p:pic>
-      <p:sp>
-        <p:nvSpPr>
-          <p:cNvPr id="5" name="Text Placeholder 4">
-            <a:extLst>
-              <a:ext uri="{FF2B5EF4-FFF2-40B4-BE49-F238E27FC236}">
-                <a16:creationId xmlns:a16="http://schemas.microsoft.com/office/drawing/2014/main" id="{1775ED7F-0239-4324-8F8A-65D0D11F4E50}"/>
-              </a:ext>
-            </a:extLst>
-          </p:cNvPr>
-          <p:cNvSpPr>
-            <a:spLocks noGrp="1"/>
-          </p:cNvSpPr>
-          <p:nvPr>
-            <p:ph type="body" sz="quarter" idx="3"/>
-          </p:nvPr>
-        </p:nvSpPr>
-        <p:spPr>
-          <a:xfrm>
-            <a:off x="6172200" y="520994"/>
-            <a:ext cx="5183188" cy="1392865"/>
-          </a:xfrm>
-        </p:spPr>
-        <p:txBody>
-          <a:bodyPr>
-            <a:normAutofit lnSpcReduction="10000"/>
-          </a:bodyPr>
-          <a:lstStyle/>
-          <a:p>
-            <a:r>
-              <a:rPr lang="en-US" b="0" dirty="0"/>
-              <a:t>This data failed to reject the null hypothesis, thus there is no statistical difference between the data in the different quartiles.</a:t>
-            </a:r>
-          </a:p>
-        </p:txBody>
-      </p:sp>
-      <p:pic>
-        <p:nvPicPr>
-          <p:cNvPr id="12" name="Content Placeholder 11">
-            <a:extLst>
-              <a:ext uri="{FF2B5EF4-FFF2-40B4-BE49-F238E27FC236}">
-                <a16:creationId xmlns:a16="http://schemas.microsoft.com/office/drawing/2014/main" id="{F1427122-48C4-4571-8A4C-1395129AE599}"/>
-              </a:ext>
-            </a:extLst>
-          </p:cNvPr>
-          <p:cNvPicPr>
-            <a:picLocks noGrp="1" noChangeAspect="1"/>
-          </p:cNvPicPr>
-          <p:nvPr>
-            <p:ph sz="quarter" idx="4"/>
-          </p:nvPr>
-        </p:nvPicPr>
-        <p:blipFill>
-          <a:blip r:embed="rId3">
-            <a:extLst>
-              <a:ext uri="{28A0092B-C50C-407E-A947-70E740481C1C}">
-                <a14:useLocalDpi xmlns:a14="http://schemas.microsoft.com/office/drawing/2010/main" val="0"/>
-              </a:ext>
-            </a:extLst>
-          </a:blip>
-          <a:stretch>
-            <a:fillRect/>
-          </a:stretch>
-        </p:blipFill>
-        <p:spPr>
-          <a:xfrm>
-            <a:off x="6172200" y="2619640"/>
-            <a:ext cx="5183188" cy="3455458"/>
-          </a:xfrm>
-        </p:spPr>
-      </p:pic>
-      <p:sp>
-        <p:nvSpPr>
-          <p:cNvPr id="7" name="Text Placeholder 7">
-            <a:extLst>
-              <a:ext uri="{FF2B5EF4-FFF2-40B4-BE49-F238E27FC236}">
-                <a16:creationId xmlns:a16="http://schemas.microsoft.com/office/drawing/2014/main" id="{5EAD9029-8924-4194-8BE8-381AAABAEACB}"/>
-              </a:ext>
-            </a:extLst>
-          </p:cNvPr>
-          <p:cNvSpPr>
-            <a:spLocks noGrp="1"/>
-          </p:cNvSpPr>
-          <p:nvPr>
-            <p:ph type="body" idx="1"/>
-          </p:nvPr>
-        </p:nvSpPr>
-        <p:spPr>
-          <a:xfrm>
-            <a:off x="839788" y="552893"/>
-            <a:ext cx="5157787" cy="1623593"/>
-          </a:xfrm>
-        </p:spPr>
-        <p:txBody>
-          <a:bodyPr>
-            <a:normAutofit lnSpcReduction="10000"/>
-          </a:bodyPr>
-          <a:lstStyle/>
-          <a:p>
-            <a:r>
-              <a:rPr lang="en-US" b="0" dirty="0"/>
-              <a:t>The next variable to be analyzed was the Vaccination Progress compared to the GDP. While there was a higher correlation with these variables, it was still not statistically significant.</a:t>
-            </a:r>
-          </a:p>
-        </p:txBody>
-      </p:sp>
-    </p:spTree>
-    <p:extLst>
-      <p:ext uri="{BB962C8B-B14F-4D97-AF65-F5344CB8AC3E}">
-        <p14:creationId xmlns:p14="http://schemas.microsoft.com/office/powerpoint/2010/main" val="2067421192"/>
-      </p:ext>
-    </p:extLst>
-  </p:cSld>
-  <p:clrMapOvr>
-    <a:masterClrMapping/>
-  </p:clrMapOvr>
 </p:sld>
 </file>
 
@@ -6495,4 +7947,299 @@
     </a:ext>
   </a:extLst>
 </a:theme>
+</file>
+
+<file path=ppt/theme/theme2.xml><?xml version="1.0" encoding="utf-8"?>
+<a:theme xmlns:a="http://schemas.openxmlformats.org/drawingml/2006/main" name="Office Theme">
+  <a:themeElements>
+    <a:clrScheme name="Office">
+      <a:dk1>
+        <a:sysClr val="windowText" lastClr="000000"/>
+      </a:dk1>
+      <a:lt1>
+        <a:sysClr val="window" lastClr="FFFFFF"/>
+      </a:lt1>
+      <a:dk2>
+        <a:srgbClr val="44546A"/>
+      </a:dk2>
+      <a:lt2>
+        <a:srgbClr val="E7E6E6"/>
+      </a:lt2>
+      <a:accent1>
+        <a:srgbClr val="4472C4"/>
+      </a:accent1>
+      <a:accent2>
+        <a:srgbClr val="ED7D31"/>
+      </a:accent2>
+      <a:accent3>
+        <a:srgbClr val="A5A5A5"/>
+      </a:accent3>
+      <a:accent4>
+        <a:srgbClr val="FFC000"/>
+      </a:accent4>
+      <a:accent5>
+        <a:srgbClr val="5B9BD5"/>
+      </a:accent5>
+      <a:accent6>
+        <a:srgbClr val="70AD47"/>
+      </a:accent6>
+      <a:hlink>
+        <a:srgbClr val="0563C1"/>
+      </a:hlink>
+      <a:folHlink>
+        <a:srgbClr val="954F72"/>
+      </a:folHlink>
+    </a:clrScheme>
+    <a:fontScheme name="Office">
+      <a:majorFont>
+        <a:latin typeface="Calibri Light" panose="020F0302020204030204"/>
+        <a:ea typeface=""/>
+        <a:cs typeface=""/>
+        <a:font script="Jpan" typeface="游ゴシック Light"/>
+        <a:font script="Hang" typeface="맑은 고딕"/>
+        <a:font script="Hans" typeface="等线 Light"/>
+        <a:font script="Hant" typeface="新細明體"/>
+        <a:font script="Arab" typeface="Times New Roman"/>
+        <a:font script="Hebr" typeface="Times New Roman"/>
+        <a:font script="Thai" typeface="Angsana New"/>
+        <a:font script="Ethi" typeface="Nyala"/>
+        <a:font script="Beng" typeface="Vrinda"/>
+        <a:font script="Gujr" typeface="Shruti"/>
+        <a:font script="Khmr" typeface="MoolBoran"/>
+        <a:font script="Knda" typeface="Tunga"/>
+        <a:font script="Guru" typeface="Raavi"/>
+        <a:font script="Cans" typeface="Euphemia"/>
+        <a:font script="Cher" typeface="Plantagenet Cherokee"/>
+        <a:font script="Yiii" typeface="Microsoft Yi Baiti"/>
+        <a:font script="Tibt" typeface="Microsoft Himalaya"/>
+        <a:font script="Thaa" typeface="MV Boli"/>
+        <a:font script="Deva" typeface="Mangal"/>
+        <a:font script="Telu" typeface="Gautami"/>
+        <a:font script="Taml" typeface="Latha"/>
+        <a:font script="Syrc" typeface="Estrangelo Edessa"/>
+        <a:font script="Orya" typeface="Kalinga"/>
+        <a:font script="Mlym" typeface="Kartika"/>
+        <a:font script="Laoo" typeface="DokChampa"/>
+        <a:font script="Sinh" typeface="Iskoola Pota"/>
+        <a:font script="Mong" typeface="Mongolian Baiti"/>
+        <a:font script="Viet" typeface="Times New Roman"/>
+        <a:font script="Uigh" typeface="Microsoft Uighur"/>
+        <a:font script="Geor" typeface="Sylfaen"/>
+        <a:font script="Armn" typeface="Arial"/>
+        <a:font script="Bugi" typeface="Leelawadee UI"/>
+        <a:font script="Bopo" typeface="Microsoft JhengHei"/>
+        <a:font script="Java" typeface="Javanese Text"/>
+        <a:font script="Lisu" typeface="Segoe UI"/>
+        <a:font script="Mymr" typeface="Myanmar Text"/>
+        <a:font script="Nkoo" typeface="Ebrima"/>
+        <a:font script="Olck" typeface="Nirmala UI"/>
+        <a:font script="Osma" typeface="Ebrima"/>
+        <a:font script="Phag" typeface="Phagspa"/>
+        <a:font script="Syrn" typeface="Estrangelo Edessa"/>
+        <a:font script="Syrj" typeface="Estrangelo Edessa"/>
+        <a:font script="Syre" typeface="Estrangelo Edessa"/>
+        <a:font script="Sora" typeface="Nirmala UI"/>
+        <a:font script="Tale" typeface="Microsoft Tai Le"/>
+        <a:font script="Talu" typeface="Microsoft New Tai Lue"/>
+        <a:font script="Tfng" typeface="Ebrima"/>
+      </a:majorFont>
+      <a:minorFont>
+        <a:latin typeface="Calibri" panose="020F0502020204030204"/>
+        <a:ea typeface=""/>
+        <a:cs typeface=""/>
+        <a:font script="Jpan" typeface="游ゴシック"/>
+        <a:font script="Hang" typeface="맑은 고딕"/>
+        <a:font script="Hans" typeface="等线"/>
+        <a:font script="Hant" typeface="新細明體"/>
+        <a:font script="Arab" typeface="Arial"/>
+        <a:font script="Hebr" typeface="Arial"/>
+        <a:font script="Thai" typeface="Cordia New"/>
+        <a:font script="Ethi" typeface="Nyala"/>
+        <a:font script="Beng" typeface="Vrinda"/>
+        <a:font script="Gujr" typeface="Shruti"/>
+        <a:font script="Khmr" typeface="DaunPenh"/>
+        <a:font script="Knda" typeface="Tunga"/>
+        <a:font script="Guru" typeface="Raavi"/>
+        <a:font script="Cans" typeface="Euphemia"/>
+        <a:font script="Cher" typeface="Plantagenet Cherokee"/>
+        <a:font script="Yiii" typeface="Microsoft Yi Baiti"/>
+        <a:font script="Tibt" typeface="Microsoft Himalaya"/>
+        <a:font script="Thaa" typeface="MV Boli"/>
+        <a:font script="Deva" typeface="Mangal"/>
+        <a:font script="Telu" typeface="Gautami"/>
+        <a:font script="Taml" typeface="Latha"/>
+        <a:font script="Syrc" typeface="Estrangelo Edessa"/>
+        <a:font script="Orya" typeface="Kalinga"/>
+        <a:font script="Mlym" typeface="Kartika"/>
+        <a:font script="Laoo" typeface="DokChampa"/>
+        <a:font script="Sinh" typeface="Iskoola Pota"/>
+        <a:font script="Mong" typeface="Mongolian Baiti"/>
+        <a:font script="Viet" typeface="Arial"/>
+        <a:font script="Uigh" typeface="Microsoft Uighur"/>
+        <a:font script="Geor" typeface="Sylfaen"/>
+        <a:font script="Armn" typeface="Arial"/>
+        <a:font script="Bugi" typeface="Leelawadee UI"/>
+        <a:font script="Bopo" typeface="Microsoft JhengHei"/>
+        <a:font script="Java" typeface="Javanese Text"/>
+        <a:font script="Lisu" typeface="Segoe UI"/>
+        <a:font script="Mymr" typeface="Myanmar Text"/>
+        <a:font script="Nkoo" typeface="Ebrima"/>
+        <a:font script="Olck" typeface="Nirmala UI"/>
+        <a:font script="Osma" typeface="Ebrima"/>
+        <a:font script="Phag" typeface="Phagspa"/>
+        <a:font script="Syrn" typeface="Estrangelo Edessa"/>
+        <a:font script="Syrj" typeface="Estrangelo Edessa"/>
+        <a:font script="Syre" typeface="Estrangelo Edessa"/>
+        <a:font script="Sora" typeface="Nirmala UI"/>
+        <a:font script="Tale" typeface="Microsoft Tai Le"/>
+        <a:font script="Talu" typeface="Microsoft New Tai Lue"/>
+        <a:font script="Tfng" typeface="Ebrima"/>
+      </a:minorFont>
+    </a:fontScheme>
+    <a:fmtScheme name="Office">
+      <a:fillStyleLst>
+        <a:solidFill>
+          <a:schemeClr val="phClr"/>
+        </a:solidFill>
+        <a:gradFill rotWithShape="1">
+          <a:gsLst>
+            <a:gs pos="0">
+              <a:schemeClr val="phClr">
+                <a:lumMod val="110000"/>
+                <a:satMod val="105000"/>
+                <a:tint val="67000"/>
+              </a:schemeClr>
+            </a:gs>
+            <a:gs pos="50000">
+              <a:schemeClr val="phClr">
+                <a:lumMod val="105000"/>
+                <a:satMod val="103000"/>
+                <a:tint val="73000"/>
+              </a:schemeClr>
+            </a:gs>
+            <a:gs pos="100000">
+              <a:schemeClr val="phClr">
+                <a:lumMod val="105000"/>
+                <a:satMod val="109000"/>
+                <a:tint val="81000"/>
+              </a:schemeClr>
+            </a:gs>
+          </a:gsLst>
+          <a:lin ang="5400000" scaled="0"/>
+        </a:gradFill>
+        <a:gradFill rotWithShape="1">
+          <a:gsLst>
+            <a:gs pos="0">
+              <a:schemeClr val="phClr">
+                <a:satMod val="103000"/>
+                <a:lumMod val="102000"/>
+                <a:tint val="94000"/>
+              </a:schemeClr>
+            </a:gs>
+            <a:gs pos="50000">
+              <a:schemeClr val="phClr">
+                <a:satMod val="110000"/>
+                <a:lumMod val="100000"/>
+                <a:shade val="100000"/>
+              </a:schemeClr>
+            </a:gs>
+            <a:gs pos="100000">
+              <a:schemeClr val="phClr">
+                <a:lumMod val="99000"/>
+                <a:satMod val="120000"/>
+                <a:shade val="78000"/>
+              </a:schemeClr>
+            </a:gs>
+          </a:gsLst>
+          <a:lin ang="5400000" scaled="0"/>
+        </a:gradFill>
+      </a:fillStyleLst>
+      <a:lnStyleLst>
+        <a:ln w="6350" cap="flat" cmpd="sng" algn="ctr">
+          <a:solidFill>
+            <a:schemeClr val="phClr"/>
+          </a:solidFill>
+          <a:prstDash val="solid"/>
+          <a:miter lim="800000"/>
+        </a:ln>
+        <a:ln w="12700" cap="flat" cmpd="sng" algn="ctr">
+          <a:solidFill>
+            <a:schemeClr val="phClr"/>
+          </a:solidFill>
+          <a:prstDash val="solid"/>
+          <a:miter lim="800000"/>
+        </a:ln>
+        <a:ln w="19050" cap="flat" cmpd="sng" algn="ctr">
+          <a:solidFill>
+            <a:schemeClr val="phClr"/>
+          </a:solidFill>
+          <a:prstDash val="solid"/>
+          <a:miter lim="800000"/>
+        </a:ln>
+      </a:lnStyleLst>
+      <a:effectStyleLst>
+        <a:effectStyle>
+          <a:effectLst/>
+        </a:effectStyle>
+        <a:effectStyle>
+          <a:effectLst/>
+        </a:effectStyle>
+        <a:effectStyle>
+          <a:effectLst>
+            <a:outerShdw blurRad="57150" dist="19050" dir="5400000" algn="ctr" rotWithShape="0">
+              <a:srgbClr val="000000">
+                <a:alpha val="63000"/>
+              </a:srgbClr>
+            </a:outerShdw>
+          </a:effectLst>
+        </a:effectStyle>
+      </a:effectStyleLst>
+      <a:bgFillStyleLst>
+        <a:solidFill>
+          <a:schemeClr val="phClr"/>
+        </a:solidFill>
+        <a:solidFill>
+          <a:schemeClr val="phClr">
+            <a:tint val="95000"/>
+            <a:satMod val="170000"/>
+          </a:schemeClr>
+        </a:solidFill>
+        <a:gradFill rotWithShape="1">
+          <a:gsLst>
+            <a:gs pos="0">
+              <a:schemeClr val="phClr">
+                <a:tint val="93000"/>
+                <a:satMod val="150000"/>
+                <a:shade val="98000"/>
+                <a:lumMod val="102000"/>
+              </a:schemeClr>
+            </a:gs>
+            <a:gs pos="50000">
+              <a:schemeClr val="phClr">
+                <a:tint val="98000"/>
+                <a:satMod val="130000"/>
+                <a:shade val="90000"/>
+                <a:lumMod val="103000"/>
+              </a:schemeClr>
+            </a:gs>
+            <a:gs pos="100000">
+              <a:schemeClr val="phClr">
+                <a:shade val="63000"/>
+                <a:satMod val="120000"/>
+              </a:schemeClr>
+            </a:gs>
+          </a:gsLst>
+          <a:lin ang="5400000" scaled="0"/>
+        </a:gradFill>
+      </a:bgFillStyleLst>
+    </a:fmtScheme>
+  </a:themeElements>
+  <a:objectDefaults/>
+  <a:extraClrSchemeLst/>
+  <a:extLst>
+    <a:ext uri="{05A4C25C-085E-4340-85A3-A5531E510DB2}">
+      <thm15:themeFamily xmlns:thm15="http://schemas.microsoft.com/office/thememl/2012/main" name="Office Theme" id="{62F939B6-93AF-4DB8-9C6B-D6C7DFDC589F}" vid="{4A3C46E8-61CC-4603-A589-7422A47A8E4A}"/>
+    </a:ext>
+  </a:extLst>
+</a:theme>
 </file>
</xml_diff>

<commit_message>
Add choropleth map to the powerpoint
</commit_message>
<xml_diff>
--- a/Covid 19 Presentation.pptx
+++ b/Covid 19 Presentation.pptx
@@ -5,24 +5,25 @@
     <p:sldMasterId id="2147483648" r:id="rId1"/>
   </p:sldMasterIdLst>
   <p:notesMasterIdLst>
-    <p:notesMasterId r:id="rId17"/>
+    <p:notesMasterId r:id="rId18"/>
   </p:notesMasterIdLst>
   <p:sldIdLst>
     <p:sldId id="256" r:id="rId2"/>
     <p:sldId id="257" r:id="rId3"/>
-    <p:sldId id="259" r:id="rId4"/>
-    <p:sldId id="258" r:id="rId5"/>
-    <p:sldId id="260" r:id="rId6"/>
-    <p:sldId id="261" r:id="rId7"/>
-    <p:sldId id="262" r:id="rId8"/>
-    <p:sldId id="270" r:id="rId9"/>
-    <p:sldId id="268" r:id="rId10"/>
-    <p:sldId id="269" r:id="rId11"/>
-    <p:sldId id="263" r:id="rId12"/>
-    <p:sldId id="264" r:id="rId13"/>
-    <p:sldId id="265" r:id="rId14"/>
-    <p:sldId id="266" r:id="rId15"/>
-    <p:sldId id="267" r:id="rId16"/>
+    <p:sldId id="271" r:id="rId4"/>
+    <p:sldId id="259" r:id="rId5"/>
+    <p:sldId id="258" r:id="rId6"/>
+    <p:sldId id="260" r:id="rId7"/>
+    <p:sldId id="261" r:id="rId8"/>
+    <p:sldId id="262" r:id="rId9"/>
+    <p:sldId id="270" r:id="rId10"/>
+    <p:sldId id="268" r:id="rId11"/>
+    <p:sldId id="269" r:id="rId12"/>
+    <p:sldId id="263" r:id="rId13"/>
+    <p:sldId id="264" r:id="rId14"/>
+    <p:sldId id="265" r:id="rId15"/>
+    <p:sldId id="266" r:id="rId16"/>
+    <p:sldId id="267" r:id="rId17"/>
   </p:sldIdLst>
   <p:sldSz cx="12192000" cy="6858000"/>
   <p:notesSz cx="6858000" cy="9144000"/>
@@ -134,7 +135,7 @@
   <pc:docChgLst>
     <pc:chgData name="Zachary Owen" userId="d1254ce893023eb5" providerId="LiveId" clId="{5481171A-B7C3-41C8-AC9C-C25C4A57EECB}"/>
     <pc:docChg chg="undo custSel addSld modSld sldOrd">
-      <pc:chgData name="Zachary Owen" userId="d1254ce893023eb5" providerId="LiveId" clId="{5481171A-B7C3-41C8-AC9C-C25C4A57EECB}" dt="2021-05-08T00:06:21.261" v="6032" actId="1076"/>
+      <pc:chgData name="Zachary Owen" userId="d1254ce893023eb5" providerId="LiveId" clId="{5481171A-B7C3-41C8-AC9C-C25C4A57EECB}" dt="2021-05-08T00:11:43.198" v="6144" actId="20577"/>
       <pc:docMkLst>
         <pc:docMk/>
       </pc:docMkLst>
@@ -238,8 +239,8 @@
           </ac:spMkLst>
         </pc:spChg>
       </pc:sldChg>
-      <pc:sldChg chg="addSp delSp modSp mod modClrScheme chgLayout">
-        <pc:chgData name="Zachary Owen" userId="d1254ce893023eb5" providerId="LiveId" clId="{5481171A-B7C3-41C8-AC9C-C25C4A57EECB}" dt="2021-05-08T00:04:26.100" v="5972" actId="20577"/>
+      <pc:sldChg chg="addSp delSp modSp mod modClrScheme chgLayout modNotesTx">
+        <pc:chgData name="Zachary Owen" userId="d1254ce893023eb5" providerId="LiveId" clId="{5481171A-B7C3-41C8-AC9C-C25C4A57EECB}" dt="2021-05-08T00:11:34.488" v="6120" actId="20577"/>
         <pc:sldMkLst>
           <pc:docMk/>
           <pc:sldMk cId="281725530" sldId="262"/>
@@ -506,8 +507,8 @@
           </ac:spMkLst>
         </pc:spChg>
       </pc:sldChg>
-      <pc:sldChg chg="modSp mod">
-        <pc:chgData name="Zachary Owen" userId="d1254ce893023eb5" providerId="LiveId" clId="{5481171A-B7C3-41C8-AC9C-C25C4A57EECB}" dt="2021-05-07T23:59:53.797" v="5457" actId="20577"/>
+      <pc:sldChg chg="modSp mod modNotesTx">
+        <pc:chgData name="Zachary Owen" userId="d1254ce893023eb5" providerId="LiveId" clId="{5481171A-B7C3-41C8-AC9C-C25C4A57EECB}" dt="2021-05-08T00:11:43.198" v="6144" actId="20577"/>
         <pc:sldMkLst>
           <pc:docMk/>
           <pc:sldMk cId="2873331056" sldId="266"/>
@@ -907,6 +908,37 @@
             <pc:docMk/>
             <pc:sldMk cId="2927825439" sldId="270"/>
             <ac:picMk id="11" creationId="{8CB37DE4-12B4-4DAA-92C7-F1578D53715E}"/>
+          </ac:picMkLst>
+        </pc:picChg>
+      </pc:sldChg>
+      <pc:sldChg chg="addSp delSp modSp new mod modClrScheme chgLayout modNotesTx">
+        <pc:chgData name="Zachary Owen" userId="d1254ce893023eb5" providerId="LiveId" clId="{5481171A-B7C3-41C8-AC9C-C25C4A57EECB}" dt="2021-05-08T00:11:24.831" v="6094" actId="20577"/>
+        <pc:sldMkLst>
+          <pc:docMk/>
+          <pc:sldMk cId="546777598" sldId="271"/>
+        </pc:sldMkLst>
+        <pc:spChg chg="del">
+          <ac:chgData name="Zachary Owen" userId="d1254ce893023eb5" providerId="LiveId" clId="{5481171A-B7C3-41C8-AC9C-C25C4A57EECB}" dt="2021-05-08T00:10:29.736" v="6034" actId="700"/>
+          <ac:spMkLst>
+            <pc:docMk/>
+            <pc:sldMk cId="546777598" sldId="271"/>
+            <ac:spMk id="2" creationId="{7B9BFDCF-397D-442F-84EA-95517FFE88B8}"/>
+          </ac:spMkLst>
+        </pc:spChg>
+        <pc:spChg chg="del">
+          <ac:chgData name="Zachary Owen" userId="d1254ce893023eb5" providerId="LiveId" clId="{5481171A-B7C3-41C8-AC9C-C25C4A57EECB}" dt="2021-05-08T00:10:29.736" v="6034" actId="700"/>
+          <ac:spMkLst>
+            <pc:docMk/>
+            <pc:sldMk cId="546777598" sldId="271"/>
+            <ac:spMk id="3" creationId="{B65D6579-E0BB-4E56-AD96-878774838EE4}"/>
+          </ac:spMkLst>
+        </pc:spChg>
+        <pc:picChg chg="add mod">
+          <ac:chgData name="Zachary Owen" userId="d1254ce893023eb5" providerId="LiveId" clId="{5481171A-B7C3-41C8-AC9C-C25C4A57EECB}" dt="2021-05-08T00:10:58.309" v="6039" actId="1076"/>
+          <ac:picMkLst>
+            <pc:docMk/>
+            <pc:sldMk cId="546777598" sldId="271"/>
+            <ac:picMk id="5" creationId="{ABFFCE08-9892-46FD-BD12-3DC26910737B}"/>
           </ac:picMkLst>
         </pc:picChg>
       </pc:sldChg>
@@ -1711,7 +1743,10 @@
           <a:bodyPr/>
           <a:lstStyle/>
           <a:p>
-            <a:endParaRPr lang="en-US" dirty="0"/>
+            <a:r>
+              <a:rPr lang="en-US" dirty="0"/>
+              <a:t>Zack will pass it on to Jake after this slide</a:t>
+            </a:r>
           </a:p>
         </p:txBody>
       </p:sp>
@@ -1732,7 +1767,178 @@
           <a:p>
             <a:fld id="{30EA3FC9-ABD8-49A9-8E7B-D1E74E2698C8}" type="slidenum">
               <a:rPr lang="en-US" smtClean="0"/>
-              <a:t>9</a:t>
+              <a:t>3</a:t>
+            </a:fld>
+            <a:endParaRPr lang="en-US"/>
+          </a:p>
+        </p:txBody>
+      </p:sp>
+    </p:spTree>
+    <p:extLst>
+      <p:ext uri="{BB962C8B-B14F-4D97-AF65-F5344CB8AC3E}">
+        <p14:creationId xmlns:p14="http://schemas.microsoft.com/office/powerpoint/2010/main" val="3596207175"/>
+      </p:ext>
+    </p:extLst>
+  </p:cSld>
+  <p:clrMapOvr>
+    <a:masterClrMapping/>
+  </p:clrMapOvr>
+</p:notes>
+</file>
+
+<file path=ppt/notesSlides/notesSlide2.xml><?xml version="1.0" encoding="utf-8"?>
+<p:notes xmlns:a="http://schemas.openxmlformats.org/drawingml/2006/main" xmlns:r="http://schemas.openxmlformats.org/officeDocument/2006/relationships" xmlns:p="http://schemas.openxmlformats.org/presentationml/2006/main">
+  <p:cSld>
+    <p:spTree>
+      <p:nvGrpSpPr>
+        <p:cNvPr id="1" name=""/>
+        <p:cNvGrpSpPr/>
+        <p:nvPr/>
+      </p:nvGrpSpPr>
+      <p:grpSpPr>
+        <a:xfrm>
+          <a:off x="0" y="0"/>
+          <a:ext cx="0" cy="0"/>
+          <a:chOff x="0" y="0"/>
+          <a:chExt cx="0" cy="0"/>
+        </a:xfrm>
+      </p:grpSpPr>
+      <p:sp>
+        <p:nvSpPr>
+          <p:cNvPr id="2" name="Slide Image Placeholder 1"/>
+          <p:cNvSpPr>
+            <a:spLocks noGrp="1" noRot="1" noChangeAspect="1"/>
+          </p:cNvSpPr>
+          <p:nvPr>
+            <p:ph type="sldImg"/>
+          </p:nvPr>
+        </p:nvSpPr>
+        <p:spPr/>
+      </p:sp>
+      <p:sp>
+        <p:nvSpPr>
+          <p:cNvPr id="3" name="Notes Placeholder 2"/>
+          <p:cNvSpPr>
+            <a:spLocks noGrp="1"/>
+          </p:cNvSpPr>
+          <p:nvPr>
+            <p:ph type="body" idx="1"/>
+          </p:nvPr>
+        </p:nvSpPr>
+        <p:spPr/>
+        <p:txBody>
+          <a:bodyPr/>
+          <a:lstStyle/>
+          <a:p>
+            <a:r>
+              <a:rPr lang="en-US" dirty="0"/>
+              <a:t>Andrew will take over here</a:t>
+            </a:r>
+          </a:p>
+        </p:txBody>
+      </p:sp>
+      <p:sp>
+        <p:nvSpPr>
+          <p:cNvPr id="4" name="Slide Number Placeholder 3"/>
+          <p:cNvSpPr>
+            <a:spLocks noGrp="1"/>
+          </p:cNvSpPr>
+          <p:nvPr>
+            <p:ph type="sldNum" sz="quarter" idx="5"/>
+          </p:nvPr>
+        </p:nvSpPr>
+        <p:spPr/>
+        <p:txBody>
+          <a:bodyPr/>
+          <a:lstStyle/>
+          <a:p>
+            <a:fld id="{30EA3FC9-ABD8-49A9-8E7B-D1E74E2698C8}" type="slidenum">
+              <a:rPr lang="en-US" smtClean="0"/>
+              <a:t>8</a:t>
+            </a:fld>
+            <a:endParaRPr lang="en-US"/>
+          </a:p>
+        </p:txBody>
+      </p:sp>
+    </p:spTree>
+    <p:extLst>
+      <p:ext uri="{BB962C8B-B14F-4D97-AF65-F5344CB8AC3E}">
+        <p14:creationId xmlns:p14="http://schemas.microsoft.com/office/powerpoint/2010/main" val="2803988070"/>
+      </p:ext>
+    </p:extLst>
+  </p:cSld>
+  <p:clrMapOvr>
+    <a:masterClrMapping/>
+  </p:clrMapOvr>
+</p:notes>
+</file>
+
+<file path=ppt/notesSlides/notesSlide3.xml><?xml version="1.0" encoding="utf-8"?>
+<p:notes xmlns:a="http://schemas.openxmlformats.org/drawingml/2006/main" xmlns:r="http://schemas.openxmlformats.org/officeDocument/2006/relationships" xmlns:p="http://schemas.openxmlformats.org/presentationml/2006/main">
+  <p:cSld>
+    <p:spTree>
+      <p:nvGrpSpPr>
+        <p:cNvPr id="1" name=""/>
+        <p:cNvGrpSpPr/>
+        <p:nvPr/>
+      </p:nvGrpSpPr>
+      <p:grpSpPr>
+        <a:xfrm>
+          <a:off x="0" y="0"/>
+          <a:ext cx="0" cy="0"/>
+          <a:chOff x="0" y="0"/>
+          <a:chExt cx="0" cy="0"/>
+        </a:xfrm>
+      </p:grpSpPr>
+      <p:sp>
+        <p:nvSpPr>
+          <p:cNvPr id="2" name="Slide Image Placeholder 1"/>
+          <p:cNvSpPr>
+            <a:spLocks noGrp="1" noRot="1" noChangeAspect="1"/>
+          </p:cNvSpPr>
+          <p:nvPr>
+            <p:ph type="sldImg"/>
+          </p:nvPr>
+        </p:nvSpPr>
+        <p:spPr/>
+      </p:sp>
+      <p:sp>
+        <p:nvSpPr>
+          <p:cNvPr id="3" name="Notes Placeholder 2"/>
+          <p:cNvSpPr>
+            <a:spLocks noGrp="1"/>
+          </p:cNvSpPr>
+          <p:nvPr>
+            <p:ph type="body" idx="1"/>
+          </p:nvPr>
+        </p:nvSpPr>
+        <p:spPr/>
+        <p:txBody>
+          <a:bodyPr/>
+          <a:lstStyle/>
+          <a:p>
+            <a:endParaRPr lang="en-US" dirty="0"/>
+          </a:p>
+        </p:txBody>
+      </p:sp>
+      <p:sp>
+        <p:nvSpPr>
+          <p:cNvPr id="4" name="Slide Number Placeholder 3"/>
+          <p:cNvSpPr>
+            <a:spLocks noGrp="1"/>
+          </p:cNvSpPr>
+          <p:nvPr>
+            <p:ph type="sldNum" sz="quarter" idx="5"/>
+          </p:nvPr>
+        </p:nvSpPr>
+        <p:spPr/>
+        <p:txBody>
+          <a:bodyPr/>
+          <a:lstStyle/>
+          <a:p>
+            <a:fld id="{30EA3FC9-ABD8-49A9-8E7B-D1E74E2698C8}" type="slidenum">
+              <a:rPr lang="en-US" smtClean="0"/>
+              <a:t>10</a:t>
             </a:fld>
             <a:endParaRPr lang="en-US"/>
           </a:p>
@@ -1742,6 +1948,93 @@
     <p:extLst>
       <p:ext uri="{BB962C8B-B14F-4D97-AF65-F5344CB8AC3E}">
         <p14:creationId xmlns:p14="http://schemas.microsoft.com/office/powerpoint/2010/main" val="3583179474"/>
+      </p:ext>
+    </p:extLst>
+  </p:cSld>
+  <p:clrMapOvr>
+    <a:masterClrMapping/>
+  </p:clrMapOvr>
+</p:notes>
+</file>
+
+<file path=ppt/notesSlides/notesSlide4.xml><?xml version="1.0" encoding="utf-8"?>
+<p:notes xmlns:a="http://schemas.openxmlformats.org/drawingml/2006/main" xmlns:r="http://schemas.openxmlformats.org/officeDocument/2006/relationships" xmlns:p="http://schemas.openxmlformats.org/presentationml/2006/main">
+  <p:cSld>
+    <p:spTree>
+      <p:nvGrpSpPr>
+        <p:cNvPr id="1" name=""/>
+        <p:cNvGrpSpPr/>
+        <p:nvPr/>
+      </p:nvGrpSpPr>
+      <p:grpSpPr>
+        <a:xfrm>
+          <a:off x="0" y="0"/>
+          <a:ext cx="0" cy="0"/>
+          <a:chOff x="0" y="0"/>
+          <a:chExt cx="0" cy="0"/>
+        </a:xfrm>
+      </p:grpSpPr>
+      <p:sp>
+        <p:nvSpPr>
+          <p:cNvPr id="2" name="Slide Image Placeholder 1"/>
+          <p:cNvSpPr>
+            <a:spLocks noGrp="1" noRot="1" noChangeAspect="1"/>
+          </p:cNvSpPr>
+          <p:nvPr>
+            <p:ph type="sldImg"/>
+          </p:nvPr>
+        </p:nvSpPr>
+        <p:spPr/>
+      </p:sp>
+      <p:sp>
+        <p:nvSpPr>
+          <p:cNvPr id="3" name="Notes Placeholder 2"/>
+          <p:cNvSpPr>
+            <a:spLocks noGrp="1"/>
+          </p:cNvSpPr>
+          <p:nvPr>
+            <p:ph type="body" idx="1"/>
+          </p:nvPr>
+        </p:nvSpPr>
+        <p:spPr/>
+        <p:txBody>
+          <a:bodyPr/>
+          <a:lstStyle/>
+          <a:p>
+            <a:r>
+              <a:rPr lang="en-US" dirty="0"/>
+              <a:t>Zack will take back over</a:t>
+            </a:r>
+          </a:p>
+        </p:txBody>
+      </p:sp>
+      <p:sp>
+        <p:nvSpPr>
+          <p:cNvPr id="4" name="Slide Number Placeholder 3"/>
+          <p:cNvSpPr>
+            <a:spLocks noGrp="1"/>
+          </p:cNvSpPr>
+          <p:nvPr>
+            <p:ph type="sldNum" sz="quarter" idx="5"/>
+          </p:nvPr>
+        </p:nvSpPr>
+        <p:spPr/>
+        <p:txBody>
+          <a:bodyPr/>
+          <a:lstStyle/>
+          <a:p>
+            <a:fld id="{30EA3FC9-ABD8-49A9-8E7B-D1E74E2698C8}" type="slidenum">
+              <a:rPr lang="en-US" smtClean="0"/>
+              <a:t>15</a:t>
+            </a:fld>
+            <a:endParaRPr lang="en-US"/>
+          </a:p>
+        </p:txBody>
+      </p:sp>
+    </p:spTree>
+    <p:extLst>
+      <p:ext uri="{BB962C8B-B14F-4D97-AF65-F5344CB8AC3E}">
+        <p14:creationId xmlns:p14="http://schemas.microsoft.com/office/powerpoint/2010/main" val="1264772548"/>
       </p:ext>
     </p:extLst>
   </p:cSld>
@@ -5097,6 +5390,310 @@
       </p:grpSpPr>
       <p:sp>
         <p:nvSpPr>
+          <p:cNvPr id="6" name="Title 5">
+            <a:extLst>
+              <a:ext uri="{FF2B5EF4-FFF2-40B4-BE49-F238E27FC236}">
+                <a16:creationId xmlns:a16="http://schemas.microsoft.com/office/drawing/2014/main" id="{2415EC17-CDAA-4D6C-9B43-5C8E6DCEEA30}"/>
+              </a:ext>
+            </a:extLst>
+          </p:cNvPr>
+          <p:cNvSpPr>
+            <a:spLocks noGrp="1"/>
+          </p:cNvSpPr>
+          <p:nvPr>
+            <p:ph type="title"/>
+          </p:nvPr>
+        </p:nvSpPr>
+        <p:spPr/>
+        <p:txBody>
+          <a:bodyPr>
+            <a:normAutofit/>
+          </a:bodyPr>
+          <a:lstStyle/>
+          <a:p>
+            <a:r>
+              <a:rPr lang="en-US" dirty="0"/>
+              <a:t> </a:t>
+            </a:r>
+          </a:p>
+        </p:txBody>
+      </p:sp>
+      <p:pic>
+        <p:nvPicPr>
+          <p:cNvPr id="5" name="Content Placeholder 4">
+            <a:extLst>
+              <a:ext uri="{FF2B5EF4-FFF2-40B4-BE49-F238E27FC236}">
+                <a16:creationId xmlns:a16="http://schemas.microsoft.com/office/drawing/2014/main" id="{7DEC3078-992B-4D94-AC5F-2E51333C7D16}"/>
+              </a:ext>
+            </a:extLst>
+          </p:cNvPr>
+          <p:cNvPicPr>
+            <a:picLocks noGrp="1" noChangeAspect="1"/>
+          </p:cNvPicPr>
+          <p:nvPr>
+            <p:ph sz="half" idx="1"/>
+          </p:nvPr>
+        </p:nvPicPr>
+        <p:blipFill>
+          <a:blip r:embed="rId3">
+            <a:extLst>
+              <a:ext uri="{28A0092B-C50C-407E-A947-70E740481C1C}">
+                <a14:useLocalDpi xmlns:a14="http://schemas.microsoft.com/office/drawing/2010/main" val="0"/>
+              </a:ext>
+            </a:extLst>
+          </a:blip>
+          <a:stretch>
+            <a:fillRect/>
+          </a:stretch>
+        </p:blipFill>
+        <p:spPr>
+          <a:xfrm>
+            <a:off x="838200" y="2274094"/>
+            <a:ext cx="5181600" cy="3454400"/>
+          </a:xfrm>
+        </p:spPr>
+      </p:pic>
+      <p:pic>
+        <p:nvPicPr>
+          <p:cNvPr id="11" name="Content Placeholder 10">
+            <a:extLst>
+              <a:ext uri="{FF2B5EF4-FFF2-40B4-BE49-F238E27FC236}">
+                <a16:creationId xmlns:a16="http://schemas.microsoft.com/office/drawing/2014/main" id="{AC6172F2-058C-4A73-8191-6002414092D6}"/>
+              </a:ext>
+            </a:extLst>
+          </p:cNvPr>
+          <p:cNvPicPr>
+            <a:picLocks noGrp="1" noChangeAspect="1"/>
+          </p:cNvPicPr>
+          <p:nvPr>
+            <p:ph sz="half" idx="2"/>
+          </p:nvPr>
+        </p:nvPicPr>
+        <p:blipFill>
+          <a:blip r:embed="rId4">
+            <a:extLst>
+              <a:ext uri="{28A0092B-C50C-407E-A947-70E740481C1C}">
+                <a14:useLocalDpi xmlns:a14="http://schemas.microsoft.com/office/drawing/2010/main" val="0"/>
+              </a:ext>
+            </a:extLst>
+          </a:blip>
+          <a:stretch>
+            <a:fillRect/>
+          </a:stretch>
+        </p:blipFill>
+        <p:spPr>
+          <a:xfrm>
+            <a:off x="6172199" y="2618233"/>
+            <a:ext cx="2653019" cy="1768679"/>
+          </a:xfrm>
+        </p:spPr>
+      </p:pic>
+      <p:sp>
+        <p:nvSpPr>
+          <p:cNvPr id="12" name="Text Placeholder 11">
+            <a:extLst>
+              <a:ext uri="{FF2B5EF4-FFF2-40B4-BE49-F238E27FC236}">
+                <a16:creationId xmlns:a16="http://schemas.microsoft.com/office/drawing/2014/main" id="{28797D2E-DF25-4DEB-B568-C7C03EB5D2CB}"/>
+              </a:ext>
+            </a:extLst>
+          </p:cNvPr>
+          <p:cNvSpPr>
+            <a:spLocks noGrp="1"/>
+          </p:cNvSpPr>
+          <p:nvPr>
+            <p:ph type="body" sz="quarter" idx="4294967295"/>
+          </p:nvPr>
+        </p:nvSpPr>
+        <p:spPr>
+          <a:xfrm>
+            <a:off x="710214" y="365125"/>
+            <a:ext cx="10777491" cy="1527175"/>
+          </a:xfrm>
+        </p:spPr>
+        <p:txBody>
+          <a:bodyPr>
+            <a:normAutofit/>
+          </a:bodyPr>
+          <a:lstStyle/>
+          <a:p>
+            <a:pPr marL="0" indent="0" algn="ctr">
+              <a:buNone/>
+            </a:pPr>
+            <a:r>
+              <a:rPr lang="en-US" sz="3900" b="0" dirty="0"/>
+              <a:t>Total Population</a:t>
+            </a:r>
+            <a:endParaRPr lang="en-US" dirty="0"/>
+          </a:p>
+          <a:p>
+            <a:pPr marL="0" indent="0" algn="ctr">
+              <a:buNone/>
+            </a:pPr>
+            <a:r>
+              <a:rPr lang="en-US" b="0" dirty="0"/>
+              <a:t>This data failed to reject the null hypothesis, thus there is no statistical difference between the data in the different quartiles.</a:t>
+            </a:r>
+          </a:p>
+          <a:p>
+            <a:pPr marL="0" indent="0" algn="ctr">
+              <a:buNone/>
+            </a:pPr>
+            <a:endParaRPr lang="en-US" b="0" dirty="0"/>
+          </a:p>
+        </p:txBody>
+      </p:sp>
+      <p:pic>
+        <p:nvPicPr>
+          <p:cNvPr id="14" name="Picture 13">
+            <a:extLst>
+              <a:ext uri="{FF2B5EF4-FFF2-40B4-BE49-F238E27FC236}">
+                <a16:creationId xmlns:a16="http://schemas.microsoft.com/office/drawing/2014/main" id="{52F2F952-BE94-48C0-AB4E-1110B8F2974D}"/>
+              </a:ext>
+            </a:extLst>
+          </p:cNvPr>
+          <p:cNvPicPr>
+            <a:picLocks noChangeAspect="1"/>
+          </p:cNvPicPr>
+          <p:nvPr/>
+        </p:nvPicPr>
+        <p:blipFill>
+          <a:blip r:embed="rId5">
+            <a:extLst>
+              <a:ext uri="{28A0092B-C50C-407E-A947-70E740481C1C}">
+                <a14:useLocalDpi xmlns:a14="http://schemas.microsoft.com/office/drawing/2010/main" val="0"/>
+              </a:ext>
+            </a:extLst>
+          </a:blip>
+          <a:stretch>
+            <a:fillRect/>
+          </a:stretch>
+        </p:blipFill>
+        <p:spPr>
+          <a:xfrm>
+            <a:off x="8713709" y="2618233"/>
+            <a:ext cx="2653018" cy="1768679"/>
+          </a:xfrm>
+          <a:prstGeom prst="rect">
+            <a:avLst/>
+          </a:prstGeom>
+        </p:spPr>
+      </p:pic>
+      <p:pic>
+        <p:nvPicPr>
+          <p:cNvPr id="16" name="Picture 15">
+            <a:extLst>
+              <a:ext uri="{FF2B5EF4-FFF2-40B4-BE49-F238E27FC236}">
+                <a16:creationId xmlns:a16="http://schemas.microsoft.com/office/drawing/2014/main" id="{2295A3B0-BF3D-4B84-8861-D4471F95F4A5}"/>
+              </a:ext>
+            </a:extLst>
+          </p:cNvPr>
+          <p:cNvPicPr>
+            <a:picLocks noChangeAspect="1"/>
+          </p:cNvPicPr>
+          <p:nvPr/>
+        </p:nvPicPr>
+        <p:blipFill>
+          <a:blip r:embed="rId6">
+            <a:extLst>
+              <a:ext uri="{28A0092B-C50C-407E-A947-70E740481C1C}">
+                <a14:useLocalDpi xmlns:a14="http://schemas.microsoft.com/office/drawing/2010/main" val="0"/>
+              </a:ext>
+            </a:extLst>
+          </a:blip>
+          <a:stretch>
+            <a:fillRect/>
+          </a:stretch>
+        </p:blipFill>
+        <p:spPr>
+          <a:xfrm>
+            <a:off x="6172200" y="4373453"/>
+            <a:ext cx="2653018" cy="1768679"/>
+          </a:xfrm>
+          <a:prstGeom prst="rect">
+            <a:avLst/>
+          </a:prstGeom>
+        </p:spPr>
+      </p:pic>
+      <p:pic>
+        <p:nvPicPr>
+          <p:cNvPr id="20" name="Picture 19">
+            <a:extLst>
+              <a:ext uri="{FF2B5EF4-FFF2-40B4-BE49-F238E27FC236}">
+                <a16:creationId xmlns:a16="http://schemas.microsoft.com/office/drawing/2014/main" id="{ECA59790-F2D9-4938-85A8-AAA0186BBA30}"/>
+              </a:ext>
+            </a:extLst>
+          </p:cNvPr>
+          <p:cNvPicPr>
+            <a:picLocks noChangeAspect="1"/>
+          </p:cNvPicPr>
+          <p:nvPr/>
+        </p:nvPicPr>
+        <p:blipFill>
+          <a:blip r:embed="rId7">
+            <a:extLst>
+              <a:ext uri="{28A0092B-C50C-407E-A947-70E740481C1C}">
+                <a14:useLocalDpi xmlns:a14="http://schemas.microsoft.com/office/drawing/2010/main" val="0"/>
+              </a:ext>
+            </a:extLst>
+          </a:blip>
+          <a:stretch>
+            <a:fillRect/>
+          </a:stretch>
+        </p:blipFill>
+        <p:spPr>
+          <a:xfrm>
+            <a:off x="8707583" y="4370134"/>
+            <a:ext cx="2653018" cy="1768679"/>
+          </a:xfrm>
+          <a:prstGeom prst="rect">
+            <a:avLst/>
+          </a:prstGeom>
+        </p:spPr>
+      </p:pic>
+    </p:spTree>
+    <p:extLst>
+      <p:ext uri="{BB962C8B-B14F-4D97-AF65-F5344CB8AC3E}">
+        <p14:creationId xmlns:p14="http://schemas.microsoft.com/office/powerpoint/2010/main" val="3399668416"/>
+      </p:ext>
+    </p:extLst>
+  </p:cSld>
+  <p:clrMapOvr>
+    <a:masterClrMapping/>
+  </p:clrMapOvr>
+  <mc:AlternateContent xmlns:mc="http://schemas.openxmlformats.org/markup-compatibility/2006" xmlns:p14="http://schemas.microsoft.com/office/powerpoint/2010/main">
+    <mc:Choice Requires="p14">
+      <p:transition spd="med" p14:dur="700">
+        <p:fade/>
+      </p:transition>
+    </mc:Choice>
+    <mc:Fallback xmlns="">
+      <p:transition spd="med">
+        <p:fade/>
+      </p:transition>
+    </mc:Fallback>
+  </mc:AlternateContent>
+</p:sld>
+</file>
+
+<file path=ppt/slides/slide11.xml><?xml version="1.0" encoding="utf-8"?>
+<p:sld xmlns:a="http://schemas.openxmlformats.org/drawingml/2006/main" xmlns:r="http://schemas.openxmlformats.org/officeDocument/2006/relationships" xmlns:p="http://schemas.openxmlformats.org/presentationml/2006/main">
+  <p:cSld>
+    <p:spTree>
+      <p:nvGrpSpPr>
+        <p:cNvPr id="1" name=""/>
+        <p:cNvGrpSpPr/>
+        <p:nvPr/>
+      </p:nvGrpSpPr>
+      <p:grpSpPr>
+        <a:xfrm>
+          <a:off x="0" y="0"/>
+          <a:ext cx="0" cy="0"/>
+          <a:chOff x="0" y="0"/>
+          <a:chExt cx="0" cy="0"/>
+        </a:xfrm>
+      </p:grpSpPr>
+      <p:sp>
+        <p:nvSpPr>
           <p:cNvPr id="2" name="Title 1">
             <a:extLst>
               <a:ext uri="{FF2B5EF4-FFF2-40B4-BE49-F238E27FC236}">
@@ -5370,7 +5967,7 @@
 </p:sld>
 </file>
 
-<file path=ppt/slides/slide11.xml><?xml version="1.0" encoding="utf-8"?>
+<file path=ppt/slides/slide12.xml><?xml version="1.0" encoding="utf-8"?>
 <p:sld xmlns:a="http://schemas.openxmlformats.org/drawingml/2006/main" xmlns:r="http://schemas.openxmlformats.org/officeDocument/2006/relationships" xmlns:p="http://schemas.openxmlformats.org/presentationml/2006/main">
   <p:cSld>
     <p:spTree>
@@ -5672,7 +6269,7 @@
 </p:sld>
 </file>
 
-<file path=ppt/slides/slide12.xml><?xml version="1.0" encoding="utf-8"?>
+<file path=ppt/slides/slide13.xml><?xml version="1.0" encoding="utf-8"?>
 <p:sld xmlns:a="http://schemas.openxmlformats.org/drawingml/2006/main" xmlns:r="http://schemas.openxmlformats.org/officeDocument/2006/relationships" xmlns:p="http://schemas.openxmlformats.org/presentationml/2006/main">
   <p:cSld>
     <p:spTree>
@@ -5967,7 +6564,7 @@
 </p:sld>
 </file>
 
-<file path=ppt/slides/slide13.xml><?xml version="1.0" encoding="utf-8"?>
+<file path=ppt/slides/slide14.xml><?xml version="1.0" encoding="utf-8"?>
 <p:sld xmlns:a="http://schemas.openxmlformats.org/drawingml/2006/main" xmlns:r="http://schemas.openxmlformats.org/officeDocument/2006/relationships" xmlns:p="http://schemas.openxmlformats.org/presentationml/2006/main">
   <p:cSld>
     <p:spTree>
@@ -6077,7 +6674,7 @@
 </p:sld>
 </file>
 
-<file path=ppt/slides/slide14.xml><?xml version="1.0" encoding="utf-8"?>
+<file path=ppt/slides/slide15.xml><?xml version="1.0" encoding="utf-8"?>
 <p:sld xmlns:a="http://schemas.openxmlformats.org/drawingml/2006/main" xmlns:r="http://schemas.openxmlformats.org/officeDocument/2006/relationships" xmlns:p="http://schemas.openxmlformats.org/presentationml/2006/main">
   <p:cSld>
     <p:spTree>
@@ -6187,7 +6784,7 @@
 </p:sld>
 </file>
 
-<file path=ppt/slides/slide15.xml><?xml version="1.0" encoding="utf-8"?>
+<file path=ppt/slides/slide16.xml><?xml version="1.0" encoding="utf-8"?>
 <p:sld xmlns:a="http://schemas.openxmlformats.org/drawingml/2006/main" xmlns:r="http://schemas.openxmlformats.org/officeDocument/2006/relationships" xmlns:p="http://schemas.openxmlformats.org/presentationml/2006/main">
   <p:cSld>
     <p:spTree>
@@ -6437,137 +7034,52 @@
           <a:chExt cx="0" cy="0"/>
         </a:xfrm>
       </p:grpSpPr>
-      <p:sp>
-        <p:nvSpPr>
-          <p:cNvPr id="2" name="Title 1">
-            <a:extLst>
-              <a:ext uri="{FF2B5EF4-FFF2-40B4-BE49-F238E27FC236}">
-                <a16:creationId xmlns:a16="http://schemas.microsoft.com/office/drawing/2014/main" id="{A8DE8BB8-44F3-4A6F-8499-7B0CAA0046EB}"/>
-              </a:ext>
-            </a:extLst>
-          </p:cNvPr>
-          <p:cNvSpPr>
-            <a:spLocks noGrp="1"/>
-          </p:cNvSpPr>
-          <p:nvPr>
-            <p:ph type="title"/>
-          </p:nvPr>
-        </p:nvSpPr>
-        <p:spPr/>
-        <p:txBody>
-          <a:bodyPr/>
-          <a:lstStyle/>
-          <a:p>
-            <a:pPr algn="ctr"/>
-            <a:r>
-              <a:rPr lang="en-US" dirty="0"/>
-              <a:t>What data did we need?</a:t>
-            </a:r>
-          </a:p>
-        </p:txBody>
-      </p:sp>
-      <p:sp>
-        <p:nvSpPr>
-          <p:cNvPr id="3" name="Content Placeholder 2">
-            <a:extLst>
-              <a:ext uri="{FF2B5EF4-FFF2-40B4-BE49-F238E27FC236}">
-                <a16:creationId xmlns:a16="http://schemas.microsoft.com/office/drawing/2014/main" id="{8729F421-5869-48CF-9594-D0E1FFCD7B38}"/>
-              </a:ext>
-            </a:extLst>
-          </p:cNvPr>
-          <p:cNvSpPr>
-            <a:spLocks noGrp="1"/>
-          </p:cNvSpPr>
-          <p:nvPr>
-            <p:ph idx="1"/>
-          </p:nvPr>
-        </p:nvSpPr>
-        <p:spPr/>
-        <p:txBody>
-          <a:bodyPr/>
-          <a:lstStyle/>
-          <a:p>
-            <a:r>
-              <a:rPr lang="en-US" dirty="0"/>
-              <a:t>Kaggle CSV of world vaccination progress cribbed from the Our World in Data </a:t>
-            </a:r>
-            <a:r>
-              <a:rPr lang="en-US" dirty="0" err="1"/>
-              <a:t>Github</a:t>
-            </a:r>
-            <a:r>
-              <a:rPr lang="en-US" dirty="0"/>
-              <a:t> Repository</a:t>
-            </a:r>
-          </a:p>
-          <a:p>
-            <a:r>
-              <a:rPr lang="en-US" dirty="0"/>
-              <a:t>Measures of Wellbeing</a:t>
-            </a:r>
-          </a:p>
-          <a:p>
-            <a:pPr lvl="1"/>
-            <a:r>
-              <a:rPr lang="en-US" dirty="0"/>
-              <a:t>Economic</a:t>
-            </a:r>
-          </a:p>
-          <a:p>
-            <a:pPr lvl="1"/>
-            <a:r>
-              <a:rPr lang="en-US" dirty="0"/>
-              <a:t>Populace</a:t>
-            </a:r>
-          </a:p>
-          <a:p>
-            <a:pPr lvl="1"/>
-            <a:r>
-              <a:rPr lang="en-US" dirty="0"/>
-              <a:t>Educational</a:t>
-            </a:r>
-          </a:p>
-          <a:p>
-            <a:pPr lvl="1"/>
-            <a:r>
-              <a:rPr lang="en-US" dirty="0"/>
-              <a:t>Health </a:t>
-            </a:r>
-          </a:p>
-          <a:p>
-            <a:r>
-              <a:rPr lang="en-US" dirty="0"/>
-              <a:t>Pulled from the World Bank API</a:t>
-            </a:r>
-          </a:p>
-          <a:p>
-            <a:pPr lvl="1"/>
-            <a:endParaRPr lang="en-US" dirty="0"/>
-          </a:p>
-        </p:txBody>
-      </p:sp>
+      <p:pic>
+        <p:nvPicPr>
+          <p:cNvPr id="5" name="Picture 4">
+            <a:extLst>
+              <a:ext uri="{FF2B5EF4-FFF2-40B4-BE49-F238E27FC236}">
+                <a16:creationId xmlns:a16="http://schemas.microsoft.com/office/drawing/2014/main" id="{ABFFCE08-9892-46FD-BD12-3DC26910737B}"/>
+              </a:ext>
+            </a:extLst>
+          </p:cNvPr>
+          <p:cNvPicPr>
+            <a:picLocks noChangeAspect="1"/>
+          </p:cNvPicPr>
+          <p:nvPr/>
+        </p:nvPicPr>
+        <p:blipFill>
+          <a:blip r:embed="rId3">
+            <a:extLst>
+              <a:ext uri="{28A0092B-C50C-407E-A947-70E740481C1C}">
+                <a14:useLocalDpi xmlns:a14="http://schemas.microsoft.com/office/drawing/2010/main" val="0"/>
+              </a:ext>
+            </a:extLst>
+          </a:blip>
+          <a:stretch>
+            <a:fillRect/>
+          </a:stretch>
+        </p:blipFill>
+        <p:spPr>
+          <a:xfrm>
+            <a:off x="1476375" y="1595437"/>
+            <a:ext cx="9239250" cy="3667125"/>
+          </a:xfrm>
+          <a:prstGeom prst="rect">
+            <a:avLst/>
+          </a:prstGeom>
+        </p:spPr>
+      </p:pic>
     </p:spTree>
     <p:extLst>
       <p:ext uri="{BB962C8B-B14F-4D97-AF65-F5344CB8AC3E}">
-        <p14:creationId xmlns:p14="http://schemas.microsoft.com/office/powerpoint/2010/main" val="1570807268"/>
+        <p14:creationId xmlns:p14="http://schemas.microsoft.com/office/powerpoint/2010/main" val="546777598"/>
       </p:ext>
     </p:extLst>
   </p:cSld>
   <p:clrMapOvr>
     <a:masterClrMapping/>
   </p:clrMapOvr>
-  <mc:AlternateContent xmlns:mc="http://schemas.openxmlformats.org/markup-compatibility/2006" xmlns:p14="http://schemas.microsoft.com/office/powerpoint/2010/main">
-    <mc:Choice Requires="p14">
-      <p:transition spd="med" p14:dur="700">
-        <p:fade/>
-      </p:transition>
-    </mc:Choice>
-    <mc:Fallback xmlns="">
-      <p:transition spd="med">
-        <p:fade/>
-      </p:transition>
-    </mc:Fallback>
-  </mc:AlternateContent>
 </p:sld>
 </file>
 
@@ -6593,7 +7105,7 @@
           <p:cNvPr id="2" name="Title 1">
             <a:extLst>
               <a:ext uri="{FF2B5EF4-FFF2-40B4-BE49-F238E27FC236}">
-                <a16:creationId xmlns:a16="http://schemas.microsoft.com/office/drawing/2014/main" id="{FCBCFE40-176B-4A77-BCD8-CDEF6D4BFA4C}"/>
+                <a16:creationId xmlns:a16="http://schemas.microsoft.com/office/drawing/2014/main" id="{A8DE8BB8-44F3-4A6F-8499-7B0CAA0046EB}"/>
               </a:ext>
             </a:extLst>
           </p:cNvPr>
@@ -6605,49 +7117,42 @@
           </p:nvPr>
         </p:nvSpPr>
         <p:spPr/>
-        <p:txBody>
-          <a:bodyPr>
-            <a:normAutofit/>
-          </a:bodyPr>
-          <a:lstStyle/>
-          <a:p>
-            <a:pPr algn="ctr"/>
-            <a:r>
-              <a:rPr lang="en-US" sz="3600" dirty="0"/>
-              <a:t>Members of each population fully vaccinated per 100</a:t>
-            </a:r>
-          </a:p>
-        </p:txBody>
-      </p:sp>
-      <p:sp>
-        <p:nvSpPr>
-          <p:cNvPr id="3" name="Content Placeholder 2">
-            <a:extLst>
-              <a:ext uri="{FF2B5EF4-FFF2-40B4-BE49-F238E27FC236}">
-                <a16:creationId xmlns:a16="http://schemas.microsoft.com/office/drawing/2014/main" id="{848FD0DA-39A8-4AF2-AC3B-8FF71062C678}"/>
-              </a:ext>
-            </a:extLst>
-          </p:cNvPr>
-          <p:cNvSpPr>
-            <a:spLocks noGrp="1"/>
-          </p:cNvSpPr>
-          <p:nvPr>
-            <p:ph idx="1"/>
-          </p:nvPr>
-        </p:nvSpPr>
-        <p:spPr>
-          <a:xfrm>
-            <a:off x="838200" y="1382233"/>
-            <a:ext cx="10515600" cy="4794730"/>
-          </a:xfrm>
-        </p:spPr>
         <p:txBody>
           <a:bodyPr/>
           <a:lstStyle/>
           <a:p>
+            <a:pPr algn="ctr"/>
             <a:r>
               <a:rPr lang="en-US" dirty="0"/>
-              <a:t>A CSV was pulled containing data cribbed from the Our World in Data </a:t>
+              <a:t>What data did we need?</a:t>
+            </a:r>
+          </a:p>
+        </p:txBody>
+      </p:sp>
+      <p:sp>
+        <p:nvSpPr>
+          <p:cNvPr id="3" name="Content Placeholder 2">
+            <a:extLst>
+              <a:ext uri="{FF2B5EF4-FFF2-40B4-BE49-F238E27FC236}">
+                <a16:creationId xmlns:a16="http://schemas.microsoft.com/office/drawing/2014/main" id="{8729F421-5869-48CF-9594-D0E1FFCD7B38}"/>
+              </a:ext>
+            </a:extLst>
+          </p:cNvPr>
+          <p:cNvSpPr>
+            <a:spLocks noGrp="1"/>
+          </p:cNvSpPr>
+          <p:nvPr>
+            <p:ph idx="1"/>
+          </p:nvPr>
+        </p:nvSpPr>
+        <p:spPr/>
+        <p:txBody>
+          <a:bodyPr/>
+          <a:lstStyle/>
+          <a:p>
+            <a:r>
+              <a:rPr lang="en-US" dirty="0"/>
+              <a:t>Kaggle CSV of world vaccination progress cribbed from the Our World in Data </a:t>
             </a:r>
             <a:r>
               <a:rPr lang="en-US" dirty="0" err="1"/>
@@ -6661,56 +7166,53 @@
           <a:p>
             <a:r>
               <a:rPr lang="en-US" dirty="0"/>
-              <a:t>The data was grouped by ISO Code, and aggregated by the Total Vaccinations and People Fully Vaccinated Per Hundred</a:t>
-            </a:r>
-          </a:p>
-          <a:p>
+              <a:t>Measures of Wellbeing</a:t>
+            </a:r>
+          </a:p>
+          <a:p>
+            <a:pPr lvl="1"/>
             <a:r>
               <a:rPr lang="en-US" dirty="0"/>
-              <a:t>The data of any countries that did not have any data in the People Fully Vaccinated Per Hundred column was dropped</a:t>
-            </a:r>
-          </a:p>
-        </p:txBody>
-      </p:sp>
-      <p:pic>
-        <p:nvPicPr>
-          <p:cNvPr id="6" name="Content Placeholder 5">
-            <a:extLst>
-              <a:ext uri="{FF2B5EF4-FFF2-40B4-BE49-F238E27FC236}">
-                <a16:creationId xmlns:a16="http://schemas.microsoft.com/office/drawing/2014/main" id="{CBC58375-A09B-44D4-A2E0-6A108D396C5B}"/>
-              </a:ext>
-            </a:extLst>
-          </p:cNvPr>
-          <p:cNvPicPr>
-            <a:picLocks noGrp="1" noChangeAspect="1"/>
-          </p:cNvPicPr>
-          <p:nvPr>
-            <p:ph sz="half" idx="4294967295"/>
-          </p:nvPr>
-        </p:nvPicPr>
-        <p:blipFill>
-          <a:blip r:embed="rId2">
-            <a:extLst>
-              <a:ext uri="{28A0092B-C50C-407E-A947-70E740481C1C}">
-                <a14:useLocalDpi xmlns:a14="http://schemas.microsoft.com/office/drawing/2010/main" val="0"/>
-              </a:ext>
-            </a:extLst>
-          </a:blip>
-          <a:stretch>
-            <a:fillRect/>
-          </a:stretch>
-        </p:blipFill>
-        <p:spPr>
-          <a:xfrm>
-            <a:off x="786962" y="4001294"/>
-            <a:ext cx="10618075" cy="2491581"/>
-          </a:xfrm>
-        </p:spPr>
-      </p:pic>
+              <a:t>Economic</a:t>
+            </a:r>
+          </a:p>
+          <a:p>
+            <a:pPr lvl="1"/>
+            <a:r>
+              <a:rPr lang="en-US" dirty="0"/>
+              <a:t>Populace</a:t>
+            </a:r>
+          </a:p>
+          <a:p>
+            <a:pPr lvl="1"/>
+            <a:r>
+              <a:rPr lang="en-US" dirty="0"/>
+              <a:t>Educational</a:t>
+            </a:r>
+          </a:p>
+          <a:p>
+            <a:pPr lvl="1"/>
+            <a:r>
+              <a:rPr lang="en-US" dirty="0"/>
+              <a:t>Health </a:t>
+            </a:r>
+          </a:p>
+          <a:p>
+            <a:r>
+              <a:rPr lang="en-US" dirty="0"/>
+              <a:t>Pulled from the World Bank API</a:t>
+            </a:r>
+          </a:p>
+          <a:p>
+            <a:pPr lvl="1"/>
+            <a:endParaRPr lang="en-US" dirty="0"/>
+          </a:p>
+        </p:txBody>
+      </p:sp>
     </p:spTree>
     <p:extLst>
       <p:ext uri="{BB962C8B-B14F-4D97-AF65-F5344CB8AC3E}">
-        <p14:creationId xmlns:p14="http://schemas.microsoft.com/office/powerpoint/2010/main" val="1139481063"/>
+        <p14:creationId xmlns:p14="http://schemas.microsoft.com/office/powerpoint/2010/main" val="1570807268"/>
       </p:ext>
     </p:extLst>
   </p:cSld>
@@ -6754,7 +7256,7 @@
           <p:cNvPr id="2" name="Title 1">
             <a:extLst>
               <a:ext uri="{FF2B5EF4-FFF2-40B4-BE49-F238E27FC236}">
-                <a16:creationId xmlns:a16="http://schemas.microsoft.com/office/drawing/2014/main" id="{FAEE463E-190C-4244-AE1D-8309C3B41F66}"/>
+                <a16:creationId xmlns:a16="http://schemas.microsoft.com/office/drawing/2014/main" id="{FCBCFE40-176B-4A77-BCD8-CDEF6D4BFA4C}"/>
               </a:ext>
             </a:extLst>
           </p:cNvPr>
@@ -6765,109 +7267,113 @@
             <p:ph type="title"/>
           </p:nvPr>
         </p:nvSpPr>
-        <p:spPr>
-          <a:xfrm>
-            <a:off x="838200" y="-287079"/>
-            <a:ext cx="10515600" cy="2445487"/>
-          </a:xfrm>
-        </p:spPr>
-        <p:txBody>
-          <a:bodyPr/>
-          <a:lstStyle/>
-          <a:p>
-            <a:pPr algn="ctr"/>
-            <a:r>
-              <a:rPr lang="en-US" dirty="0"/>
-              <a:t>Data from the World Bank API</a:t>
-            </a:r>
-          </a:p>
-        </p:txBody>
-      </p:sp>
-      <p:sp>
-        <p:nvSpPr>
-          <p:cNvPr id="3" name="Content Placeholder 2">
-            <a:extLst>
-              <a:ext uri="{FF2B5EF4-FFF2-40B4-BE49-F238E27FC236}">
-                <a16:creationId xmlns:a16="http://schemas.microsoft.com/office/drawing/2014/main" id="{8D1680A3-5670-4CEF-B449-357FD1E1CBE0}"/>
-              </a:ext>
-            </a:extLst>
-          </p:cNvPr>
-          <p:cNvSpPr>
-            <a:spLocks noGrp="1"/>
-          </p:cNvSpPr>
-          <p:nvPr>
-            <p:ph idx="1"/>
-          </p:nvPr>
-        </p:nvSpPr>
-        <p:spPr>
-          <a:xfrm>
-            <a:off x="838200" y="1424763"/>
-            <a:ext cx="10515600" cy="5124892"/>
-          </a:xfrm>
-        </p:spPr>
-        <p:txBody>
-          <a:bodyPr numCol="1">
+        <p:spPr/>
+        <p:txBody>
+          <a:bodyPr>
             <a:normAutofit/>
           </a:bodyPr>
           <a:lstStyle/>
           <a:p>
+            <a:pPr algn="ctr"/>
+            <a:r>
+              <a:rPr lang="en-US" sz="3600" dirty="0"/>
+              <a:t>Members of each population fully vaccinated per 100</a:t>
+            </a:r>
+          </a:p>
+        </p:txBody>
+      </p:sp>
+      <p:sp>
+        <p:nvSpPr>
+          <p:cNvPr id="3" name="Content Placeholder 2">
+            <a:extLst>
+              <a:ext uri="{FF2B5EF4-FFF2-40B4-BE49-F238E27FC236}">
+                <a16:creationId xmlns:a16="http://schemas.microsoft.com/office/drawing/2014/main" id="{848FD0DA-39A8-4AF2-AC3B-8FF71062C678}"/>
+              </a:ext>
+            </a:extLst>
+          </p:cNvPr>
+          <p:cNvSpPr>
+            <a:spLocks noGrp="1"/>
+          </p:cNvSpPr>
+          <p:nvPr>
+            <p:ph idx="1"/>
+          </p:nvPr>
+        </p:nvSpPr>
+        <p:spPr>
+          <a:xfrm>
+            <a:off x="838200" y="1382233"/>
+            <a:ext cx="10515600" cy="4794730"/>
+          </a:xfrm>
+        </p:spPr>
+        <p:txBody>
+          <a:bodyPr/>
+          <a:lstStyle/>
+          <a:p>
             <a:r>
               <a:rPr lang="en-US" dirty="0"/>
-              <a:t>Columns were added to the data frame for each variable being analyzed.</a:t>
-            </a:r>
-          </a:p>
-          <a:p>
+              <a:t>A CSV was pulled containing data cribbed from the Our World in Data </a:t>
+            </a:r>
+            <a:r>
+              <a:rPr lang="en-US" dirty="0" err="1"/>
+              <a:t>Github</a:t>
+            </a:r>
             <a:r>
               <a:rPr lang="en-US" dirty="0"/>
-              <a:t>A pair of nested for loops were run to cycle through each of the variables and then request the necessary data from the World Bank API</a:t>
+              <a:t> Repository</a:t>
             </a:r>
           </a:p>
           <a:p>
             <a:r>
               <a:rPr lang="en-US" dirty="0"/>
-              <a:t>The data was then printed into the data frame</a:t>
+              <a:t>The data was grouped by ISO Code, and aggregated by the Total Vaccinations and People Fully Vaccinated Per Hundred</a:t>
             </a:r>
           </a:p>
           <a:p>
             <a:r>
               <a:rPr lang="en-US" dirty="0"/>
-              <a:t>While other measures, such as poverty rate and educational factors, were desirable, four major factors ended up being used</a:t>
-            </a:r>
-          </a:p>
-          <a:p>
-            <a:pPr lvl="1"/>
-            <a:r>
-              <a:rPr lang="en-US" dirty="0"/>
-              <a:t>GDP</a:t>
-            </a:r>
-          </a:p>
-          <a:p>
-            <a:pPr lvl="1"/>
-            <a:r>
-              <a:rPr lang="en-US" dirty="0"/>
-              <a:t>Total Population</a:t>
-            </a:r>
-          </a:p>
-          <a:p>
-            <a:pPr lvl="1"/>
-            <a:r>
-              <a:rPr lang="en-US" dirty="0"/>
-              <a:t>Population Density</a:t>
-            </a:r>
-          </a:p>
-          <a:p>
-            <a:pPr lvl="1"/>
-            <a:r>
-              <a:rPr lang="en-US" dirty="0"/>
-              <a:t>Percentage of Health Expenditure in the Private Sector</a:t>
-            </a:r>
-          </a:p>
-        </p:txBody>
-      </p:sp>
+              <a:t>The data of any countries that did not have any data in the People Fully Vaccinated Per Hundred column was dropped</a:t>
+            </a:r>
+          </a:p>
+        </p:txBody>
+      </p:sp>
+      <p:pic>
+        <p:nvPicPr>
+          <p:cNvPr id="6" name="Content Placeholder 5">
+            <a:extLst>
+              <a:ext uri="{FF2B5EF4-FFF2-40B4-BE49-F238E27FC236}">
+                <a16:creationId xmlns:a16="http://schemas.microsoft.com/office/drawing/2014/main" id="{CBC58375-A09B-44D4-A2E0-6A108D396C5B}"/>
+              </a:ext>
+            </a:extLst>
+          </p:cNvPr>
+          <p:cNvPicPr>
+            <a:picLocks noGrp="1" noChangeAspect="1"/>
+          </p:cNvPicPr>
+          <p:nvPr>
+            <p:ph sz="half" idx="4294967295"/>
+          </p:nvPr>
+        </p:nvPicPr>
+        <p:blipFill>
+          <a:blip r:embed="rId2">
+            <a:extLst>
+              <a:ext uri="{28A0092B-C50C-407E-A947-70E740481C1C}">
+                <a14:useLocalDpi xmlns:a14="http://schemas.microsoft.com/office/drawing/2010/main" val="0"/>
+              </a:ext>
+            </a:extLst>
+          </a:blip>
+          <a:stretch>
+            <a:fillRect/>
+          </a:stretch>
+        </p:blipFill>
+        <p:spPr>
+          <a:xfrm>
+            <a:off x="786962" y="4001294"/>
+            <a:ext cx="10618075" cy="2491581"/>
+          </a:xfrm>
+        </p:spPr>
+      </p:pic>
     </p:spTree>
     <p:extLst>
       <p:ext uri="{BB962C8B-B14F-4D97-AF65-F5344CB8AC3E}">
-        <p14:creationId xmlns:p14="http://schemas.microsoft.com/office/powerpoint/2010/main" val="3573939707"/>
+        <p14:creationId xmlns:p14="http://schemas.microsoft.com/office/powerpoint/2010/main" val="1139481063"/>
       </p:ext>
     </p:extLst>
   </p:cSld>
@@ -6911,7 +7417,7 @@
           <p:cNvPr id="2" name="Title 1">
             <a:extLst>
               <a:ext uri="{FF2B5EF4-FFF2-40B4-BE49-F238E27FC236}">
-                <a16:creationId xmlns:a16="http://schemas.microsoft.com/office/drawing/2014/main" id="{62B4F17B-D0C6-410E-BFEE-BD3DE24F9A97}"/>
+                <a16:creationId xmlns:a16="http://schemas.microsoft.com/office/drawing/2014/main" id="{FAEE463E-190C-4244-AE1D-8309C3B41F66}"/>
               </a:ext>
             </a:extLst>
           </p:cNvPr>
@@ -6922,24 +7428,30 @@
             <p:ph type="title"/>
           </p:nvPr>
         </p:nvSpPr>
-        <p:spPr/>
+        <p:spPr>
+          <a:xfrm>
+            <a:off x="838200" y="-287079"/>
+            <a:ext cx="10515600" cy="2445487"/>
+          </a:xfrm>
+        </p:spPr>
         <p:txBody>
           <a:bodyPr/>
           <a:lstStyle/>
           <a:p>
+            <a:pPr algn="ctr"/>
             <a:r>
               <a:rPr lang="en-US" dirty="0"/>
-              <a:t>Insights and Problems</a:t>
-            </a:r>
-          </a:p>
-        </p:txBody>
-      </p:sp>
-      <p:sp>
-        <p:nvSpPr>
-          <p:cNvPr id="11" name="Content Placeholder 10">
-            <a:extLst>
-              <a:ext uri="{FF2B5EF4-FFF2-40B4-BE49-F238E27FC236}">
-                <a16:creationId xmlns:a16="http://schemas.microsoft.com/office/drawing/2014/main" id="{AFB9226F-0367-43F1-92A6-7D9B35D680FE}"/>
+              <a:t>Data from the World Bank API</a:t>
+            </a:r>
+          </a:p>
+        </p:txBody>
+      </p:sp>
+      <p:sp>
+        <p:nvSpPr>
+          <p:cNvPr id="3" name="Content Placeholder 2">
+            <a:extLst>
+              <a:ext uri="{FF2B5EF4-FFF2-40B4-BE49-F238E27FC236}">
+                <a16:creationId xmlns:a16="http://schemas.microsoft.com/office/drawing/2014/main" id="{8D1680A3-5670-4CEF-B449-357FD1E1CBE0}"/>
               </a:ext>
             </a:extLst>
           </p:cNvPr>
@@ -6950,59 +7462,75 @@
             <p:ph idx="1"/>
           </p:nvPr>
         </p:nvSpPr>
-        <p:spPr/>
-        <p:txBody>
-          <a:bodyPr>
-            <a:normAutofit lnSpcReduction="10000"/>
+        <p:spPr>
+          <a:xfrm>
+            <a:off x="838200" y="1424763"/>
+            <a:ext cx="10515600" cy="5124892"/>
+          </a:xfrm>
+        </p:spPr>
+        <p:txBody>
+          <a:bodyPr numCol="1">
+            <a:normAutofit/>
           </a:bodyPr>
           <a:lstStyle/>
           <a:p>
             <a:r>
               <a:rPr lang="en-US" dirty="0"/>
-              <a:t>Before Cleaning Gibraltar was most vaccinated</a:t>
+              <a:t>Columns were added to the data frame for each variable being analyzed.</a:t>
             </a:r>
           </a:p>
           <a:p>
             <a:r>
               <a:rPr lang="en-US" dirty="0"/>
-              <a:t>India was the #2 most vaccinated country in terms of number of vaccines administered, but since their population is so high, they are low in number fully vaccinated per hundred people</a:t>
+              <a:t>A pair of nested for loops were run to cycle through each of the variables and then request the necessary data from the World Bank API</a:t>
             </a:r>
           </a:p>
           <a:p>
             <a:r>
               <a:rPr lang="en-US" dirty="0"/>
-              <a:t>After doing the initial extraction an additional CSV was found to add country names to the data frame based on ISO Codes</a:t>
+              <a:t>The data was then printed into the data frame</a:t>
+            </a:r>
+          </a:p>
+          <a:p>
+            <a:r>
+              <a:rPr lang="en-US" dirty="0"/>
+              <a:t>While other measures, such as poverty rate and educational factors, were desirable, four major factors ended up being used</a:t>
             </a:r>
           </a:p>
           <a:p>
             <a:pPr lvl="1"/>
             <a:r>
               <a:rPr lang="en-US" dirty="0"/>
-              <a:t>This allowed the data to be reviewed more easily</a:t>
-            </a:r>
-          </a:p>
-          <a:p>
+              <a:t>GDP</a:t>
+            </a:r>
+          </a:p>
+          <a:p>
+            <a:pPr lvl="1"/>
             <a:r>
               <a:rPr lang="en-US" dirty="0"/>
-              <a:t>Many desired variables were not usable since there was no recent data for them</a:t>
+              <a:t>Total Population</a:t>
             </a:r>
           </a:p>
           <a:p>
             <a:pPr lvl="1"/>
             <a:r>
               <a:rPr lang="en-US" dirty="0"/>
-              <a:t>Much of the poverty related data is only updated once a decade and had not been updated since 2011</a:t>
-            </a:r>
-          </a:p>
-          <a:p>
-            <a:endParaRPr lang="en-US" dirty="0"/>
+              <a:t>Population Density</a:t>
+            </a:r>
+          </a:p>
+          <a:p>
+            <a:pPr lvl="1"/>
+            <a:r>
+              <a:rPr lang="en-US" dirty="0"/>
+              <a:t>Percentage of Health Expenditure in the Private Sector</a:t>
+            </a:r>
           </a:p>
         </p:txBody>
       </p:sp>
     </p:spTree>
     <p:extLst>
       <p:ext uri="{BB962C8B-B14F-4D97-AF65-F5344CB8AC3E}">
-        <p14:creationId xmlns:p14="http://schemas.microsoft.com/office/powerpoint/2010/main" val="3644890434"/>
+        <p14:creationId xmlns:p14="http://schemas.microsoft.com/office/powerpoint/2010/main" val="3573939707"/>
       </p:ext>
     </p:extLst>
   </p:cSld>
@@ -7046,7 +7574,7 @@
           <p:cNvPr id="2" name="Title 1">
             <a:extLst>
               <a:ext uri="{FF2B5EF4-FFF2-40B4-BE49-F238E27FC236}">
-                <a16:creationId xmlns:a16="http://schemas.microsoft.com/office/drawing/2014/main" id="{7BC281AA-506C-41F3-B78C-D67244BD833B}"/>
+                <a16:creationId xmlns:a16="http://schemas.microsoft.com/office/drawing/2014/main" id="{62B4F17B-D0C6-410E-BFEE-BD3DE24F9A97}"/>
               </a:ext>
             </a:extLst>
           </p:cNvPr>
@@ -7064,17 +7592,17 @@
           <a:p>
             <a:r>
               <a:rPr lang="en-US" dirty="0"/>
-              <a:t>Data Analysis</a:t>
-            </a:r>
-          </a:p>
-        </p:txBody>
-      </p:sp>
-      <p:sp>
-        <p:nvSpPr>
-          <p:cNvPr id="5" name="Content Placeholder 4">
-            <a:extLst>
-              <a:ext uri="{FF2B5EF4-FFF2-40B4-BE49-F238E27FC236}">
-                <a16:creationId xmlns:a16="http://schemas.microsoft.com/office/drawing/2014/main" id="{AD78B15D-8C93-475F-A14A-3C87BA0DA604}"/>
+              <a:t>Insights and Problems</a:t>
+            </a:r>
+          </a:p>
+        </p:txBody>
+      </p:sp>
+      <p:sp>
+        <p:nvSpPr>
+          <p:cNvPr id="11" name="Content Placeholder 10">
+            <a:extLst>
+              <a:ext uri="{FF2B5EF4-FFF2-40B4-BE49-F238E27FC236}">
+                <a16:creationId xmlns:a16="http://schemas.microsoft.com/office/drawing/2014/main" id="{AFB9226F-0367-43F1-92A6-7D9B35D680FE}"/>
               </a:ext>
             </a:extLst>
           </p:cNvPr>
@@ -7094,67 +7622,50 @@
           <a:p>
             <a:r>
               <a:rPr lang="en-US" dirty="0"/>
-              <a:t>The first step of analysis was to group the data into quartiles based on the different variables being used</a:t>
+              <a:t>Before Cleaning Gibraltar was most vaccinated</a:t>
             </a:r>
           </a:p>
           <a:p>
             <a:r>
               <a:rPr lang="en-US" dirty="0"/>
-              <a:t>From there a One Way </a:t>
-            </a:r>
-            <a:r>
-              <a:rPr lang="en-US" dirty="0" err="1"/>
-              <a:t>Anova</a:t>
-            </a:r>
+              <a:t>India was the #2 most vaccinated country in terms of number of vaccines administered, but since their population is so high, they are low in number fully vaccinated per hundred people</a:t>
+            </a:r>
+          </a:p>
+          <a:p>
             <a:r>
               <a:rPr lang="en-US" dirty="0"/>
-              <a:t> Test was performed </a:t>
+              <a:t>After doing the initial extraction an additional CSV was found to add country names to the data frame based on ISO Codes</a:t>
             </a:r>
           </a:p>
           <a:p>
             <a:pPr lvl="1"/>
             <a:r>
-              <a:rPr lang="en-US" b="0" i="0" dirty="0">
-                <a:solidFill>
-                  <a:srgbClr val="000000"/>
-                </a:solidFill>
-                <a:effectLst/>
-                <a:latin typeface="Helvetica Neue"/>
-              </a:rPr>
-              <a:t>Null Hypothesis: Each sample mean for indicators broken down by quartile are equivalent</a:t>
+              <a:rPr lang="en-US" dirty="0"/>
+              <a:t>This allowed the data to be reviewed more easily</a:t>
+            </a:r>
+          </a:p>
+          <a:p>
+            <a:r>
+              <a:rPr lang="en-US" dirty="0"/>
+              <a:t>Many desired variables were not usable since there was no recent data for them</a:t>
             </a:r>
           </a:p>
           <a:p>
             <a:pPr lvl="1"/>
             <a:r>
-              <a:rPr lang="en-US" b="0" i="0" dirty="0">
-                <a:solidFill>
-                  <a:srgbClr val="000000"/>
-                </a:solidFill>
-                <a:effectLst/>
-                <a:latin typeface="Helvetica Neue"/>
-              </a:rPr>
-              <a:t>Alternative Hypothesis: There exists one mean such that the sample mean for indicators are not all equivalent</a:t>
-            </a:r>
-          </a:p>
-          <a:p>
-            <a:r>
               <a:rPr lang="en-US" dirty="0"/>
-              <a:t>From there linear regression was performed for each quartile of each variable to look for additional statistically relevant points</a:t>
-            </a:r>
-          </a:p>
-          <a:p>
-            <a:r>
-              <a:rPr lang="en-US" dirty="0"/>
-              <a:t>Finally the Top 5 and Lowest 5 countries by both Percent of Population and Number of Vaccinated individuals were separated out </a:t>
-            </a:r>
+              <a:t>Much of the poverty related data is only updated once a decade and had not been updated since 2011</a:t>
+            </a:r>
+          </a:p>
+          <a:p>
+            <a:endParaRPr lang="en-US" dirty="0"/>
           </a:p>
         </p:txBody>
       </p:sp>
     </p:spTree>
     <p:extLst>
       <p:ext uri="{BB962C8B-B14F-4D97-AF65-F5344CB8AC3E}">
-        <p14:creationId xmlns:p14="http://schemas.microsoft.com/office/powerpoint/2010/main" val="281725530"/>
+        <p14:creationId xmlns:p14="http://schemas.microsoft.com/office/powerpoint/2010/main" val="3644890434"/>
       </p:ext>
     </p:extLst>
   </p:cSld>
@@ -7193,6 +7704,158 @@
           <a:chExt cx="0" cy="0"/>
         </a:xfrm>
       </p:grpSpPr>
+      <p:sp>
+        <p:nvSpPr>
+          <p:cNvPr id="2" name="Title 1">
+            <a:extLst>
+              <a:ext uri="{FF2B5EF4-FFF2-40B4-BE49-F238E27FC236}">
+                <a16:creationId xmlns:a16="http://schemas.microsoft.com/office/drawing/2014/main" id="{7BC281AA-506C-41F3-B78C-D67244BD833B}"/>
+              </a:ext>
+            </a:extLst>
+          </p:cNvPr>
+          <p:cNvSpPr>
+            <a:spLocks noGrp="1"/>
+          </p:cNvSpPr>
+          <p:nvPr>
+            <p:ph type="title"/>
+          </p:nvPr>
+        </p:nvSpPr>
+        <p:spPr/>
+        <p:txBody>
+          <a:bodyPr/>
+          <a:lstStyle/>
+          <a:p>
+            <a:r>
+              <a:rPr lang="en-US" dirty="0"/>
+              <a:t>Data Analysis</a:t>
+            </a:r>
+          </a:p>
+        </p:txBody>
+      </p:sp>
+      <p:sp>
+        <p:nvSpPr>
+          <p:cNvPr id="5" name="Content Placeholder 4">
+            <a:extLst>
+              <a:ext uri="{FF2B5EF4-FFF2-40B4-BE49-F238E27FC236}">
+                <a16:creationId xmlns:a16="http://schemas.microsoft.com/office/drawing/2014/main" id="{AD78B15D-8C93-475F-A14A-3C87BA0DA604}"/>
+              </a:ext>
+            </a:extLst>
+          </p:cNvPr>
+          <p:cNvSpPr>
+            <a:spLocks noGrp="1"/>
+          </p:cNvSpPr>
+          <p:nvPr>
+            <p:ph idx="1"/>
+          </p:nvPr>
+        </p:nvSpPr>
+        <p:spPr/>
+        <p:txBody>
+          <a:bodyPr>
+            <a:normAutofit lnSpcReduction="10000"/>
+          </a:bodyPr>
+          <a:lstStyle/>
+          <a:p>
+            <a:r>
+              <a:rPr lang="en-US" dirty="0"/>
+              <a:t>The first step of analysis was to group the data into quartiles based on the different variables being used</a:t>
+            </a:r>
+          </a:p>
+          <a:p>
+            <a:r>
+              <a:rPr lang="en-US" dirty="0"/>
+              <a:t>From there a One Way </a:t>
+            </a:r>
+            <a:r>
+              <a:rPr lang="en-US" dirty="0" err="1"/>
+              <a:t>Anova</a:t>
+            </a:r>
+            <a:r>
+              <a:rPr lang="en-US" dirty="0"/>
+              <a:t> Test was performed </a:t>
+            </a:r>
+          </a:p>
+          <a:p>
+            <a:pPr lvl="1"/>
+            <a:r>
+              <a:rPr lang="en-US" b="0" i="0" dirty="0">
+                <a:solidFill>
+                  <a:srgbClr val="000000"/>
+                </a:solidFill>
+                <a:effectLst/>
+                <a:latin typeface="Helvetica Neue"/>
+              </a:rPr>
+              <a:t>Null Hypothesis: Each sample mean for indicators broken down by quartile are equivalent</a:t>
+            </a:r>
+          </a:p>
+          <a:p>
+            <a:pPr lvl="1"/>
+            <a:r>
+              <a:rPr lang="en-US" b="0" i="0" dirty="0">
+                <a:solidFill>
+                  <a:srgbClr val="000000"/>
+                </a:solidFill>
+                <a:effectLst/>
+                <a:latin typeface="Helvetica Neue"/>
+              </a:rPr>
+              <a:t>Alternative Hypothesis: There exists one mean such that the sample mean for indicators are not all equivalent</a:t>
+            </a:r>
+          </a:p>
+          <a:p>
+            <a:r>
+              <a:rPr lang="en-US" dirty="0"/>
+              <a:t>From there linear regression was performed for each quartile of each variable to look for additional statistically relevant points</a:t>
+            </a:r>
+          </a:p>
+          <a:p>
+            <a:r>
+              <a:rPr lang="en-US" dirty="0"/>
+              <a:t>Finally the Top 5 and Lowest 5 countries by both Percent of Population and Number of Vaccinated individuals were separated out </a:t>
+            </a:r>
+          </a:p>
+        </p:txBody>
+      </p:sp>
+    </p:spTree>
+    <p:extLst>
+      <p:ext uri="{BB962C8B-B14F-4D97-AF65-F5344CB8AC3E}">
+        <p14:creationId xmlns:p14="http://schemas.microsoft.com/office/powerpoint/2010/main" val="281725530"/>
+      </p:ext>
+    </p:extLst>
+  </p:cSld>
+  <p:clrMapOvr>
+    <a:masterClrMapping/>
+  </p:clrMapOvr>
+  <mc:AlternateContent xmlns:mc="http://schemas.openxmlformats.org/markup-compatibility/2006" xmlns:p14="http://schemas.microsoft.com/office/powerpoint/2010/main">
+    <mc:Choice Requires="p14">
+      <p:transition spd="med" p14:dur="700">
+        <p:fade/>
+      </p:transition>
+    </mc:Choice>
+    <mc:Fallback xmlns="">
+      <p:transition spd="med">
+        <p:fade/>
+      </p:transition>
+    </mc:Fallback>
+  </mc:AlternateContent>
+</p:sld>
+</file>
+
+<file path=ppt/slides/slide9.xml><?xml version="1.0" encoding="utf-8"?>
+<p:sld xmlns:a="http://schemas.openxmlformats.org/drawingml/2006/main" xmlns:r="http://schemas.openxmlformats.org/officeDocument/2006/relationships" xmlns:p="http://schemas.openxmlformats.org/presentationml/2006/main">
+  <p:cSld>
+    <p:spTree>
+      <p:nvGrpSpPr>
+        <p:cNvPr id="1" name=""/>
+        <p:cNvGrpSpPr/>
+        <p:nvPr/>
+      </p:nvGrpSpPr>
+      <p:grpSpPr>
+        <a:xfrm>
+          <a:off x="0" y="0"/>
+          <a:ext cx="0" cy="0"/>
+          <a:chOff x="0" y="0"/>
+          <a:chExt cx="0" cy="0"/>
+        </a:xfrm>
+      </p:grpSpPr>
       <p:pic>
         <p:nvPicPr>
           <p:cNvPr id="5" name="Picture 4">
@@ -7347,310 +8010,6 @@
   <p:clrMapOvr>
     <a:masterClrMapping/>
   </p:clrMapOvr>
-</p:sld>
-</file>
-
-<file path=ppt/slides/slide9.xml><?xml version="1.0" encoding="utf-8"?>
-<p:sld xmlns:a="http://schemas.openxmlformats.org/drawingml/2006/main" xmlns:r="http://schemas.openxmlformats.org/officeDocument/2006/relationships" xmlns:p="http://schemas.openxmlformats.org/presentationml/2006/main">
-  <p:cSld>
-    <p:spTree>
-      <p:nvGrpSpPr>
-        <p:cNvPr id="1" name=""/>
-        <p:cNvGrpSpPr/>
-        <p:nvPr/>
-      </p:nvGrpSpPr>
-      <p:grpSpPr>
-        <a:xfrm>
-          <a:off x="0" y="0"/>
-          <a:ext cx="0" cy="0"/>
-          <a:chOff x="0" y="0"/>
-          <a:chExt cx="0" cy="0"/>
-        </a:xfrm>
-      </p:grpSpPr>
-      <p:sp>
-        <p:nvSpPr>
-          <p:cNvPr id="6" name="Title 5">
-            <a:extLst>
-              <a:ext uri="{FF2B5EF4-FFF2-40B4-BE49-F238E27FC236}">
-                <a16:creationId xmlns:a16="http://schemas.microsoft.com/office/drawing/2014/main" id="{2415EC17-CDAA-4D6C-9B43-5C8E6DCEEA30}"/>
-              </a:ext>
-            </a:extLst>
-          </p:cNvPr>
-          <p:cNvSpPr>
-            <a:spLocks noGrp="1"/>
-          </p:cNvSpPr>
-          <p:nvPr>
-            <p:ph type="title"/>
-          </p:nvPr>
-        </p:nvSpPr>
-        <p:spPr/>
-        <p:txBody>
-          <a:bodyPr>
-            <a:normAutofit/>
-          </a:bodyPr>
-          <a:lstStyle/>
-          <a:p>
-            <a:r>
-              <a:rPr lang="en-US" dirty="0"/>
-              <a:t> </a:t>
-            </a:r>
-          </a:p>
-        </p:txBody>
-      </p:sp>
-      <p:pic>
-        <p:nvPicPr>
-          <p:cNvPr id="5" name="Content Placeholder 4">
-            <a:extLst>
-              <a:ext uri="{FF2B5EF4-FFF2-40B4-BE49-F238E27FC236}">
-                <a16:creationId xmlns:a16="http://schemas.microsoft.com/office/drawing/2014/main" id="{7DEC3078-992B-4D94-AC5F-2E51333C7D16}"/>
-              </a:ext>
-            </a:extLst>
-          </p:cNvPr>
-          <p:cNvPicPr>
-            <a:picLocks noGrp="1" noChangeAspect="1"/>
-          </p:cNvPicPr>
-          <p:nvPr>
-            <p:ph sz="half" idx="1"/>
-          </p:nvPr>
-        </p:nvPicPr>
-        <p:blipFill>
-          <a:blip r:embed="rId3">
-            <a:extLst>
-              <a:ext uri="{28A0092B-C50C-407E-A947-70E740481C1C}">
-                <a14:useLocalDpi xmlns:a14="http://schemas.microsoft.com/office/drawing/2010/main" val="0"/>
-              </a:ext>
-            </a:extLst>
-          </a:blip>
-          <a:stretch>
-            <a:fillRect/>
-          </a:stretch>
-        </p:blipFill>
-        <p:spPr>
-          <a:xfrm>
-            <a:off x="838200" y="2274094"/>
-            <a:ext cx="5181600" cy="3454400"/>
-          </a:xfrm>
-        </p:spPr>
-      </p:pic>
-      <p:pic>
-        <p:nvPicPr>
-          <p:cNvPr id="11" name="Content Placeholder 10">
-            <a:extLst>
-              <a:ext uri="{FF2B5EF4-FFF2-40B4-BE49-F238E27FC236}">
-                <a16:creationId xmlns:a16="http://schemas.microsoft.com/office/drawing/2014/main" id="{AC6172F2-058C-4A73-8191-6002414092D6}"/>
-              </a:ext>
-            </a:extLst>
-          </p:cNvPr>
-          <p:cNvPicPr>
-            <a:picLocks noGrp="1" noChangeAspect="1"/>
-          </p:cNvPicPr>
-          <p:nvPr>
-            <p:ph sz="half" idx="2"/>
-          </p:nvPr>
-        </p:nvPicPr>
-        <p:blipFill>
-          <a:blip r:embed="rId4">
-            <a:extLst>
-              <a:ext uri="{28A0092B-C50C-407E-A947-70E740481C1C}">
-                <a14:useLocalDpi xmlns:a14="http://schemas.microsoft.com/office/drawing/2010/main" val="0"/>
-              </a:ext>
-            </a:extLst>
-          </a:blip>
-          <a:stretch>
-            <a:fillRect/>
-          </a:stretch>
-        </p:blipFill>
-        <p:spPr>
-          <a:xfrm>
-            <a:off x="6172199" y="2618233"/>
-            <a:ext cx="2653019" cy="1768679"/>
-          </a:xfrm>
-        </p:spPr>
-      </p:pic>
-      <p:sp>
-        <p:nvSpPr>
-          <p:cNvPr id="12" name="Text Placeholder 11">
-            <a:extLst>
-              <a:ext uri="{FF2B5EF4-FFF2-40B4-BE49-F238E27FC236}">
-                <a16:creationId xmlns:a16="http://schemas.microsoft.com/office/drawing/2014/main" id="{28797D2E-DF25-4DEB-B568-C7C03EB5D2CB}"/>
-              </a:ext>
-            </a:extLst>
-          </p:cNvPr>
-          <p:cNvSpPr>
-            <a:spLocks noGrp="1"/>
-          </p:cNvSpPr>
-          <p:nvPr>
-            <p:ph type="body" sz="quarter" idx="4294967295"/>
-          </p:nvPr>
-        </p:nvSpPr>
-        <p:spPr>
-          <a:xfrm>
-            <a:off x="710214" y="365125"/>
-            <a:ext cx="10777491" cy="1527175"/>
-          </a:xfrm>
-        </p:spPr>
-        <p:txBody>
-          <a:bodyPr>
-            <a:normAutofit/>
-          </a:bodyPr>
-          <a:lstStyle/>
-          <a:p>
-            <a:pPr marL="0" indent="0" algn="ctr">
-              <a:buNone/>
-            </a:pPr>
-            <a:r>
-              <a:rPr lang="en-US" sz="3900" b="0" dirty="0"/>
-              <a:t>Total Population</a:t>
-            </a:r>
-            <a:endParaRPr lang="en-US" dirty="0"/>
-          </a:p>
-          <a:p>
-            <a:pPr marL="0" indent="0" algn="ctr">
-              <a:buNone/>
-            </a:pPr>
-            <a:r>
-              <a:rPr lang="en-US" b="0" dirty="0"/>
-              <a:t>This data failed to reject the null hypothesis, thus there is no statistical difference between the data in the different quartiles.</a:t>
-            </a:r>
-          </a:p>
-          <a:p>
-            <a:pPr marL="0" indent="0" algn="ctr">
-              <a:buNone/>
-            </a:pPr>
-            <a:endParaRPr lang="en-US" b="0" dirty="0"/>
-          </a:p>
-        </p:txBody>
-      </p:sp>
-      <p:pic>
-        <p:nvPicPr>
-          <p:cNvPr id="14" name="Picture 13">
-            <a:extLst>
-              <a:ext uri="{FF2B5EF4-FFF2-40B4-BE49-F238E27FC236}">
-                <a16:creationId xmlns:a16="http://schemas.microsoft.com/office/drawing/2014/main" id="{52F2F952-BE94-48C0-AB4E-1110B8F2974D}"/>
-              </a:ext>
-            </a:extLst>
-          </p:cNvPr>
-          <p:cNvPicPr>
-            <a:picLocks noChangeAspect="1"/>
-          </p:cNvPicPr>
-          <p:nvPr/>
-        </p:nvPicPr>
-        <p:blipFill>
-          <a:blip r:embed="rId5">
-            <a:extLst>
-              <a:ext uri="{28A0092B-C50C-407E-A947-70E740481C1C}">
-                <a14:useLocalDpi xmlns:a14="http://schemas.microsoft.com/office/drawing/2010/main" val="0"/>
-              </a:ext>
-            </a:extLst>
-          </a:blip>
-          <a:stretch>
-            <a:fillRect/>
-          </a:stretch>
-        </p:blipFill>
-        <p:spPr>
-          <a:xfrm>
-            <a:off x="8713709" y="2618233"/>
-            <a:ext cx="2653018" cy="1768679"/>
-          </a:xfrm>
-          <a:prstGeom prst="rect">
-            <a:avLst/>
-          </a:prstGeom>
-        </p:spPr>
-      </p:pic>
-      <p:pic>
-        <p:nvPicPr>
-          <p:cNvPr id="16" name="Picture 15">
-            <a:extLst>
-              <a:ext uri="{FF2B5EF4-FFF2-40B4-BE49-F238E27FC236}">
-                <a16:creationId xmlns:a16="http://schemas.microsoft.com/office/drawing/2014/main" id="{2295A3B0-BF3D-4B84-8861-D4471F95F4A5}"/>
-              </a:ext>
-            </a:extLst>
-          </p:cNvPr>
-          <p:cNvPicPr>
-            <a:picLocks noChangeAspect="1"/>
-          </p:cNvPicPr>
-          <p:nvPr/>
-        </p:nvPicPr>
-        <p:blipFill>
-          <a:blip r:embed="rId6">
-            <a:extLst>
-              <a:ext uri="{28A0092B-C50C-407E-A947-70E740481C1C}">
-                <a14:useLocalDpi xmlns:a14="http://schemas.microsoft.com/office/drawing/2010/main" val="0"/>
-              </a:ext>
-            </a:extLst>
-          </a:blip>
-          <a:stretch>
-            <a:fillRect/>
-          </a:stretch>
-        </p:blipFill>
-        <p:spPr>
-          <a:xfrm>
-            <a:off x="6172200" y="4373453"/>
-            <a:ext cx="2653018" cy="1768679"/>
-          </a:xfrm>
-          <a:prstGeom prst="rect">
-            <a:avLst/>
-          </a:prstGeom>
-        </p:spPr>
-      </p:pic>
-      <p:pic>
-        <p:nvPicPr>
-          <p:cNvPr id="20" name="Picture 19">
-            <a:extLst>
-              <a:ext uri="{FF2B5EF4-FFF2-40B4-BE49-F238E27FC236}">
-                <a16:creationId xmlns:a16="http://schemas.microsoft.com/office/drawing/2014/main" id="{ECA59790-F2D9-4938-85A8-AAA0186BBA30}"/>
-              </a:ext>
-            </a:extLst>
-          </p:cNvPr>
-          <p:cNvPicPr>
-            <a:picLocks noChangeAspect="1"/>
-          </p:cNvPicPr>
-          <p:nvPr/>
-        </p:nvPicPr>
-        <p:blipFill>
-          <a:blip r:embed="rId7">
-            <a:extLst>
-              <a:ext uri="{28A0092B-C50C-407E-A947-70E740481C1C}">
-                <a14:useLocalDpi xmlns:a14="http://schemas.microsoft.com/office/drawing/2010/main" val="0"/>
-              </a:ext>
-            </a:extLst>
-          </a:blip>
-          <a:stretch>
-            <a:fillRect/>
-          </a:stretch>
-        </p:blipFill>
-        <p:spPr>
-          <a:xfrm>
-            <a:off x="8707583" y="4370134"/>
-            <a:ext cx="2653018" cy="1768679"/>
-          </a:xfrm>
-          <a:prstGeom prst="rect">
-            <a:avLst/>
-          </a:prstGeom>
-        </p:spPr>
-      </p:pic>
-    </p:spTree>
-    <p:extLst>
-      <p:ext uri="{BB962C8B-B14F-4D97-AF65-F5344CB8AC3E}">
-        <p14:creationId xmlns:p14="http://schemas.microsoft.com/office/powerpoint/2010/main" val="3399668416"/>
-      </p:ext>
-    </p:extLst>
-  </p:cSld>
-  <p:clrMapOvr>
-    <a:masterClrMapping/>
-  </p:clrMapOvr>
-  <mc:AlternateContent xmlns:mc="http://schemas.openxmlformats.org/markup-compatibility/2006" xmlns:p14="http://schemas.microsoft.com/office/powerpoint/2010/main">
-    <mc:Choice Requires="p14">
-      <p:transition spd="med" p14:dur="700">
-        <p:fade/>
-      </p:transition>
-    </mc:Choice>
-    <mc:Fallback xmlns="">
-      <p:transition spd="med">
-        <p:fade/>
-      </p:transition>
-    </mc:Fallback>
-  </mc:AlternateContent>
 </p:sld>
 </file>
 

</xml_diff>